<commit_message>
finished A1.1 anyway. added pictures and renamed pictures.
</commit_message>
<xml_diff>
--- a/images/2024-10-25-Fourier_A1/Fourier_A1.pptx
+++ b/images/2024-10-25-Fourier_A1/Fourier_A1.pptx
@@ -7,6 +7,8 @@
   <p:sldIdLst>
     <p:sldId id="259" r:id="rId2"/>
     <p:sldId id="256" r:id="rId3"/>
+    <p:sldId id="260" r:id="rId4"/>
+    <p:sldId id="261" r:id="rId5"/>
   </p:sldIdLst>
   <p:sldSz cx="12192000" cy="6858000"/>
   <p:notesSz cx="6858000" cy="9144000"/>
@@ -260,7 +262,7 @@
           <a:p>
             <a:fld id="{4D237549-5350-4301-B15F-1E09266C2664}" type="datetimeFigureOut">
               <a:rPr lang="ko-KR" altLang="en-US" smtClean="0"/>
-              <a:t>2024-10-25</a:t>
+              <a:t>2024-10-28</a:t>
             </a:fld>
             <a:endParaRPr lang="ko-KR" altLang="en-US"/>
           </a:p>
@@ -458,7 +460,7 @@
           <a:p>
             <a:fld id="{4D237549-5350-4301-B15F-1E09266C2664}" type="datetimeFigureOut">
               <a:rPr lang="ko-KR" altLang="en-US" smtClean="0"/>
-              <a:t>2024-10-25</a:t>
+              <a:t>2024-10-28</a:t>
             </a:fld>
             <a:endParaRPr lang="ko-KR" altLang="en-US"/>
           </a:p>
@@ -666,7 +668,7 @@
           <a:p>
             <a:fld id="{4D237549-5350-4301-B15F-1E09266C2664}" type="datetimeFigureOut">
               <a:rPr lang="ko-KR" altLang="en-US" smtClean="0"/>
-              <a:t>2024-10-25</a:t>
+              <a:t>2024-10-28</a:t>
             </a:fld>
             <a:endParaRPr lang="ko-KR" altLang="en-US"/>
           </a:p>
@@ -864,7 +866,7 @@
           <a:p>
             <a:fld id="{4D237549-5350-4301-B15F-1E09266C2664}" type="datetimeFigureOut">
               <a:rPr lang="ko-KR" altLang="en-US" smtClean="0"/>
-              <a:t>2024-10-25</a:t>
+              <a:t>2024-10-28</a:t>
             </a:fld>
             <a:endParaRPr lang="ko-KR" altLang="en-US"/>
           </a:p>
@@ -1139,7 +1141,7 @@
           <a:p>
             <a:fld id="{4D237549-5350-4301-B15F-1E09266C2664}" type="datetimeFigureOut">
               <a:rPr lang="ko-KR" altLang="en-US" smtClean="0"/>
-              <a:t>2024-10-25</a:t>
+              <a:t>2024-10-28</a:t>
             </a:fld>
             <a:endParaRPr lang="ko-KR" altLang="en-US"/>
           </a:p>
@@ -1404,7 +1406,7 @@
           <a:p>
             <a:fld id="{4D237549-5350-4301-B15F-1E09266C2664}" type="datetimeFigureOut">
               <a:rPr lang="ko-KR" altLang="en-US" smtClean="0"/>
-              <a:t>2024-10-25</a:t>
+              <a:t>2024-10-28</a:t>
             </a:fld>
             <a:endParaRPr lang="ko-KR" altLang="en-US"/>
           </a:p>
@@ -1816,7 +1818,7 @@
           <a:p>
             <a:fld id="{4D237549-5350-4301-B15F-1E09266C2664}" type="datetimeFigureOut">
               <a:rPr lang="ko-KR" altLang="en-US" smtClean="0"/>
-              <a:t>2024-10-25</a:t>
+              <a:t>2024-10-28</a:t>
             </a:fld>
             <a:endParaRPr lang="ko-KR" altLang="en-US"/>
           </a:p>
@@ -1957,7 +1959,7 @@
           <a:p>
             <a:fld id="{4D237549-5350-4301-B15F-1E09266C2664}" type="datetimeFigureOut">
               <a:rPr lang="ko-KR" altLang="en-US" smtClean="0"/>
-              <a:t>2024-10-25</a:t>
+              <a:t>2024-10-28</a:t>
             </a:fld>
             <a:endParaRPr lang="ko-KR" altLang="en-US"/>
           </a:p>
@@ -2070,7 +2072,7 @@
           <a:p>
             <a:fld id="{4D237549-5350-4301-B15F-1E09266C2664}" type="datetimeFigureOut">
               <a:rPr lang="ko-KR" altLang="en-US" smtClean="0"/>
-              <a:t>2024-10-25</a:t>
+              <a:t>2024-10-28</a:t>
             </a:fld>
             <a:endParaRPr lang="ko-KR" altLang="en-US"/>
           </a:p>
@@ -2381,7 +2383,7 @@
           <a:p>
             <a:fld id="{4D237549-5350-4301-B15F-1E09266C2664}" type="datetimeFigureOut">
               <a:rPr lang="ko-KR" altLang="en-US" smtClean="0"/>
-              <a:t>2024-10-25</a:t>
+              <a:t>2024-10-28</a:t>
             </a:fld>
             <a:endParaRPr lang="ko-KR" altLang="en-US"/>
           </a:p>
@@ -2669,7 +2671,7 @@
           <a:p>
             <a:fld id="{4D237549-5350-4301-B15F-1E09266C2664}" type="datetimeFigureOut">
               <a:rPr lang="ko-KR" altLang="en-US" smtClean="0"/>
-              <a:t>2024-10-25</a:t>
+              <a:t>2024-10-28</a:t>
             </a:fld>
             <a:endParaRPr lang="ko-KR" altLang="en-US"/>
           </a:p>
@@ -2910,7 +2912,7 @@
           <a:p>
             <a:fld id="{4D237549-5350-4301-B15F-1E09266C2664}" type="datetimeFigureOut">
               <a:rPr lang="ko-KR" altLang="en-US" smtClean="0"/>
-              <a:t>2024-10-25</a:t>
+              <a:t>2024-10-28</a:t>
             </a:fld>
             <a:endParaRPr lang="ko-KR" altLang="en-US"/>
           </a:p>
@@ -3714,8 +3716,8 @@
           </a:fontRef>
         </p:style>
       </p:cxnSp>
-      <mc:AlternateContent xmlns:mc="http://schemas.openxmlformats.org/markup-compatibility/2006">
-        <mc:Choice xmlns:a14="http://schemas.microsoft.com/office/drawing/2010/main" Requires="a14">
+      <mc:AlternateContent xmlns:mc="http://schemas.openxmlformats.org/markup-compatibility/2006" xmlns:a14="http://schemas.microsoft.com/office/drawing/2010/main">
+        <mc:Choice Requires="a14">
           <p:sp>
             <p:nvSpPr>
               <p:cNvPr id="42" name="TextBox 41">
@@ -3754,7 +3756,7 @@
                       <m:sSub>
                         <m:sSubPr>
                           <m:ctrlPr>
-                            <a:rPr lang="en-US" altLang="ko-KR" sz="1100" b="0" i="0" dirty="0" smtClean="0">
+                            <a:rPr lang="en-US" altLang="ko-KR" sz="1100" b="0" i="1" dirty="0" smtClean="0">
                               <a:latin typeface="Cambria Math" panose="02040503050406030204" pitchFamily="18" charset="0"/>
                             </a:rPr>
                           </m:ctrlPr>
@@ -3787,7 +3789,7 @@
             </p:txBody>
           </p:sp>
         </mc:Choice>
-        <mc:Fallback>
+        <mc:Fallback xmlns="">
           <p:sp>
             <p:nvSpPr>
               <p:cNvPr id="42" name="TextBox 41">
@@ -3832,8 +3834,8 @@
           </p:sp>
         </mc:Fallback>
       </mc:AlternateContent>
-      <mc:AlternateContent xmlns:mc="http://schemas.openxmlformats.org/markup-compatibility/2006">
-        <mc:Choice xmlns:a14="http://schemas.microsoft.com/office/drawing/2010/main" Requires="a14">
+      <mc:AlternateContent xmlns:mc="http://schemas.openxmlformats.org/markup-compatibility/2006" xmlns:a14="http://schemas.microsoft.com/office/drawing/2010/main">
+        <mc:Choice Requires="a14">
           <p:sp>
             <p:nvSpPr>
               <p:cNvPr id="43" name="TextBox 42">
@@ -3872,7 +3874,7 @@
                       <m:sSub>
                         <m:sSubPr>
                           <m:ctrlPr>
-                            <a:rPr lang="en-US" altLang="ko-KR" sz="1100" b="0" i="0" dirty="0" smtClean="0">
+                            <a:rPr lang="en-US" altLang="ko-KR" sz="1100" b="0" i="1" dirty="0" smtClean="0">
                               <a:latin typeface="Cambria Math" panose="02040503050406030204" pitchFamily="18" charset="0"/>
                             </a:rPr>
                           </m:ctrlPr>
@@ -3911,7 +3913,7 @@
             </p:txBody>
           </p:sp>
         </mc:Choice>
-        <mc:Fallback>
+        <mc:Fallback xmlns="">
           <p:sp>
             <p:nvSpPr>
               <p:cNvPr id="43" name="TextBox 42">
@@ -3956,8 +3958,8 @@
           </p:sp>
         </mc:Fallback>
       </mc:AlternateContent>
-      <mc:AlternateContent xmlns:mc="http://schemas.openxmlformats.org/markup-compatibility/2006">
-        <mc:Choice xmlns:a14="http://schemas.microsoft.com/office/drawing/2010/main" Requires="a14">
+      <mc:AlternateContent xmlns:mc="http://schemas.openxmlformats.org/markup-compatibility/2006" xmlns:a14="http://schemas.microsoft.com/office/drawing/2010/main">
+        <mc:Choice Requires="a14">
           <p:sp>
             <p:nvSpPr>
               <p:cNvPr id="44" name="TextBox 43">
@@ -3996,7 +3998,7 @@
                       <m:sSub>
                         <m:sSubPr>
                           <m:ctrlPr>
-                            <a:rPr lang="en-US" altLang="ko-KR" sz="1100" b="0" i="0" dirty="0" smtClean="0">
+                            <a:rPr lang="en-US" altLang="ko-KR" sz="1100" b="0" i="1" dirty="0" smtClean="0">
                               <a:latin typeface="Cambria Math" panose="02040503050406030204" pitchFamily="18" charset="0"/>
                             </a:rPr>
                           </m:ctrlPr>
@@ -4029,7 +4031,7 @@
             </p:txBody>
           </p:sp>
         </mc:Choice>
-        <mc:Fallback>
+        <mc:Fallback xmlns="">
           <p:sp>
             <p:nvSpPr>
               <p:cNvPr id="44" name="TextBox 43">
@@ -4074,8 +4076,8 @@
           </p:sp>
         </mc:Fallback>
       </mc:AlternateContent>
-      <mc:AlternateContent xmlns:mc="http://schemas.openxmlformats.org/markup-compatibility/2006">
-        <mc:Choice xmlns:a14="http://schemas.microsoft.com/office/drawing/2010/main" Requires="a14">
+      <mc:AlternateContent xmlns:mc="http://schemas.openxmlformats.org/markup-compatibility/2006" xmlns:a14="http://schemas.microsoft.com/office/drawing/2010/main">
+        <mc:Choice Requires="a14">
           <p:sp>
             <p:nvSpPr>
               <p:cNvPr id="45" name="TextBox 44">
@@ -4114,7 +4116,7 @@
                       <m:sSub>
                         <m:sSubPr>
                           <m:ctrlPr>
-                            <a:rPr lang="en-US" altLang="ko-KR" sz="1100" b="0" i="0" dirty="0" smtClean="0">
+                            <a:rPr lang="en-US" altLang="ko-KR" sz="1100" b="0" i="1" dirty="0" smtClean="0">
                               <a:latin typeface="Cambria Math" panose="02040503050406030204" pitchFamily="18" charset="0"/>
                             </a:rPr>
                           </m:ctrlPr>
@@ -4147,7 +4149,7 @@
             </p:txBody>
           </p:sp>
         </mc:Choice>
-        <mc:Fallback>
+        <mc:Fallback xmlns="">
           <p:sp>
             <p:nvSpPr>
               <p:cNvPr id="45" name="TextBox 44">
@@ -4192,8 +4194,8 @@
           </p:sp>
         </mc:Fallback>
       </mc:AlternateContent>
-      <mc:AlternateContent xmlns:mc="http://schemas.openxmlformats.org/markup-compatibility/2006">
-        <mc:Choice xmlns:a14="http://schemas.microsoft.com/office/drawing/2010/main" Requires="a14">
+      <mc:AlternateContent xmlns:mc="http://schemas.openxmlformats.org/markup-compatibility/2006" xmlns:a14="http://schemas.microsoft.com/office/drawing/2010/main">
+        <mc:Choice Requires="a14">
           <p:sp>
             <p:nvSpPr>
               <p:cNvPr id="2" name="TextBox 1">
@@ -4243,7 +4245,7 @@
             </p:txBody>
           </p:sp>
         </mc:Choice>
-        <mc:Fallback>
+        <mc:Fallback xmlns="">
           <p:sp>
             <p:nvSpPr>
               <p:cNvPr id="2" name="TextBox 1">
@@ -4288,8 +4290,8 @@
           </p:sp>
         </mc:Fallback>
       </mc:AlternateContent>
-      <mc:AlternateContent xmlns:mc="http://schemas.openxmlformats.org/markup-compatibility/2006">
-        <mc:Choice xmlns:a14="http://schemas.microsoft.com/office/drawing/2010/main" Requires="a14">
+      <mc:AlternateContent xmlns:mc="http://schemas.openxmlformats.org/markup-compatibility/2006" xmlns:a14="http://schemas.microsoft.com/office/drawing/2010/main">
+        <mc:Choice Requires="a14">
           <p:sp>
             <p:nvSpPr>
               <p:cNvPr id="4" name="TextBox 3">
@@ -4339,7 +4341,7 @@
             </p:txBody>
           </p:sp>
         </mc:Choice>
-        <mc:Fallback>
+        <mc:Fallback xmlns="">
           <p:sp>
             <p:nvSpPr>
               <p:cNvPr id="4" name="TextBox 3">
@@ -4384,8 +4386,8 @@
           </p:sp>
         </mc:Fallback>
       </mc:AlternateContent>
-      <mc:AlternateContent xmlns:mc="http://schemas.openxmlformats.org/markup-compatibility/2006">
-        <mc:Choice xmlns:a14="http://schemas.microsoft.com/office/drawing/2010/main" Requires="a14">
+      <mc:AlternateContent xmlns:mc="http://schemas.openxmlformats.org/markup-compatibility/2006" xmlns:a14="http://schemas.microsoft.com/office/drawing/2010/main">
+        <mc:Choice Requires="a14">
           <p:sp>
             <p:nvSpPr>
               <p:cNvPr id="5" name="TextBox 4">
@@ -4465,7 +4467,7 @@
             </p:txBody>
           </p:sp>
         </mc:Choice>
-        <mc:Fallback>
+        <mc:Fallback xmlns="">
           <p:sp>
             <p:nvSpPr>
               <p:cNvPr id="5" name="TextBox 4">
@@ -4793,8 +4795,8 @@
           </a:fontRef>
         </p:style>
       </p:cxnSp>
-      <mc:AlternateContent xmlns:mc="http://schemas.openxmlformats.org/markup-compatibility/2006">
-        <mc:Choice xmlns:a14="http://schemas.microsoft.com/office/drawing/2010/main" Requires="a14">
+      <mc:AlternateContent xmlns:mc="http://schemas.openxmlformats.org/markup-compatibility/2006" xmlns:a14="http://schemas.microsoft.com/office/drawing/2010/main">
+        <mc:Choice Requires="a14">
           <p:sp>
             <p:nvSpPr>
               <p:cNvPr id="42" name="TextBox 41">
@@ -4866,7 +4868,7 @@
             </p:txBody>
           </p:sp>
         </mc:Choice>
-        <mc:Fallback>
+        <mc:Fallback xmlns="">
           <p:sp>
             <p:nvSpPr>
               <p:cNvPr id="42" name="TextBox 41">
@@ -4911,8 +4913,8 @@
           </p:sp>
         </mc:Fallback>
       </mc:AlternateContent>
-      <mc:AlternateContent xmlns:mc="http://schemas.openxmlformats.org/markup-compatibility/2006">
-        <mc:Choice xmlns:a14="http://schemas.microsoft.com/office/drawing/2010/main" Requires="a14">
+      <mc:AlternateContent xmlns:mc="http://schemas.openxmlformats.org/markup-compatibility/2006" xmlns:a14="http://schemas.microsoft.com/office/drawing/2010/main">
+        <mc:Choice Requires="a14">
           <p:sp>
             <p:nvSpPr>
               <p:cNvPr id="43" name="TextBox 42">
@@ -4984,7 +4986,7 @@
             </p:txBody>
           </p:sp>
         </mc:Choice>
-        <mc:Fallback>
+        <mc:Fallback xmlns="">
           <p:sp>
             <p:nvSpPr>
               <p:cNvPr id="43" name="TextBox 42">
@@ -5029,8 +5031,8 @@
           </p:sp>
         </mc:Fallback>
       </mc:AlternateContent>
-      <mc:AlternateContent xmlns:mc="http://schemas.openxmlformats.org/markup-compatibility/2006">
-        <mc:Choice xmlns:a14="http://schemas.microsoft.com/office/drawing/2010/main" Requires="a14">
+      <mc:AlternateContent xmlns:mc="http://schemas.openxmlformats.org/markup-compatibility/2006" xmlns:a14="http://schemas.microsoft.com/office/drawing/2010/main">
+        <mc:Choice Requires="a14">
           <p:sp>
             <p:nvSpPr>
               <p:cNvPr id="44" name="TextBox 43">
@@ -5121,7 +5123,7 @@
             </p:txBody>
           </p:sp>
         </mc:Choice>
-        <mc:Fallback>
+        <mc:Fallback xmlns="">
           <p:sp>
             <p:nvSpPr>
               <p:cNvPr id="44" name="TextBox 43">
@@ -5166,8 +5168,8 @@
           </p:sp>
         </mc:Fallback>
       </mc:AlternateContent>
-      <mc:AlternateContent xmlns:mc="http://schemas.openxmlformats.org/markup-compatibility/2006">
-        <mc:Choice xmlns:a14="http://schemas.microsoft.com/office/drawing/2010/main" Requires="a14">
+      <mc:AlternateContent xmlns:mc="http://schemas.openxmlformats.org/markup-compatibility/2006" xmlns:a14="http://schemas.microsoft.com/office/drawing/2010/main">
+        <mc:Choice Requires="a14">
           <p:sp>
             <p:nvSpPr>
               <p:cNvPr id="45" name="TextBox 44">
@@ -5258,7 +5260,7 @@
             </p:txBody>
           </p:sp>
         </mc:Choice>
-        <mc:Fallback>
+        <mc:Fallback xmlns="">
           <p:sp>
             <p:nvSpPr>
               <p:cNvPr id="45" name="TextBox 44">
@@ -5448,8 +5450,8 @@
           </a:p>
         </p:txBody>
       </p:sp>
-      <mc:AlternateContent xmlns:mc="http://schemas.openxmlformats.org/markup-compatibility/2006">
-        <mc:Choice xmlns:a14="http://schemas.microsoft.com/office/drawing/2010/main" Requires="a14">
+      <mc:AlternateContent xmlns:mc="http://schemas.openxmlformats.org/markup-compatibility/2006" xmlns:a14="http://schemas.microsoft.com/office/drawing/2010/main">
+        <mc:Choice Requires="a14">
           <p:sp>
             <p:nvSpPr>
               <p:cNvPr id="58" name="TextBox 57">
@@ -5529,7 +5531,7 @@
             </p:txBody>
           </p:sp>
         </mc:Choice>
-        <mc:Fallback>
+        <mc:Fallback xmlns="">
           <p:sp>
             <p:nvSpPr>
               <p:cNvPr id="58" name="TextBox 57">
@@ -5574,8 +5576,8 @@
           </p:sp>
         </mc:Fallback>
       </mc:AlternateContent>
-      <mc:AlternateContent xmlns:mc="http://schemas.openxmlformats.org/markup-compatibility/2006">
-        <mc:Choice xmlns:a14="http://schemas.microsoft.com/office/drawing/2010/main" Requires="a14">
+      <mc:AlternateContent xmlns:mc="http://schemas.openxmlformats.org/markup-compatibility/2006" xmlns:a14="http://schemas.microsoft.com/office/drawing/2010/main">
+        <mc:Choice Requires="a14">
           <p:sp>
             <p:nvSpPr>
               <p:cNvPr id="59" name="TextBox 58">
@@ -5625,7 +5627,7 @@
             </p:txBody>
           </p:sp>
         </mc:Choice>
-        <mc:Fallback>
+        <mc:Fallback xmlns="">
           <p:sp>
             <p:nvSpPr>
               <p:cNvPr id="59" name="TextBox 58">
@@ -5670,8 +5672,8 @@
           </p:sp>
         </mc:Fallback>
       </mc:AlternateContent>
-      <mc:AlternateContent xmlns:mc="http://schemas.openxmlformats.org/markup-compatibility/2006">
-        <mc:Choice xmlns:a14="http://schemas.microsoft.com/office/drawing/2010/main" Requires="a14">
+      <mc:AlternateContent xmlns:mc="http://schemas.openxmlformats.org/markup-compatibility/2006" xmlns:a14="http://schemas.microsoft.com/office/drawing/2010/main">
+        <mc:Choice Requires="a14">
           <p:sp>
             <p:nvSpPr>
               <p:cNvPr id="60" name="TextBox 59">
@@ -5721,7 +5723,7 @@
             </p:txBody>
           </p:sp>
         </mc:Choice>
-        <mc:Fallback>
+        <mc:Fallback xmlns="">
           <p:sp>
             <p:nvSpPr>
               <p:cNvPr id="60" name="TextBox 59">
@@ -5770,6 +5772,4531 @@
     <p:extLst>
       <p:ext uri="{BB962C8B-B14F-4D97-AF65-F5344CB8AC3E}">
         <p14:creationId xmlns:p14="http://schemas.microsoft.com/office/powerpoint/2010/main" val="3418273621"/>
+      </p:ext>
+    </p:extLst>
+  </p:cSld>
+  <p:clrMapOvr>
+    <a:masterClrMapping/>
+  </p:clrMapOvr>
+</p:sld>
+</file>
+
+<file path=ppt/slides/slide3.xml><?xml version="1.0" encoding="utf-8"?>
+<p:sld xmlns:a="http://schemas.openxmlformats.org/drawingml/2006/main" xmlns:r="http://schemas.openxmlformats.org/officeDocument/2006/relationships" xmlns:p="http://schemas.openxmlformats.org/presentationml/2006/main">
+  <p:cSld>
+    <p:spTree>
+      <p:nvGrpSpPr>
+        <p:cNvPr id="1" name="">
+          <a:extLst>
+            <a:ext uri="{FF2B5EF4-FFF2-40B4-BE49-F238E27FC236}">
+              <a16:creationId xmlns:a16="http://schemas.microsoft.com/office/drawing/2014/main" id="{A3102B3E-4DEB-BD75-D261-063BE423903D}"/>
+            </a:ext>
+          </a:extLst>
+        </p:cNvPr>
+        <p:cNvGrpSpPr/>
+        <p:nvPr/>
+      </p:nvGrpSpPr>
+      <p:grpSpPr>
+        <a:xfrm>
+          <a:off x="0" y="0"/>
+          <a:ext cx="0" cy="0"/>
+          <a:chOff x="0" y="0"/>
+          <a:chExt cx="0" cy="0"/>
+        </a:xfrm>
+      </p:grpSpPr>
+      <p:cxnSp>
+        <p:nvCxnSpPr>
+          <p:cNvPr id="8" name="직선 화살표 연결선 7">
+            <a:extLst>
+              <a:ext uri="{FF2B5EF4-FFF2-40B4-BE49-F238E27FC236}">
+                <a16:creationId xmlns:a16="http://schemas.microsoft.com/office/drawing/2014/main" id="{1E43363E-8E3A-98D1-D6E9-8E2FF83AF52B}"/>
+              </a:ext>
+            </a:extLst>
+          </p:cNvPr>
+          <p:cNvCxnSpPr>
+            <a:cxnSpLocks/>
+          </p:cNvCxnSpPr>
+          <p:nvPr/>
+        </p:nvCxnSpPr>
+        <p:spPr>
+          <a:xfrm>
+            <a:off x="628650" y="3990973"/>
+            <a:ext cx="6715125" cy="0"/>
+          </a:xfrm>
+          <a:prstGeom prst="straightConnector1">
+            <a:avLst/>
+          </a:prstGeom>
+          <a:ln w="28575">
+            <a:solidFill>
+              <a:schemeClr val="tx1"/>
+            </a:solidFill>
+            <a:tailEnd type="triangle"/>
+          </a:ln>
+        </p:spPr>
+        <p:style>
+          <a:lnRef idx="1">
+            <a:schemeClr val="accent1"/>
+          </a:lnRef>
+          <a:fillRef idx="0">
+            <a:schemeClr val="accent1"/>
+          </a:fillRef>
+          <a:effectRef idx="0">
+            <a:schemeClr val="accent1"/>
+          </a:effectRef>
+          <a:fontRef idx="minor">
+            <a:schemeClr val="tx1"/>
+          </a:fontRef>
+        </p:style>
+      </p:cxnSp>
+      <p:cxnSp>
+        <p:nvCxnSpPr>
+          <p:cNvPr id="3" name="직선 화살표 연결선 2">
+            <a:extLst>
+              <a:ext uri="{FF2B5EF4-FFF2-40B4-BE49-F238E27FC236}">
+                <a16:creationId xmlns:a16="http://schemas.microsoft.com/office/drawing/2014/main" id="{63D4FD13-1603-14E4-E188-DA393C6C6E90}"/>
+              </a:ext>
+            </a:extLst>
+          </p:cNvPr>
+          <p:cNvCxnSpPr>
+            <a:cxnSpLocks/>
+          </p:cNvCxnSpPr>
+          <p:nvPr/>
+        </p:nvCxnSpPr>
+        <p:spPr>
+          <a:xfrm flipV="1">
+            <a:off x="1285875" y="419100"/>
+            <a:ext cx="0" cy="4171950"/>
+          </a:xfrm>
+          <a:prstGeom prst="straightConnector1">
+            <a:avLst/>
+          </a:prstGeom>
+          <a:ln w="28575">
+            <a:solidFill>
+              <a:schemeClr val="tx1"/>
+            </a:solidFill>
+            <a:tailEnd type="triangle"/>
+          </a:ln>
+        </p:spPr>
+        <p:style>
+          <a:lnRef idx="1">
+            <a:schemeClr val="accent1"/>
+          </a:lnRef>
+          <a:fillRef idx="0">
+            <a:schemeClr val="accent1"/>
+          </a:fillRef>
+          <a:effectRef idx="0">
+            <a:schemeClr val="accent1"/>
+          </a:effectRef>
+          <a:fontRef idx="minor">
+            <a:schemeClr val="tx1"/>
+          </a:fontRef>
+        </p:style>
+      </p:cxnSp>
+      <mc:AlternateContent xmlns:mc="http://schemas.openxmlformats.org/markup-compatibility/2006">
+        <mc:Choice xmlns:a14="http://schemas.microsoft.com/office/drawing/2010/main" Requires="a14">
+          <p:sp>
+            <p:nvSpPr>
+              <p:cNvPr id="42" name="TextBox 41">
+                <a:extLst>
+                  <a:ext uri="{FF2B5EF4-FFF2-40B4-BE49-F238E27FC236}">
+                    <a16:creationId xmlns:a16="http://schemas.microsoft.com/office/drawing/2014/main" id="{C8FDAB16-4BC0-4669-CBED-6C26351B4F4A}"/>
+                  </a:ext>
+                </a:extLst>
+              </p:cNvPr>
+              <p:cNvSpPr txBox="1"/>
+              <p:nvPr/>
+            </p:nvSpPr>
+            <p:spPr>
+              <a:xfrm>
+                <a:off x="3879056" y="3965096"/>
+                <a:ext cx="414336" cy="277255"/>
+              </a:xfrm>
+              <a:prstGeom prst="rect">
+                <a:avLst/>
+              </a:prstGeom>
+              <a:noFill/>
+            </p:spPr>
+            <p:txBody>
+              <a:bodyPr wrap="square" rtlCol="0">
+                <a:spAutoFit/>
+              </a:bodyPr>
+              <a:lstStyle/>
+              <a:p>
+                <a:pPr/>
+                <a14:m>
+                  <m:oMathPara xmlns:m="http://schemas.openxmlformats.org/officeDocument/2006/math">
+                    <m:oMathParaPr>
+                      <m:jc m:val="centerGroup"/>
+                    </m:oMathParaPr>
+                    <m:oMath xmlns:m="http://schemas.openxmlformats.org/officeDocument/2006/math">
+                      <m:sSub>
+                        <m:sSubPr>
+                          <m:ctrlPr>
+                            <a:rPr lang="en-US" altLang="ko-KR" sz="1100" b="0" i="1" dirty="0" smtClean="0">
+                              <a:latin typeface="Cambria Math" panose="02040503050406030204" pitchFamily="18" charset="0"/>
+                            </a:rPr>
+                          </m:ctrlPr>
+                        </m:sSubPr>
+                        <m:e>
+                          <m:r>
+                            <a:rPr lang="en-US" altLang="ko-KR" sz="1100" i="1" dirty="0" smtClean="0">
+                              <a:latin typeface="Cambria Math" panose="02040503050406030204" pitchFamily="18" charset="0"/>
+                            </a:rPr>
+                            <m:t>𝑥</m:t>
+                          </m:r>
+                        </m:e>
+                        <m:sub>
+                          <m:r>
+                            <m:rPr>
+                              <m:sty m:val="p"/>
+                            </m:rPr>
+                            <a:rPr lang="en-US" altLang="ko-KR" sz="1100" b="0" i="0" dirty="0" smtClean="0">
+                              <a:latin typeface="Cambria Math" panose="02040503050406030204" pitchFamily="18" charset="0"/>
+                            </a:rPr>
+                            <m:t>j</m:t>
+                          </m:r>
+                        </m:sub>
+                      </m:sSub>
+                    </m:oMath>
+                  </m:oMathPara>
+                </a14:m>
+                <a:endParaRPr lang="ko-KR" altLang="en-US" sz="1100" dirty="0"/>
+              </a:p>
+            </p:txBody>
+          </p:sp>
+        </mc:Choice>
+        <mc:Fallback>
+          <p:sp>
+            <p:nvSpPr>
+              <p:cNvPr id="42" name="TextBox 41">
+                <a:extLst>
+                  <a:ext uri="{FF2B5EF4-FFF2-40B4-BE49-F238E27FC236}">
+                    <a16:creationId xmlns:a16="http://schemas.microsoft.com/office/drawing/2014/main" id="{C8FDAB16-4BC0-4669-CBED-6C26351B4F4A}"/>
+                  </a:ext>
+                </a:extLst>
+              </p:cNvPr>
+              <p:cNvSpPr txBox="1">
+                <a:spLocks noRot="1" noChangeAspect="1" noMove="1" noResize="1" noEditPoints="1" noAdjustHandles="1" noChangeArrowheads="1" noChangeShapeType="1" noTextEdit="1"/>
+              </p:cNvSpPr>
+              <p:nvPr/>
+            </p:nvSpPr>
+            <p:spPr>
+              <a:xfrm>
+                <a:off x="3879056" y="3965096"/>
+                <a:ext cx="414336" cy="277255"/>
+              </a:xfrm>
+              <a:prstGeom prst="rect">
+                <a:avLst/>
+              </a:prstGeom>
+              <a:blipFill>
+                <a:blip r:embed="rId2"/>
+                <a:stretch>
+                  <a:fillRect b="-2174"/>
+                </a:stretch>
+              </a:blipFill>
+            </p:spPr>
+            <p:txBody>
+              <a:bodyPr/>
+              <a:lstStyle/>
+              <a:p>
+                <a:r>
+                  <a:rPr lang="ko-KR" altLang="en-US">
+                    <a:noFill/>
+                  </a:rPr>
+                  <a:t> </a:t>
+                </a:r>
+              </a:p>
+            </p:txBody>
+          </p:sp>
+        </mc:Fallback>
+      </mc:AlternateContent>
+      <mc:AlternateContent xmlns:mc="http://schemas.openxmlformats.org/markup-compatibility/2006">
+        <mc:Choice xmlns:a14="http://schemas.microsoft.com/office/drawing/2010/main" Requires="a14">
+          <p:sp>
+            <p:nvSpPr>
+              <p:cNvPr id="43" name="TextBox 42">
+                <a:extLst>
+                  <a:ext uri="{FF2B5EF4-FFF2-40B4-BE49-F238E27FC236}">
+                    <a16:creationId xmlns:a16="http://schemas.microsoft.com/office/drawing/2014/main" id="{9AD153DE-2615-D35D-B1EF-282BEA577EA8}"/>
+                  </a:ext>
+                </a:extLst>
+              </p:cNvPr>
+              <p:cNvSpPr txBox="1"/>
+              <p:nvPr/>
+            </p:nvSpPr>
+            <p:spPr>
+              <a:xfrm>
+                <a:off x="2990850" y="3962398"/>
+                <a:ext cx="414336" cy="277255"/>
+              </a:xfrm>
+              <a:prstGeom prst="rect">
+                <a:avLst/>
+              </a:prstGeom>
+              <a:noFill/>
+            </p:spPr>
+            <p:txBody>
+              <a:bodyPr wrap="square" rtlCol="0">
+                <a:spAutoFit/>
+              </a:bodyPr>
+              <a:lstStyle/>
+              <a:p>
+                <a:pPr/>
+                <a14:m>
+                  <m:oMathPara xmlns:m="http://schemas.openxmlformats.org/officeDocument/2006/math">
+                    <m:oMathParaPr>
+                      <m:jc m:val="centerGroup"/>
+                    </m:oMathParaPr>
+                    <m:oMath xmlns:m="http://schemas.openxmlformats.org/officeDocument/2006/math">
+                      <m:sSub>
+                        <m:sSubPr>
+                          <m:ctrlPr>
+                            <a:rPr lang="en-US" altLang="ko-KR" sz="1100" b="0" i="1" dirty="0" smtClean="0">
+                              <a:latin typeface="Cambria Math" panose="02040503050406030204" pitchFamily="18" charset="0"/>
+                            </a:rPr>
+                          </m:ctrlPr>
+                        </m:sSubPr>
+                        <m:e>
+                          <m:r>
+                            <a:rPr lang="en-US" altLang="ko-KR" sz="1100" i="1" dirty="0" smtClean="0">
+                              <a:latin typeface="Cambria Math" panose="02040503050406030204" pitchFamily="18" charset="0"/>
+                            </a:rPr>
+                            <m:t>𝑥</m:t>
+                          </m:r>
+                        </m:e>
+                        <m:sub>
+                          <m:r>
+                            <m:rPr>
+                              <m:sty m:val="p"/>
+                            </m:rPr>
+                            <a:rPr lang="en-US" altLang="ko-KR" sz="1100" b="0" i="0" dirty="0" smtClean="0">
+                              <a:latin typeface="Cambria Math" panose="02040503050406030204" pitchFamily="18" charset="0"/>
+                            </a:rPr>
+                            <m:t>j</m:t>
+                          </m:r>
+                          <m:r>
+                            <a:rPr lang="en-US" altLang="ko-KR" sz="1100" b="0" i="0" dirty="0" smtClean="0">
+                              <a:latin typeface="Cambria Math" panose="02040503050406030204" pitchFamily="18" charset="0"/>
+                            </a:rPr>
+                            <m:t>−1</m:t>
+                          </m:r>
+                        </m:sub>
+                      </m:sSub>
+                    </m:oMath>
+                  </m:oMathPara>
+                </a14:m>
+                <a:endParaRPr lang="ko-KR" altLang="en-US" sz="1100" dirty="0"/>
+              </a:p>
+            </p:txBody>
+          </p:sp>
+        </mc:Choice>
+        <mc:Fallback>
+          <p:sp>
+            <p:nvSpPr>
+              <p:cNvPr id="43" name="TextBox 42">
+                <a:extLst>
+                  <a:ext uri="{FF2B5EF4-FFF2-40B4-BE49-F238E27FC236}">
+                    <a16:creationId xmlns:a16="http://schemas.microsoft.com/office/drawing/2014/main" id="{9AD153DE-2615-D35D-B1EF-282BEA577EA8}"/>
+                  </a:ext>
+                </a:extLst>
+              </p:cNvPr>
+              <p:cNvSpPr txBox="1">
+                <a:spLocks noRot="1" noChangeAspect="1" noMove="1" noResize="1" noEditPoints="1" noAdjustHandles="1" noChangeArrowheads="1" noChangeShapeType="1" noTextEdit="1"/>
+              </p:cNvSpPr>
+              <p:nvPr/>
+            </p:nvSpPr>
+            <p:spPr>
+              <a:xfrm>
+                <a:off x="2990850" y="3962398"/>
+                <a:ext cx="414336" cy="277255"/>
+              </a:xfrm>
+              <a:prstGeom prst="rect">
+                <a:avLst/>
+              </a:prstGeom>
+              <a:blipFill>
+                <a:blip r:embed="rId3"/>
+                <a:stretch>
+                  <a:fillRect b="-4444"/>
+                </a:stretch>
+              </a:blipFill>
+            </p:spPr>
+            <p:txBody>
+              <a:bodyPr/>
+              <a:lstStyle/>
+              <a:p>
+                <a:r>
+                  <a:rPr lang="ko-KR" altLang="en-US">
+                    <a:noFill/>
+                  </a:rPr>
+                  <a:t> </a:t>
+                </a:r>
+              </a:p>
+            </p:txBody>
+          </p:sp>
+        </mc:Fallback>
+      </mc:AlternateContent>
+      <mc:AlternateContent xmlns:mc="http://schemas.openxmlformats.org/markup-compatibility/2006">
+        <mc:Choice xmlns:a14="http://schemas.microsoft.com/office/drawing/2010/main" Requires="a14">
+          <p:sp>
+            <p:nvSpPr>
+              <p:cNvPr id="45" name="TextBox 44">
+                <a:extLst>
+                  <a:ext uri="{FF2B5EF4-FFF2-40B4-BE49-F238E27FC236}">
+                    <a16:creationId xmlns:a16="http://schemas.microsoft.com/office/drawing/2014/main" id="{D0BD377E-1ED5-C89E-AE7B-0D5B7B20E6BF}"/>
+                  </a:ext>
+                </a:extLst>
+              </p:cNvPr>
+              <p:cNvSpPr txBox="1"/>
+              <p:nvPr/>
+            </p:nvSpPr>
+            <p:spPr>
+              <a:xfrm>
+                <a:off x="3405186" y="2995847"/>
+                <a:ext cx="414336" cy="277255"/>
+              </a:xfrm>
+              <a:prstGeom prst="rect">
+                <a:avLst/>
+              </a:prstGeom>
+              <a:noFill/>
+            </p:spPr>
+            <p:txBody>
+              <a:bodyPr wrap="square" rtlCol="0">
+                <a:spAutoFit/>
+              </a:bodyPr>
+              <a:lstStyle/>
+              <a:p>
+                <a:pPr/>
+                <a14:m>
+                  <m:oMathPara xmlns:m="http://schemas.openxmlformats.org/officeDocument/2006/math">
+                    <m:oMathParaPr>
+                      <m:jc m:val="centerGroup"/>
+                    </m:oMathParaPr>
+                    <m:oMath xmlns:m="http://schemas.openxmlformats.org/officeDocument/2006/math">
+                      <m:sSub>
+                        <m:sSubPr>
+                          <m:ctrlPr>
+                            <a:rPr lang="en-US" altLang="ko-KR" sz="1100" b="0" i="1" dirty="0" smtClean="0">
+                              <a:latin typeface="Cambria Math" panose="02040503050406030204" pitchFamily="18" charset="0"/>
+                            </a:rPr>
+                          </m:ctrlPr>
+                        </m:sSubPr>
+                        <m:e>
+                          <m:r>
+                            <a:rPr lang="en-US" altLang="ko-KR" sz="1100" b="0" i="1" dirty="0" smtClean="0">
+                              <a:latin typeface="Cambria Math" panose="02040503050406030204" pitchFamily="18" charset="0"/>
+                            </a:rPr>
+                            <m:t>𝑀</m:t>
+                          </m:r>
+                        </m:e>
+                        <m:sub>
+                          <m:r>
+                            <m:rPr>
+                              <m:sty m:val="p"/>
+                            </m:rPr>
+                            <a:rPr lang="en-US" altLang="ko-KR" sz="1100" b="0" i="0" dirty="0" smtClean="0">
+                              <a:latin typeface="Cambria Math" panose="02040503050406030204" pitchFamily="18" charset="0"/>
+                            </a:rPr>
+                            <m:t>j</m:t>
+                          </m:r>
+                        </m:sub>
+                      </m:sSub>
+                    </m:oMath>
+                  </m:oMathPara>
+                </a14:m>
+                <a:endParaRPr lang="ko-KR" altLang="en-US" sz="1100" dirty="0"/>
+              </a:p>
+            </p:txBody>
+          </p:sp>
+        </mc:Choice>
+        <mc:Fallback>
+          <p:sp>
+            <p:nvSpPr>
+              <p:cNvPr id="45" name="TextBox 44">
+                <a:extLst>
+                  <a:ext uri="{FF2B5EF4-FFF2-40B4-BE49-F238E27FC236}">
+                    <a16:creationId xmlns:a16="http://schemas.microsoft.com/office/drawing/2014/main" id="{D0BD377E-1ED5-C89E-AE7B-0D5B7B20E6BF}"/>
+                  </a:ext>
+                </a:extLst>
+              </p:cNvPr>
+              <p:cNvSpPr txBox="1">
+                <a:spLocks noRot="1" noChangeAspect="1" noMove="1" noResize="1" noEditPoints="1" noAdjustHandles="1" noChangeArrowheads="1" noChangeShapeType="1" noTextEdit="1"/>
+              </p:cNvSpPr>
+              <p:nvPr/>
+            </p:nvSpPr>
+            <p:spPr>
+              <a:xfrm>
+                <a:off x="3405186" y="2995847"/>
+                <a:ext cx="414336" cy="277255"/>
+              </a:xfrm>
+              <a:prstGeom prst="rect">
+                <a:avLst/>
+              </a:prstGeom>
+              <a:blipFill>
+                <a:blip r:embed="rId4"/>
+                <a:stretch>
+                  <a:fillRect b="-2174"/>
+                </a:stretch>
+              </a:blipFill>
+            </p:spPr>
+            <p:txBody>
+              <a:bodyPr/>
+              <a:lstStyle/>
+              <a:p>
+                <a:r>
+                  <a:rPr lang="ko-KR" altLang="en-US">
+                    <a:noFill/>
+                  </a:rPr>
+                  <a:t> </a:t>
+                </a:r>
+              </a:p>
+            </p:txBody>
+          </p:sp>
+        </mc:Fallback>
+      </mc:AlternateContent>
+      <mc:AlternateContent xmlns:mc="http://schemas.openxmlformats.org/markup-compatibility/2006">
+        <mc:Choice xmlns:a14="http://schemas.microsoft.com/office/drawing/2010/main" Requires="a14">
+          <p:sp>
+            <p:nvSpPr>
+              <p:cNvPr id="2" name="TextBox 1">
+                <a:extLst>
+                  <a:ext uri="{FF2B5EF4-FFF2-40B4-BE49-F238E27FC236}">
+                    <a16:creationId xmlns:a16="http://schemas.microsoft.com/office/drawing/2014/main" id="{EFEB07E6-CD78-6F50-595D-A5D4E38E6409}"/>
+                  </a:ext>
+                </a:extLst>
+              </p:cNvPr>
+              <p:cNvSpPr txBox="1"/>
+              <p:nvPr/>
+            </p:nvSpPr>
+            <p:spPr>
+              <a:xfrm>
+                <a:off x="7188214" y="3970220"/>
+                <a:ext cx="338138" cy="261610"/>
+              </a:xfrm>
+              <a:prstGeom prst="rect">
+                <a:avLst/>
+              </a:prstGeom>
+              <a:noFill/>
+            </p:spPr>
+            <p:txBody>
+              <a:bodyPr wrap="square" rtlCol="0">
+                <a:spAutoFit/>
+              </a:bodyPr>
+              <a:lstStyle/>
+              <a:p>
+                <a:pPr/>
+                <a14:m>
+                  <m:oMathPara xmlns:m="http://schemas.openxmlformats.org/officeDocument/2006/math">
+                    <m:oMathParaPr>
+                      <m:jc m:val="centerGroup"/>
+                    </m:oMathParaPr>
+                    <m:oMath xmlns:m="http://schemas.openxmlformats.org/officeDocument/2006/math">
+                      <m:r>
+                        <a:rPr lang="en-US" altLang="ko-KR" sz="1100" i="1" dirty="0" smtClean="0">
+                          <a:latin typeface="Cambria Math" panose="02040503050406030204" pitchFamily="18" charset="0"/>
+                        </a:rPr>
+                        <m:t>𝑥</m:t>
+                      </m:r>
+                    </m:oMath>
+                  </m:oMathPara>
+                </a14:m>
+                <a:endParaRPr lang="ko-KR" altLang="en-US" sz="1100" dirty="0"/>
+              </a:p>
+            </p:txBody>
+          </p:sp>
+        </mc:Choice>
+        <mc:Fallback>
+          <p:sp>
+            <p:nvSpPr>
+              <p:cNvPr id="2" name="TextBox 1">
+                <a:extLst>
+                  <a:ext uri="{FF2B5EF4-FFF2-40B4-BE49-F238E27FC236}">
+                    <a16:creationId xmlns:a16="http://schemas.microsoft.com/office/drawing/2014/main" id="{EFEB07E6-CD78-6F50-595D-A5D4E38E6409}"/>
+                  </a:ext>
+                </a:extLst>
+              </p:cNvPr>
+              <p:cNvSpPr txBox="1">
+                <a:spLocks noRot="1" noChangeAspect="1" noMove="1" noResize="1" noEditPoints="1" noAdjustHandles="1" noChangeArrowheads="1" noChangeShapeType="1" noTextEdit="1"/>
+              </p:cNvSpPr>
+              <p:nvPr/>
+            </p:nvSpPr>
+            <p:spPr>
+              <a:xfrm>
+                <a:off x="7188214" y="3970220"/>
+                <a:ext cx="338138" cy="261610"/>
+              </a:xfrm>
+              <a:prstGeom prst="rect">
+                <a:avLst/>
+              </a:prstGeom>
+              <a:blipFill>
+                <a:blip r:embed="rId5"/>
+                <a:stretch>
+                  <a:fillRect/>
+                </a:stretch>
+              </a:blipFill>
+            </p:spPr>
+            <p:txBody>
+              <a:bodyPr/>
+              <a:lstStyle/>
+              <a:p>
+                <a:r>
+                  <a:rPr lang="ko-KR" altLang="en-US">
+                    <a:noFill/>
+                  </a:rPr>
+                  <a:t> </a:t>
+                </a:r>
+              </a:p>
+            </p:txBody>
+          </p:sp>
+        </mc:Fallback>
+      </mc:AlternateContent>
+      <mc:AlternateContent xmlns:mc="http://schemas.openxmlformats.org/markup-compatibility/2006">
+        <mc:Choice xmlns:a14="http://schemas.microsoft.com/office/drawing/2010/main" Requires="a14">
+          <p:sp>
+            <p:nvSpPr>
+              <p:cNvPr id="4" name="TextBox 3">
+                <a:extLst>
+                  <a:ext uri="{FF2B5EF4-FFF2-40B4-BE49-F238E27FC236}">
+                    <a16:creationId xmlns:a16="http://schemas.microsoft.com/office/drawing/2014/main" id="{3B89A7CC-2C7B-834B-1BF8-11B85DDCBFB1}"/>
+                  </a:ext>
+                </a:extLst>
+              </p:cNvPr>
+              <p:cNvSpPr txBox="1"/>
+              <p:nvPr/>
+            </p:nvSpPr>
+            <p:spPr>
+              <a:xfrm>
+                <a:off x="988219" y="367040"/>
+                <a:ext cx="338138" cy="261610"/>
+              </a:xfrm>
+              <a:prstGeom prst="rect">
+                <a:avLst/>
+              </a:prstGeom>
+              <a:noFill/>
+            </p:spPr>
+            <p:txBody>
+              <a:bodyPr wrap="square" rtlCol="0">
+                <a:spAutoFit/>
+              </a:bodyPr>
+              <a:lstStyle/>
+              <a:p>
+                <a:pPr/>
+                <a14:m>
+                  <m:oMathPara xmlns:m="http://schemas.openxmlformats.org/officeDocument/2006/math">
+                    <m:oMathParaPr>
+                      <m:jc m:val="centerGroup"/>
+                    </m:oMathParaPr>
+                    <m:oMath xmlns:m="http://schemas.openxmlformats.org/officeDocument/2006/math">
+                      <m:r>
+                        <a:rPr lang="en-US" altLang="ko-KR" sz="1100" b="0" i="1" dirty="0" smtClean="0">
+                          <a:latin typeface="Cambria Math" panose="02040503050406030204" pitchFamily="18" charset="0"/>
+                        </a:rPr>
+                        <m:t>𝑦</m:t>
+                      </m:r>
+                    </m:oMath>
+                  </m:oMathPara>
+                </a14:m>
+                <a:endParaRPr lang="ko-KR" altLang="en-US" sz="1100" dirty="0"/>
+              </a:p>
+            </p:txBody>
+          </p:sp>
+        </mc:Choice>
+        <mc:Fallback>
+          <p:sp>
+            <p:nvSpPr>
+              <p:cNvPr id="4" name="TextBox 3">
+                <a:extLst>
+                  <a:ext uri="{FF2B5EF4-FFF2-40B4-BE49-F238E27FC236}">
+                    <a16:creationId xmlns:a16="http://schemas.microsoft.com/office/drawing/2014/main" id="{3B89A7CC-2C7B-834B-1BF8-11B85DDCBFB1}"/>
+                  </a:ext>
+                </a:extLst>
+              </p:cNvPr>
+              <p:cNvSpPr txBox="1">
+                <a:spLocks noRot="1" noChangeAspect="1" noMove="1" noResize="1" noEditPoints="1" noAdjustHandles="1" noChangeArrowheads="1" noChangeShapeType="1" noTextEdit="1"/>
+              </p:cNvSpPr>
+              <p:nvPr/>
+            </p:nvSpPr>
+            <p:spPr>
+              <a:xfrm>
+                <a:off x="988219" y="367040"/>
+                <a:ext cx="338138" cy="261610"/>
+              </a:xfrm>
+              <a:prstGeom prst="rect">
+                <a:avLst/>
+              </a:prstGeom>
+              <a:blipFill>
+                <a:blip r:embed="rId6"/>
+                <a:stretch>
+                  <a:fillRect/>
+                </a:stretch>
+              </a:blipFill>
+            </p:spPr>
+            <p:txBody>
+              <a:bodyPr/>
+              <a:lstStyle/>
+              <a:p>
+                <a:r>
+                  <a:rPr lang="ko-KR" altLang="en-US">
+                    <a:noFill/>
+                  </a:rPr>
+                  <a:t> </a:t>
+                </a:r>
+              </a:p>
+            </p:txBody>
+          </p:sp>
+        </mc:Fallback>
+      </mc:AlternateContent>
+      <mc:AlternateContent xmlns:mc="http://schemas.openxmlformats.org/markup-compatibility/2006">
+        <mc:Choice xmlns:a14="http://schemas.microsoft.com/office/drawing/2010/main" Requires="a14">
+          <p:sp>
+            <p:nvSpPr>
+              <p:cNvPr id="5" name="TextBox 4">
+                <a:extLst>
+                  <a:ext uri="{FF2B5EF4-FFF2-40B4-BE49-F238E27FC236}">
+                    <a16:creationId xmlns:a16="http://schemas.microsoft.com/office/drawing/2014/main" id="{5475FDE6-0A39-4AF6-C41F-9C00F74001A0}"/>
+                  </a:ext>
+                </a:extLst>
+              </p:cNvPr>
+              <p:cNvSpPr txBox="1"/>
+              <p:nvPr/>
+            </p:nvSpPr>
+            <p:spPr>
+              <a:xfrm>
+                <a:off x="6185517" y="782962"/>
+                <a:ext cx="759617" cy="261610"/>
+              </a:xfrm>
+              <a:prstGeom prst="rect">
+                <a:avLst/>
+              </a:prstGeom>
+              <a:noFill/>
+            </p:spPr>
+            <p:txBody>
+              <a:bodyPr wrap="square" rtlCol="0">
+                <a:spAutoFit/>
+              </a:bodyPr>
+              <a:lstStyle/>
+              <a:p>
+                <a:pPr/>
+                <a14:m>
+                  <m:oMathPara xmlns:m="http://schemas.openxmlformats.org/officeDocument/2006/math">
+                    <m:oMathParaPr>
+                      <m:jc m:val="centerGroup"/>
+                    </m:oMathParaPr>
+                    <m:oMath xmlns:m="http://schemas.openxmlformats.org/officeDocument/2006/math">
+                      <m:r>
+                        <a:rPr lang="en-US" altLang="ko-KR" sz="1100" b="0" i="1" dirty="0" smtClean="0">
+                          <a:latin typeface="Cambria Math" panose="02040503050406030204" pitchFamily="18" charset="0"/>
+                        </a:rPr>
+                        <m:t>𝑦</m:t>
+                      </m:r>
+                      <m:r>
+                        <a:rPr lang="en-US" altLang="ko-KR" sz="1100" b="0" i="1" dirty="0" smtClean="0">
+                          <a:latin typeface="Cambria Math" panose="02040503050406030204" pitchFamily="18" charset="0"/>
+                        </a:rPr>
+                        <m:t>=</m:t>
+                      </m:r>
+                      <m:r>
+                        <a:rPr lang="en-US" altLang="ko-KR" sz="1100" b="0" i="1" dirty="0" smtClean="0">
+                          <a:latin typeface="Cambria Math" panose="02040503050406030204" pitchFamily="18" charset="0"/>
+                        </a:rPr>
+                        <m:t>𝑓</m:t>
+                      </m:r>
+                      <m:r>
+                        <a:rPr lang="en-US" altLang="ko-KR" sz="1100" b="0" i="1" dirty="0" smtClean="0">
+                          <a:latin typeface="Cambria Math" panose="02040503050406030204" pitchFamily="18" charset="0"/>
+                        </a:rPr>
+                        <m:t>(</m:t>
+                      </m:r>
+                      <m:r>
+                        <a:rPr lang="en-US" altLang="ko-KR" sz="1100" b="0" i="1" dirty="0" smtClean="0">
+                          <a:latin typeface="Cambria Math" panose="02040503050406030204" pitchFamily="18" charset="0"/>
+                        </a:rPr>
+                        <m:t>𝑥</m:t>
+                      </m:r>
+                      <m:r>
+                        <a:rPr lang="en-US" altLang="ko-KR" sz="1100" b="0" i="1" dirty="0" smtClean="0">
+                          <a:latin typeface="Cambria Math" panose="02040503050406030204" pitchFamily="18" charset="0"/>
+                        </a:rPr>
+                        <m:t>)</m:t>
+                      </m:r>
+                    </m:oMath>
+                  </m:oMathPara>
+                </a14:m>
+                <a:endParaRPr lang="ko-KR" altLang="en-US" sz="1100" dirty="0"/>
+              </a:p>
+            </p:txBody>
+          </p:sp>
+        </mc:Choice>
+        <mc:Fallback>
+          <p:sp>
+            <p:nvSpPr>
+              <p:cNvPr id="5" name="TextBox 4">
+                <a:extLst>
+                  <a:ext uri="{FF2B5EF4-FFF2-40B4-BE49-F238E27FC236}">
+                    <a16:creationId xmlns:a16="http://schemas.microsoft.com/office/drawing/2014/main" id="{5475FDE6-0A39-4AF6-C41F-9C00F74001A0}"/>
+                  </a:ext>
+                </a:extLst>
+              </p:cNvPr>
+              <p:cNvSpPr txBox="1">
+                <a:spLocks noRot="1" noChangeAspect="1" noMove="1" noResize="1" noEditPoints="1" noAdjustHandles="1" noChangeArrowheads="1" noChangeShapeType="1" noTextEdit="1"/>
+              </p:cNvSpPr>
+              <p:nvPr/>
+            </p:nvSpPr>
+            <p:spPr>
+              <a:xfrm>
+                <a:off x="6185517" y="782962"/>
+                <a:ext cx="759617" cy="261610"/>
+              </a:xfrm>
+              <a:prstGeom prst="rect">
+                <a:avLst/>
+              </a:prstGeom>
+              <a:blipFill>
+                <a:blip r:embed="rId7"/>
+                <a:stretch>
+                  <a:fillRect b="-6977"/>
+                </a:stretch>
+              </a:blipFill>
+            </p:spPr>
+            <p:txBody>
+              <a:bodyPr/>
+              <a:lstStyle/>
+              <a:p>
+                <a:r>
+                  <a:rPr lang="ko-KR" altLang="en-US">
+                    <a:noFill/>
+                  </a:rPr>
+                  <a:t> </a:t>
+                </a:r>
+              </a:p>
+            </p:txBody>
+          </p:sp>
+        </mc:Fallback>
+      </mc:AlternateContent>
+      <p:sp>
+        <p:nvSpPr>
+          <p:cNvPr id="7" name="자유형: 도형 6">
+            <a:extLst>
+              <a:ext uri="{FF2B5EF4-FFF2-40B4-BE49-F238E27FC236}">
+                <a16:creationId xmlns:a16="http://schemas.microsoft.com/office/drawing/2014/main" id="{7E15B8DC-30EF-0964-C4C8-C1D0249287D6}"/>
+              </a:ext>
+            </a:extLst>
+          </p:cNvPr>
+          <p:cNvSpPr/>
+          <p:nvPr/>
+        </p:nvSpPr>
+        <p:spPr>
+          <a:xfrm>
+            <a:off x="739746" y="1172413"/>
+            <a:ext cx="5537229" cy="3042487"/>
+          </a:xfrm>
+          <a:custGeom>
+            <a:avLst/>
+            <a:gdLst>
+              <a:gd name="connsiteX0" fmla="*/ 12729 w 5803929"/>
+              <a:gd name="connsiteY0" fmla="*/ 3371850 h 3376699"/>
+              <a:gd name="connsiteX1" fmla="*/ 146079 w 5803929"/>
+              <a:gd name="connsiteY1" fmla="*/ 3171825 h 3376699"/>
+              <a:gd name="connsiteX2" fmla="*/ 1050954 w 5803929"/>
+              <a:gd name="connsiteY2" fmla="*/ 2038350 h 3376699"/>
+              <a:gd name="connsiteX3" fmla="*/ 1736754 w 5803929"/>
+              <a:gd name="connsiteY3" fmla="*/ 1571625 h 3376699"/>
+              <a:gd name="connsiteX4" fmla="*/ 2146329 w 5803929"/>
+              <a:gd name="connsiteY4" fmla="*/ 1876425 h 3376699"/>
+              <a:gd name="connsiteX5" fmla="*/ 2422554 w 5803929"/>
+              <a:gd name="connsiteY5" fmla="*/ 2524125 h 3376699"/>
+              <a:gd name="connsiteX6" fmla="*/ 2594004 w 5803929"/>
+              <a:gd name="connsiteY6" fmla="*/ 2419350 h 3376699"/>
+              <a:gd name="connsiteX7" fmla="*/ 2727354 w 5803929"/>
+              <a:gd name="connsiteY7" fmla="*/ 2428875 h 3376699"/>
+              <a:gd name="connsiteX8" fmla="*/ 2860704 w 5803929"/>
+              <a:gd name="connsiteY8" fmla="*/ 2514600 h 3376699"/>
+              <a:gd name="connsiteX9" fmla="*/ 3013104 w 5803929"/>
+              <a:gd name="connsiteY9" fmla="*/ 2657475 h 3376699"/>
+              <a:gd name="connsiteX10" fmla="*/ 3356004 w 5803929"/>
+              <a:gd name="connsiteY10" fmla="*/ 2571750 h 3376699"/>
+              <a:gd name="connsiteX11" fmla="*/ 3689379 w 5803929"/>
+              <a:gd name="connsiteY11" fmla="*/ 2152650 h 3376699"/>
+              <a:gd name="connsiteX12" fmla="*/ 3975129 w 5803929"/>
+              <a:gd name="connsiteY12" fmla="*/ 2143125 h 3376699"/>
+              <a:gd name="connsiteX13" fmla="*/ 4403754 w 5803929"/>
+              <a:gd name="connsiteY13" fmla="*/ 1924050 h 3376699"/>
+              <a:gd name="connsiteX14" fmla="*/ 4746654 w 5803929"/>
+              <a:gd name="connsiteY14" fmla="*/ 1981200 h 3376699"/>
+              <a:gd name="connsiteX15" fmla="*/ 5270529 w 5803929"/>
+              <a:gd name="connsiteY15" fmla="*/ 657225 h 3376699"/>
+              <a:gd name="connsiteX16" fmla="*/ 5803929 w 5803929"/>
+              <a:gd name="connsiteY16" fmla="*/ 0 h 3376699"/>
+              <a:gd name="connsiteX0" fmla="*/ 12729 w 5899179"/>
+              <a:gd name="connsiteY0" fmla="*/ 2754671 h 2759520"/>
+              <a:gd name="connsiteX1" fmla="*/ 146079 w 5899179"/>
+              <a:gd name="connsiteY1" fmla="*/ 2554646 h 2759520"/>
+              <a:gd name="connsiteX2" fmla="*/ 1050954 w 5899179"/>
+              <a:gd name="connsiteY2" fmla="*/ 1421171 h 2759520"/>
+              <a:gd name="connsiteX3" fmla="*/ 1736754 w 5899179"/>
+              <a:gd name="connsiteY3" fmla="*/ 954446 h 2759520"/>
+              <a:gd name="connsiteX4" fmla="*/ 2146329 w 5899179"/>
+              <a:gd name="connsiteY4" fmla="*/ 1259246 h 2759520"/>
+              <a:gd name="connsiteX5" fmla="*/ 2422554 w 5899179"/>
+              <a:gd name="connsiteY5" fmla="*/ 1906946 h 2759520"/>
+              <a:gd name="connsiteX6" fmla="*/ 2594004 w 5899179"/>
+              <a:gd name="connsiteY6" fmla="*/ 1802171 h 2759520"/>
+              <a:gd name="connsiteX7" fmla="*/ 2727354 w 5899179"/>
+              <a:gd name="connsiteY7" fmla="*/ 1811696 h 2759520"/>
+              <a:gd name="connsiteX8" fmla="*/ 2860704 w 5899179"/>
+              <a:gd name="connsiteY8" fmla="*/ 1897421 h 2759520"/>
+              <a:gd name="connsiteX9" fmla="*/ 3013104 w 5899179"/>
+              <a:gd name="connsiteY9" fmla="*/ 2040296 h 2759520"/>
+              <a:gd name="connsiteX10" fmla="*/ 3356004 w 5899179"/>
+              <a:gd name="connsiteY10" fmla="*/ 1954571 h 2759520"/>
+              <a:gd name="connsiteX11" fmla="*/ 3689379 w 5899179"/>
+              <a:gd name="connsiteY11" fmla="*/ 1535471 h 2759520"/>
+              <a:gd name="connsiteX12" fmla="*/ 3975129 w 5899179"/>
+              <a:gd name="connsiteY12" fmla="*/ 1525946 h 2759520"/>
+              <a:gd name="connsiteX13" fmla="*/ 4403754 w 5899179"/>
+              <a:gd name="connsiteY13" fmla="*/ 1306871 h 2759520"/>
+              <a:gd name="connsiteX14" fmla="*/ 4746654 w 5899179"/>
+              <a:gd name="connsiteY14" fmla="*/ 1364021 h 2759520"/>
+              <a:gd name="connsiteX15" fmla="*/ 5270529 w 5899179"/>
+              <a:gd name="connsiteY15" fmla="*/ 40046 h 2759520"/>
+              <a:gd name="connsiteX16" fmla="*/ 5899179 w 5899179"/>
+              <a:gd name="connsiteY16" fmla="*/ 1459271 h 2759520"/>
+              <a:gd name="connsiteX0" fmla="*/ 12729 w 5899179"/>
+              <a:gd name="connsiteY0" fmla="*/ 3195143 h 3199992"/>
+              <a:gd name="connsiteX1" fmla="*/ 146079 w 5899179"/>
+              <a:gd name="connsiteY1" fmla="*/ 2995118 h 3199992"/>
+              <a:gd name="connsiteX2" fmla="*/ 1050954 w 5899179"/>
+              <a:gd name="connsiteY2" fmla="*/ 1861643 h 3199992"/>
+              <a:gd name="connsiteX3" fmla="*/ 1736754 w 5899179"/>
+              <a:gd name="connsiteY3" fmla="*/ 1394918 h 3199992"/>
+              <a:gd name="connsiteX4" fmla="*/ 2146329 w 5899179"/>
+              <a:gd name="connsiteY4" fmla="*/ 1699718 h 3199992"/>
+              <a:gd name="connsiteX5" fmla="*/ 2422554 w 5899179"/>
+              <a:gd name="connsiteY5" fmla="*/ 2347418 h 3199992"/>
+              <a:gd name="connsiteX6" fmla="*/ 2594004 w 5899179"/>
+              <a:gd name="connsiteY6" fmla="*/ 2242643 h 3199992"/>
+              <a:gd name="connsiteX7" fmla="*/ 2727354 w 5899179"/>
+              <a:gd name="connsiteY7" fmla="*/ 2252168 h 3199992"/>
+              <a:gd name="connsiteX8" fmla="*/ 2860704 w 5899179"/>
+              <a:gd name="connsiteY8" fmla="*/ 2337893 h 3199992"/>
+              <a:gd name="connsiteX9" fmla="*/ 3013104 w 5899179"/>
+              <a:gd name="connsiteY9" fmla="*/ 2480768 h 3199992"/>
+              <a:gd name="connsiteX10" fmla="*/ 3356004 w 5899179"/>
+              <a:gd name="connsiteY10" fmla="*/ 2395043 h 3199992"/>
+              <a:gd name="connsiteX11" fmla="*/ 3689379 w 5899179"/>
+              <a:gd name="connsiteY11" fmla="*/ 1975943 h 3199992"/>
+              <a:gd name="connsiteX12" fmla="*/ 3975129 w 5899179"/>
+              <a:gd name="connsiteY12" fmla="*/ 1966418 h 3199992"/>
+              <a:gd name="connsiteX13" fmla="*/ 4403754 w 5899179"/>
+              <a:gd name="connsiteY13" fmla="*/ 1747343 h 3199992"/>
+              <a:gd name="connsiteX14" fmla="*/ 4746654 w 5899179"/>
+              <a:gd name="connsiteY14" fmla="*/ 1804493 h 3199992"/>
+              <a:gd name="connsiteX15" fmla="*/ 5280054 w 5899179"/>
+              <a:gd name="connsiteY15" fmla="*/ 32843 h 3199992"/>
+              <a:gd name="connsiteX16" fmla="*/ 5899179 w 5899179"/>
+              <a:gd name="connsiteY16" fmla="*/ 1899743 h 3199992"/>
+              <a:gd name="connsiteX0" fmla="*/ 12729 w 5899179"/>
+              <a:gd name="connsiteY0" fmla="*/ 3082425 h 3087274"/>
+              <a:gd name="connsiteX1" fmla="*/ 146079 w 5899179"/>
+              <a:gd name="connsiteY1" fmla="*/ 2882400 h 3087274"/>
+              <a:gd name="connsiteX2" fmla="*/ 1050954 w 5899179"/>
+              <a:gd name="connsiteY2" fmla="*/ 1748925 h 3087274"/>
+              <a:gd name="connsiteX3" fmla="*/ 1736754 w 5899179"/>
+              <a:gd name="connsiteY3" fmla="*/ 1282200 h 3087274"/>
+              <a:gd name="connsiteX4" fmla="*/ 2146329 w 5899179"/>
+              <a:gd name="connsiteY4" fmla="*/ 1587000 h 3087274"/>
+              <a:gd name="connsiteX5" fmla="*/ 2422554 w 5899179"/>
+              <a:gd name="connsiteY5" fmla="*/ 2234700 h 3087274"/>
+              <a:gd name="connsiteX6" fmla="*/ 2594004 w 5899179"/>
+              <a:gd name="connsiteY6" fmla="*/ 2129925 h 3087274"/>
+              <a:gd name="connsiteX7" fmla="*/ 2727354 w 5899179"/>
+              <a:gd name="connsiteY7" fmla="*/ 2139450 h 3087274"/>
+              <a:gd name="connsiteX8" fmla="*/ 2860704 w 5899179"/>
+              <a:gd name="connsiteY8" fmla="*/ 2225175 h 3087274"/>
+              <a:gd name="connsiteX9" fmla="*/ 3013104 w 5899179"/>
+              <a:gd name="connsiteY9" fmla="*/ 2368050 h 3087274"/>
+              <a:gd name="connsiteX10" fmla="*/ 3356004 w 5899179"/>
+              <a:gd name="connsiteY10" fmla="*/ 2282325 h 3087274"/>
+              <a:gd name="connsiteX11" fmla="*/ 3689379 w 5899179"/>
+              <a:gd name="connsiteY11" fmla="*/ 1863225 h 3087274"/>
+              <a:gd name="connsiteX12" fmla="*/ 3975129 w 5899179"/>
+              <a:gd name="connsiteY12" fmla="*/ 1853700 h 3087274"/>
+              <a:gd name="connsiteX13" fmla="*/ 4403754 w 5899179"/>
+              <a:gd name="connsiteY13" fmla="*/ 1634625 h 3087274"/>
+              <a:gd name="connsiteX14" fmla="*/ 4746654 w 5899179"/>
+              <a:gd name="connsiteY14" fmla="*/ 1691775 h 3087274"/>
+              <a:gd name="connsiteX15" fmla="*/ 5184804 w 5899179"/>
+              <a:gd name="connsiteY15" fmla="*/ 34425 h 3087274"/>
+              <a:gd name="connsiteX16" fmla="*/ 5899179 w 5899179"/>
+              <a:gd name="connsiteY16" fmla="*/ 1787025 h 3087274"/>
+              <a:gd name="connsiteX0" fmla="*/ 12729 w 5899179"/>
+              <a:gd name="connsiteY0" fmla="*/ 3035504 h 3040353"/>
+              <a:gd name="connsiteX1" fmla="*/ 146079 w 5899179"/>
+              <a:gd name="connsiteY1" fmla="*/ 2835479 h 3040353"/>
+              <a:gd name="connsiteX2" fmla="*/ 1050954 w 5899179"/>
+              <a:gd name="connsiteY2" fmla="*/ 1702004 h 3040353"/>
+              <a:gd name="connsiteX3" fmla="*/ 1736754 w 5899179"/>
+              <a:gd name="connsiteY3" fmla="*/ 1235279 h 3040353"/>
+              <a:gd name="connsiteX4" fmla="*/ 2146329 w 5899179"/>
+              <a:gd name="connsiteY4" fmla="*/ 1540079 h 3040353"/>
+              <a:gd name="connsiteX5" fmla="*/ 2422554 w 5899179"/>
+              <a:gd name="connsiteY5" fmla="*/ 2187779 h 3040353"/>
+              <a:gd name="connsiteX6" fmla="*/ 2594004 w 5899179"/>
+              <a:gd name="connsiteY6" fmla="*/ 2083004 h 3040353"/>
+              <a:gd name="connsiteX7" fmla="*/ 2727354 w 5899179"/>
+              <a:gd name="connsiteY7" fmla="*/ 2092529 h 3040353"/>
+              <a:gd name="connsiteX8" fmla="*/ 2860704 w 5899179"/>
+              <a:gd name="connsiteY8" fmla="*/ 2178254 h 3040353"/>
+              <a:gd name="connsiteX9" fmla="*/ 3013104 w 5899179"/>
+              <a:gd name="connsiteY9" fmla="*/ 2321129 h 3040353"/>
+              <a:gd name="connsiteX10" fmla="*/ 3356004 w 5899179"/>
+              <a:gd name="connsiteY10" fmla="*/ 2235404 h 3040353"/>
+              <a:gd name="connsiteX11" fmla="*/ 3689379 w 5899179"/>
+              <a:gd name="connsiteY11" fmla="*/ 1816304 h 3040353"/>
+              <a:gd name="connsiteX12" fmla="*/ 3975129 w 5899179"/>
+              <a:gd name="connsiteY12" fmla="*/ 1806779 h 3040353"/>
+              <a:gd name="connsiteX13" fmla="*/ 4403754 w 5899179"/>
+              <a:gd name="connsiteY13" fmla="*/ 1587704 h 3040353"/>
+              <a:gd name="connsiteX14" fmla="*/ 4746654 w 5899179"/>
+              <a:gd name="connsiteY14" fmla="*/ 1644854 h 3040353"/>
+              <a:gd name="connsiteX15" fmla="*/ 5118129 w 5899179"/>
+              <a:gd name="connsiteY15" fmla="*/ 35129 h 3040353"/>
+              <a:gd name="connsiteX16" fmla="*/ 5899179 w 5899179"/>
+              <a:gd name="connsiteY16" fmla="*/ 1740104 h 3040353"/>
+              <a:gd name="connsiteX0" fmla="*/ 12729 w 5537229"/>
+              <a:gd name="connsiteY0" fmla="*/ 3037638 h 3042487"/>
+              <a:gd name="connsiteX1" fmla="*/ 146079 w 5537229"/>
+              <a:gd name="connsiteY1" fmla="*/ 2837613 h 3042487"/>
+              <a:gd name="connsiteX2" fmla="*/ 1050954 w 5537229"/>
+              <a:gd name="connsiteY2" fmla="*/ 1704138 h 3042487"/>
+              <a:gd name="connsiteX3" fmla="*/ 1736754 w 5537229"/>
+              <a:gd name="connsiteY3" fmla="*/ 1237413 h 3042487"/>
+              <a:gd name="connsiteX4" fmla="*/ 2146329 w 5537229"/>
+              <a:gd name="connsiteY4" fmla="*/ 1542213 h 3042487"/>
+              <a:gd name="connsiteX5" fmla="*/ 2422554 w 5537229"/>
+              <a:gd name="connsiteY5" fmla="*/ 2189913 h 3042487"/>
+              <a:gd name="connsiteX6" fmla="*/ 2594004 w 5537229"/>
+              <a:gd name="connsiteY6" fmla="*/ 2085138 h 3042487"/>
+              <a:gd name="connsiteX7" fmla="*/ 2727354 w 5537229"/>
+              <a:gd name="connsiteY7" fmla="*/ 2094663 h 3042487"/>
+              <a:gd name="connsiteX8" fmla="*/ 2860704 w 5537229"/>
+              <a:gd name="connsiteY8" fmla="*/ 2180388 h 3042487"/>
+              <a:gd name="connsiteX9" fmla="*/ 3013104 w 5537229"/>
+              <a:gd name="connsiteY9" fmla="*/ 2323263 h 3042487"/>
+              <a:gd name="connsiteX10" fmla="*/ 3356004 w 5537229"/>
+              <a:gd name="connsiteY10" fmla="*/ 2237538 h 3042487"/>
+              <a:gd name="connsiteX11" fmla="*/ 3689379 w 5537229"/>
+              <a:gd name="connsiteY11" fmla="*/ 1818438 h 3042487"/>
+              <a:gd name="connsiteX12" fmla="*/ 3975129 w 5537229"/>
+              <a:gd name="connsiteY12" fmla="*/ 1808913 h 3042487"/>
+              <a:gd name="connsiteX13" fmla="*/ 4403754 w 5537229"/>
+              <a:gd name="connsiteY13" fmla="*/ 1589838 h 3042487"/>
+              <a:gd name="connsiteX14" fmla="*/ 4746654 w 5537229"/>
+              <a:gd name="connsiteY14" fmla="*/ 1646988 h 3042487"/>
+              <a:gd name="connsiteX15" fmla="*/ 5118129 w 5537229"/>
+              <a:gd name="connsiteY15" fmla="*/ 37263 h 3042487"/>
+              <a:gd name="connsiteX16" fmla="*/ 5537229 w 5537229"/>
+              <a:gd name="connsiteY16" fmla="*/ 1608888 h 3042487"/>
+            </a:gdLst>
+            <a:ahLst/>
+            <a:cxnLst>
+              <a:cxn ang="0">
+                <a:pos x="connsiteX0" y="connsiteY0"/>
+              </a:cxn>
+              <a:cxn ang="0">
+                <a:pos x="connsiteX1" y="connsiteY1"/>
+              </a:cxn>
+              <a:cxn ang="0">
+                <a:pos x="connsiteX2" y="connsiteY2"/>
+              </a:cxn>
+              <a:cxn ang="0">
+                <a:pos x="connsiteX3" y="connsiteY3"/>
+              </a:cxn>
+              <a:cxn ang="0">
+                <a:pos x="connsiteX4" y="connsiteY4"/>
+              </a:cxn>
+              <a:cxn ang="0">
+                <a:pos x="connsiteX5" y="connsiteY5"/>
+              </a:cxn>
+              <a:cxn ang="0">
+                <a:pos x="connsiteX6" y="connsiteY6"/>
+              </a:cxn>
+              <a:cxn ang="0">
+                <a:pos x="connsiteX7" y="connsiteY7"/>
+              </a:cxn>
+              <a:cxn ang="0">
+                <a:pos x="connsiteX8" y="connsiteY8"/>
+              </a:cxn>
+              <a:cxn ang="0">
+                <a:pos x="connsiteX9" y="connsiteY9"/>
+              </a:cxn>
+              <a:cxn ang="0">
+                <a:pos x="connsiteX10" y="connsiteY10"/>
+              </a:cxn>
+              <a:cxn ang="0">
+                <a:pos x="connsiteX11" y="connsiteY11"/>
+              </a:cxn>
+              <a:cxn ang="0">
+                <a:pos x="connsiteX12" y="connsiteY12"/>
+              </a:cxn>
+              <a:cxn ang="0">
+                <a:pos x="connsiteX13" y="connsiteY13"/>
+              </a:cxn>
+              <a:cxn ang="0">
+                <a:pos x="connsiteX14" y="connsiteY14"/>
+              </a:cxn>
+              <a:cxn ang="0">
+                <a:pos x="connsiteX15" y="connsiteY15"/>
+              </a:cxn>
+              <a:cxn ang="0">
+                <a:pos x="connsiteX16" y="connsiteY16"/>
+              </a:cxn>
+            </a:cxnLst>
+            <a:rect l="l" t="t" r="r" b="b"/>
+            <a:pathLst>
+              <a:path w="5537229" h="3042487">
+                <a:moveTo>
+                  <a:pt x="12729" y="3037638"/>
+                </a:moveTo>
+                <a:cubicBezTo>
+                  <a:pt x="-7115" y="3048750"/>
+                  <a:pt x="-26958" y="3059863"/>
+                  <a:pt x="146079" y="2837613"/>
+                </a:cubicBezTo>
+                <a:cubicBezTo>
+                  <a:pt x="319116" y="2615363"/>
+                  <a:pt x="785842" y="1970838"/>
+                  <a:pt x="1050954" y="1704138"/>
+                </a:cubicBezTo>
+                <a:cubicBezTo>
+                  <a:pt x="1316066" y="1437438"/>
+                  <a:pt x="1554192" y="1264400"/>
+                  <a:pt x="1736754" y="1237413"/>
+                </a:cubicBezTo>
+                <a:cubicBezTo>
+                  <a:pt x="1919316" y="1210426"/>
+                  <a:pt x="2032029" y="1383463"/>
+                  <a:pt x="2146329" y="1542213"/>
+                </a:cubicBezTo>
+                <a:cubicBezTo>
+                  <a:pt x="2260629" y="1700963"/>
+                  <a:pt x="2347942" y="2099426"/>
+                  <a:pt x="2422554" y="2189913"/>
+                </a:cubicBezTo>
+                <a:cubicBezTo>
+                  <a:pt x="2497166" y="2280400"/>
+                  <a:pt x="2543204" y="2101013"/>
+                  <a:pt x="2594004" y="2085138"/>
+                </a:cubicBezTo>
+                <a:cubicBezTo>
+                  <a:pt x="2644804" y="2069263"/>
+                  <a:pt x="2682904" y="2078788"/>
+                  <a:pt x="2727354" y="2094663"/>
+                </a:cubicBezTo>
+                <a:cubicBezTo>
+                  <a:pt x="2771804" y="2110538"/>
+                  <a:pt x="2813079" y="2142288"/>
+                  <a:pt x="2860704" y="2180388"/>
+                </a:cubicBezTo>
+                <a:cubicBezTo>
+                  <a:pt x="2908329" y="2218488"/>
+                  <a:pt x="2930554" y="2313738"/>
+                  <a:pt x="3013104" y="2323263"/>
+                </a:cubicBezTo>
+                <a:cubicBezTo>
+                  <a:pt x="3095654" y="2332788"/>
+                  <a:pt x="3243292" y="2321675"/>
+                  <a:pt x="3356004" y="2237538"/>
+                </a:cubicBezTo>
+                <a:cubicBezTo>
+                  <a:pt x="3468716" y="2153401"/>
+                  <a:pt x="3586191" y="1889876"/>
+                  <a:pt x="3689379" y="1818438"/>
+                </a:cubicBezTo>
+                <a:cubicBezTo>
+                  <a:pt x="3792567" y="1747000"/>
+                  <a:pt x="3856067" y="1847013"/>
+                  <a:pt x="3975129" y="1808913"/>
+                </a:cubicBezTo>
+                <a:cubicBezTo>
+                  <a:pt x="4094191" y="1770813"/>
+                  <a:pt x="4275167" y="1616825"/>
+                  <a:pt x="4403754" y="1589838"/>
+                </a:cubicBezTo>
+                <a:cubicBezTo>
+                  <a:pt x="4532342" y="1562850"/>
+                  <a:pt x="4627592" y="1905751"/>
+                  <a:pt x="4746654" y="1646988"/>
+                </a:cubicBezTo>
+                <a:cubicBezTo>
+                  <a:pt x="4865717" y="1388226"/>
+                  <a:pt x="4941917" y="367463"/>
+                  <a:pt x="5118129" y="37263"/>
+                </a:cubicBezTo>
+                <a:cubicBezTo>
+                  <a:pt x="5294341" y="-292937"/>
+                  <a:pt x="5448329" y="1681913"/>
+                  <a:pt x="5537229" y="1608888"/>
+                </a:cubicBezTo>
+              </a:path>
+            </a:pathLst>
+          </a:custGeom>
+          <a:noFill/>
+        </p:spPr>
+        <p:style>
+          <a:lnRef idx="2">
+            <a:schemeClr val="accent1">
+              <a:shade val="15000"/>
+            </a:schemeClr>
+          </a:lnRef>
+          <a:fillRef idx="1">
+            <a:schemeClr val="accent1"/>
+          </a:fillRef>
+          <a:effectRef idx="0">
+            <a:schemeClr val="accent1"/>
+          </a:effectRef>
+          <a:fontRef idx="minor">
+            <a:schemeClr val="lt1"/>
+          </a:fontRef>
+        </p:style>
+        <p:txBody>
+          <a:bodyPr rtlCol="0" anchor="ctr"/>
+          <a:lstStyle/>
+          <a:p>
+            <a:pPr algn="ctr"/>
+            <a:endParaRPr lang="ko-KR" altLang="en-US"/>
+          </a:p>
+        </p:txBody>
+      </p:sp>
+      <mc:AlternateContent xmlns:mc="http://schemas.openxmlformats.org/markup-compatibility/2006">
+        <mc:Choice xmlns:a14="http://schemas.microsoft.com/office/drawing/2010/main" Requires="a14">
+          <p:sp>
+            <p:nvSpPr>
+              <p:cNvPr id="38" name="TextBox 37">
+                <a:extLst>
+                  <a:ext uri="{FF2B5EF4-FFF2-40B4-BE49-F238E27FC236}">
+                    <a16:creationId xmlns:a16="http://schemas.microsoft.com/office/drawing/2014/main" id="{16537C8F-049A-7BBA-5571-3EC9CFFD15F1}"/>
+                  </a:ext>
+                </a:extLst>
+              </p:cNvPr>
+              <p:cNvSpPr txBox="1"/>
+              <p:nvPr/>
+            </p:nvSpPr>
+            <p:spPr>
+              <a:xfrm>
+                <a:off x="4695822" y="3973832"/>
+                <a:ext cx="414336" cy="277255"/>
+              </a:xfrm>
+              <a:prstGeom prst="rect">
+                <a:avLst/>
+              </a:prstGeom>
+              <a:noFill/>
+            </p:spPr>
+            <p:txBody>
+              <a:bodyPr wrap="square" rtlCol="0">
+                <a:spAutoFit/>
+              </a:bodyPr>
+              <a:lstStyle/>
+              <a:p>
+                <a:pPr/>
+                <a14:m>
+                  <m:oMathPara xmlns:m="http://schemas.openxmlformats.org/officeDocument/2006/math">
+                    <m:oMathParaPr>
+                      <m:jc m:val="centerGroup"/>
+                    </m:oMathParaPr>
+                    <m:oMath xmlns:m="http://schemas.openxmlformats.org/officeDocument/2006/math">
+                      <m:sSub>
+                        <m:sSubPr>
+                          <m:ctrlPr>
+                            <a:rPr lang="en-US" altLang="ko-KR" sz="1100" b="0" i="1" dirty="0" smtClean="0">
+                              <a:latin typeface="Cambria Math" panose="02040503050406030204" pitchFamily="18" charset="0"/>
+                            </a:rPr>
+                          </m:ctrlPr>
+                        </m:sSubPr>
+                        <m:e>
+                          <m:r>
+                            <a:rPr lang="en-US" altLang="ko-KR" sz="1100" i="1" dirty="0" smtClean="0">
+                              <a:latin typeface="Cambria Math" panose="02040503050406030204" pitchFamily="18" charset="0"/>
+                            </a:rPr>
+                            <m:t>𝑥</m:t>
+                          </m:r>
+                        </m:e>
+                        <m:sub>
+                          <m:r>
+                            <m:rPr>
+                              <m:sty m:val="p"/>
+                            </m:rPr>
+                            <a:rPr lang="en-US" altLang="ko-KR" sz="1100" b="0" i="0" dirty="0" smtClean="0">
+                              <a:latin typeface="Cambria Math" panose="02040503050406030204" pitchFamily="18" charset="0"/>
+                            </a:rPr>
+                            <m:t>j</m:t>
+                          </m:r>
+                          <m:r>
+                            <a:rPr lang="en-US" altLang="ko-KR" sz="1100" b="0" i="0" dirty="0" smtClean="0">
+                              <a:latin typeface="Cambria Math" panose="02040503050406030204" pitchFamily="18" charset="0"/>
+                            </a:rPr>
+                            <m:t>−1</m:t>
+                          </m:r>
+                        </m:sub>
+                      </m:sSub>
+                    </m:oMath>
+                  </m:oMathPara>
+                </a14:m>
+                <a:endParaRPr lang="ko-KR" altLang="en-US" sz="1100" dirty="0"/>
+              </a:p>
+            </p:txBody>
+          </p:sp>
+        </mc:Choice>
+        <mc:Fallback>
+          <p:sp>
+            <p:nvSpPr>
+              <p:cNvPr id="38" name="TextBox 37">
+                <a:extLst>
+                  <a:ext uri="{FF2B5EF4-FFF2-40B4-BE49-F238E27FC236}">
+                    <a16:creationId xmlns:a16="http://schemas.microsoft.com/office/drawing/2014/main" id="{16537C8F-049A-7BBA-5571-3EC9CFFD15F1}"/>
+                  </a:ext>
+                </a:extLst>
+              </p:cNvPr>
+              <p:cNvSpPr txBox="1">
+                <a:spLocks noRot="1" noChangeAspect="1" noMove="1" noResize="1" noEditPoints="1" noAdjustHandles="1" noChangeArrowheads="1" noChangeShapeType="1" noTextEdit="1"/>
+              </p:cNvSpPr>
+              <p:nvPr/>
+            </p:nvSpPr>
+            <p:spPr>
+              <a:xfrm>
+                <a:off x="4695822" y="3973832"/>
+                <a:ext cx="414336" cy="277255"/>
+              </a:xfrm>
+              <a:prstGeom prst="rect">
+                <a:avLst/>
+              </a:prstGeom>
+              <a:blipFill>
+                <a:blip r:embed="rId8"/>
+                <a:stretch>
+                  <a:fillRect b="-4444"/>
+                </a:stretch>
+              </a:blipFill>
+            </p:spPr>
+            <p:txBody>
+              <a:bodyPr/>
+              <a:lstStyle/>
+              <a:p>
+                <a:r>
+                  <a:rPr lang="ko-KR" altLang="en-US">
+                    <a:noFill/>
+                  </a:rPr>
+                  <a:t> </a:t>
+                </a:r>
+              </a:p>
+            </p:txBody>
+          </p:sp>
+        </mc:Fallback>
+      </mc:AlternateContent>
+      <mc:AlternateContent xmlns:mc="http://schemas.openxmlformats.org/markup-compatibility/2006">
+        <mc:Choice xmlns:a14="http://schemas.microsoft.com/office/drawing/2010/main" Requires="a14">
+          <p:sp>
+            <p:nvSpPr>
+              <p:cNvPr id="40" name="TextBox 39">
+                <a:extLst>
+                  <a:ext uri="{FF2B5EF4-FFF2-40B4-BE49-F238E27FC236}">
+                    <a16:creationId xmlns:a16="http://schemas.microsoft.com/office/drawing/2014/main" id="{398D4BE6-8073-90DD-2D22-23F3B8AEF403}"/>
+                  </a:ext>
+                </a:extLst>
+              </p:cNvPr>
+              <p:cNvSpPr txBox="1"/>
+              <p:nvPr/>
+            </p:nvSpPr>
+            <p:spPr>
+              <a:xfrm>
+                <a:off x="1593837" y="3962398"/>
+                <a:ext cx="414336" cy="261610"/>
+              </a:xfrm>
+              <a:prstGeom prst="rect">
+                <a:avLst/>
+              </a:prstGeom>
+              <a:noFill/>
+            </p:spPr>
+            <p:txBody>
+              <a:bodyPr wrap="square" rtlCol="0">
+                <a:spAutoFit/>
+              </a:bodyPr>
+              <a:lstStyle/>
+              <a:p>
+                <a:pPr/>
+                <a14:m>
+                  <m:oMathPara xmlns:m="http://schemas.openxmlformats.org/officeDocument/2006/math">
+                    <m:oMathParaPr>
+                      <m:jc m:val="centerGroup"/>
+                    </m:oMathParaPr>
+                    <m:oMath xmlns:m="http://schemas.openxmlformats.org/officeDocument/2006/math">
+                      <m:sSub>
+                        <m:sSubPr>
+                          <m:ctrlPr>
+                            <a:rPr lang="en-US" altLang="ko-KR" sz="1100" b="0" i="1" dirty="0" smtClean="0">
+                              <a:latin typeface="Cambria Math" panose="02040503050406030204" pitchFamily="18" charset="0"/>
+                            </a:rPr>
+                          </m:ctrlPr>
+                        </m:sSubPr>
+                        <m:e>
+                          <m:r>
+                            <a:rPr lang="en-US" altLang="ko-KR" sz="1100" i="1" dirty="0" smtClean="0">
+                              <a:latin typeface="Cambria Math" panose="02040503050406030204" pitchFamily="18" charset="0"/>
+                            </a:rPr>
+                            <m:t>𝑥</m:t>
+                          </m:r>
+                        </m:e>
+                        <m:sub>
+                          <m:r>
+                            <a:rPr lang="en-US" altLang="ko-KR" sz="1100" b="0" i="0" dirty="0" smtClean="0">
+                              <a:latin typeface="Cambria Math" panose="02040503050406030204" pitchFamily="18" charset="0"/>
+                            </a:rPr>
+                            <m:t>0</m:t>
+                          </m:r>
+                        </m:sub>
+                      </m:sSub>
+                    </m:oMath>
+                  </m:oMathPara>
+                </a14:m>
+                <a:endParaRPr lang="ko-KR" altLang="en-US" sz="1100" dirty="0"/>
+              </a:p>
+            </p:txBody>
+          </p:sp>
+        </mc:Choice>
+        <mc:Fallback>
+          <p:sp>
+            <p:nvSpPr>
+              <p:cNvPr id="40" name="TextBox 39">
+                <a:extLst>
+                  <a:ext uri="{FF2B5EF4-FFF2-40B4-BE49-F238E27FC236}">
+                    <a16:creationId xmlns:a16="http://schemas.microsoft.com/office/drawing/2014/main" id="{398D4BE6-8073-90DD-2D22-23F3B8AEF403}"/>
+                  </a:ext>
+                </a:extLst>
+              </p:cNvPr>
+              <p:cNvSpPr txBox="1">
+                <a:spLocks noRot="1" noChangeAspect="1" noMove="1" noResize="1" noEditPoints="1" noAdjustHandles="1" noChangeArrowheads="1" noChangeShapeType="1" noTextEdit="1"/>
+              </p:cNvSpPr>
+              <p:nvPr/>
+            </p:nvSpPr>
+            <p:spPr>
+              <a:xfrm>
+                <a:off x="1593837" y="3962398"/>
+                <a:ext cx="414336" cy="261610"/>
+              </a:xfrm>
+              <a:prstGeom prst="rect">
+                <a:avLst/>
+              </a:prstGeom>
+              <a:blipFill>
+                <a:blip r:embed="rId9"/>
+                <a:stretch>
+                  <a:fillRect/>
+                </a:stretch>
+              </a:blipFill>
+            </p:spPr>
+            <p:txBody>
+              <a:bodyPr/>
+              <a:lstStyle/>
+              <a:p>
+                <a:r>
+                  <a:rPr lang="ko-KR" altLang="en-US">
+                    <a:noFill/>
+                  </a:rPr>
+                  <a:t> </a:t>
+                </a:r>
+              </a:p>
+            </p:txBody>
+          </p:sp>
+        </mc:Fallback>
+      </mc:AlternateContent>
+      <mc:AlternateContent xmlns:mc="http://schemas.openxmlformats.org/markup-compatibility/2006">
+        <mc:Choice xmlns:a14="http://schemas.microsoft.com/office/drawing/2010/main" Requires="a14">
+          <p:sp>
+            <p:nvSpPr>
+              <p:cNvPr id="41" name="TextBox 40">
+                <a:extLst>
+                  <a:ext uri="{FF2B5EF4-FFF2-40B4-BE49-F238E27FC236}">
+                    <a16:creationId xmlns:a16="http://schemas.microsoft.com/office/drawing/2014/main" id="{6804047C-B261-F2CC-F221-F27C67A21321}"/>
+                  </a:ext>
+                </a:extLst>
+              </p:cNvPr>
+              <p:cNvSpPr txBox="1"/>
+              <p:nvPr/>
+            </p:nvSpPr>
+            <p:spPr>
+              <a:xfrm>
+                <a:off x="6066217" y="3971924"/>
+                <a:ext cx="414336" cy="261610"/>
+              </a:xfrm>
+              <a:prstGeom prst="rect">
+                <a:avLst/>
+              </a:prstGeom>
+              <a:noFill/>
+            </p:spPr>
+            <p:txBody>
+              <a:bodyPr wrap="square" rtlCol="0">
+                <a:spAutoFit/>
+              </a:bodyPr>
+              <a:lstStyle/>
+              <a:p>
+                <a:pPr/>
+                <a14:m>
+                  <m:oMathPara xmlns:m="http://schemas.openxmlformats.org/officeDocument/2006/math">
+                    <m:oMathParaPr>
+                      <m:jc m:val="centerGroup"/>
+                    </m:oMathParaPr>
+                    <m:oMath xmlns:m="http://schemas.openxmlformats.org/officeDocument/2006/math">
+                      <m:sSub>
+                        <m:sSubPr>
+                          <m:ctrlPr>
+                            <a:rPr lang="en-US" altLang="ko-KR" sz="1100" b="0" i="1" dirty="0" smtClean="0">
+                              <a:latin typeface="Cambria Math" panose="02040503050406030204" pitchFamily="18" charset="0"/>
+                            </a:rPr>
+                          </m:ctrlPr>
+                        </m:sSubPr>
+                        <m:e>
+                          <m:r>
+                            <a:rPr lang="en-US" altLang="ko-KR" sz="1100" i="1" dirty="0" smtClean="0">
+                              <a:latin typeface="Cambria Math" panose="02040503050406030204" pitchFamily="18" charset="0"/>
+                            </a:rPr>
+                            <m:t>𝑥</m:t>
+                          </m:r>
+                        </m:e>
+                        <m:sub>
+                          <m:r>
+                            <m:rPr>
+                              <m:sty m:val="p"/>
+                            </m:rPr>
+                            <a:rPr lang="en-US" altLang="ko-KR" sz="1100" b="0" i="0" dirty="0" smtClean="0">
+                              <a:latin typeface="Cambria Math" panose="02040503050406030204" pitchFamily="18" charset="0"/>
+                            </a:rPr>
+                            <m:t>N</m:t>
+                          </m:r>
+                        </m:sub>
+                      </m:sSub>
+                    </m:oMath>
+                  </m:oMathPara>
+                </a14:m>
+                <a:endParaRPr lang="ko-KR" altLang="en-US" sz="1100" dirty="0"/>
+              </a:p>
+            </p:txBody>
+          </p:sp>
+        </mc:Choice>
+        <mc:Fallback>
+          <p:sp>
+            <p:nvSpPr>
+              <p:cNvPr id="41" name="TextBox 40">
+                <a:extLst>
+                  <a:ext uri="{FF2B5EF4-FFF2-40B4-BE49-F238E27FC236}">
+                    <a16:creationId xmlns:a16="http://schemas.microsoft.com/office/drawing/2014/main" id="{6804047C-B261-F2CC-F221-F27C67A21321}"/>
+                  </a:ext>
+                </a:extLst>
+              </p:cNvPr>
+              <p:cNvSpPr txBox="1">
+                <a:spLocks noRot="1" noChangeAspect="1" noMove="1" noResize="1" noEditPoints="1" noAdjustHandles="1" noChangeArrowheads="1" noChangeShapeType="1" noTextEdit="1"/>
+              </p:cNvSpPr>
+              <p:nvPr/>
+            </p:nvSpPr>
+            <p:spPr>
+              <a:xfrm>
+                <a:off x="6066217" y="3971924"/>
+                <a:ext cx="414336" cy="261610"/>
+              </a:xfrm>
+              <a:prstGeom prst="rect">
+                <a:avLst/>
+              </a:prstGeom>
+              <a:blipFill>
+                <a:blip r:embed="rId10"/>
+                <a:stretch>
+                  <a:fillRect/>
+                </a:stretch>
+              </a:blipFill>
+            </p:spPr>
+            <p:txBody>
+              <a:bodyPr/>
+              <a:lstStyle/>
+              <a:p>
+                <a:r>
+                  <a:rPr lang="ko-KR" altLang="en-US">
+                    <a:noFill/>
+                  </a:rPr>
+                  <a:t> </a:t>
+                </a:r>
+              </a:p>
+            </p:txBody>
+          </p:sp>
+        </mc:Fallback>
+      </mc:AlternateContent>
+      <mc:AlternateContent xmlns:mc="http://schemas.openxmlformats.org/markup-compatibility/2006">
+        <mc:Choice xmlns:a14="http://schemas.microsoft.com/office/drawing/2010/main" Requires="a14">
+          <p:sp>
+            <p:nvSpPr>
+              <p:cNvPr id="49" name="TextBox 48">
+                <a:extLst>
+                  <a:ext uri="{FF2B5EF4-FFF2-40B4-BE49-F238E27FC236}">
+                    <a16:creationId xmlns:a16="http://schemas.microsoft.com/office/drawing/2014/main" id="{B337A720-E440-25A8-D7A1-AEBA6F586A0E}"/>
+                  </a:ext>
+                </a:extLst>
+              </p:cNvPr>
+              <p:cNvSpPr txBox="1"/>
+              <p:nvPr/>
+            </p:nvSpPr>
+            <p:spPr>
+              <a:xfrm>
+                <a:off x="4293392" y="2623525"/>
+                <a:ext cx="414336" cy="277255"/>
+              </a:xfrm>
+              <a:prstGeom prst="rect">
+                <a:avLst/>
+              </a:prstGeom>
+              <a:noFill/>
+            </p:spPr>
+            <p:txBody>
+              <a:bodyPr wrap="square" rtlCol="0">
+                <a:spAutoFit/>
+              </a:bodyPr>
+              <a:lstStyle/>
+              <a:p>
+                <a:pPr/>
+                <a14:m>
+                  <m:oMathPara xmlns:m="http://schemas.openxmlformats.org/officeDocument/2006/math">
+                    <m:oMathParaPr>
+                      <m:jc m:val="centerGroup"/>
+                    </m:oMathParaPr>
+                    <m:oMath xmlns:m="http://schemas.openxmlformats.org/officeDocument/2006/math">
+                      <m:sSub>
+                        <m:sSubPr>
+                          <m:ctrlPr>
+                            <a:rPr lang="en-US" altLang="ko-KR" sz="1100" b="0" i="1" dirty="0" smtClean="0">
+                              <a:latin typeface="Cambria Math" panose="02040503050406030204" pitchFamily="18" charset="0"/>
+                            </a:rPr>
+                          </m:ctrlPr>
+                        </m:sSubPr>
+                        <m:e>
+                          <m:r>
+                            <a:rPr lang="en-US" altLang="ko-KR" sz="1100" b="0" i="1" dirty="0" smtClean="0">
+                              <a:latin typeface="Cambria Math" panose="02040503050406030204" pitchFamily="18" charset="0"/>
+                            </a:rPr>
+                            <m:t>𝑀</m:t>
+                          </m:r>
+                        </m:e>
+                        <m:sub>
+                          <m:r>
+                            <m:rPr>
+                              <m:sty m:val="p"/>
+                            </m:rPr>
+                            <a:rPr lang="en-US" altLang="ko-KR" sz="1100" b="0" i="0" dirty="0" smtClean="0">
+                              <a:latin typeface="Cambria Math" panose="02040503050406030204" pitchFamily="18" charset="0"/>
+                            </a:rPr>
+                            <m:t>j</m:t>
+                          </m:r>
+                          <m:r>
+                            <a:rPr lang="en-US" altLang="ko-KR" sz="1100" b="0" i="0" dirty="0" smtClean="0">
+                              <a:latin typeface="Cambria Math" panose="02040503050406030204" pitchFamily="18" charset="0"/>
+                            </a:rPr>
+                            <m:t>+1</m:t>
+                          </m:r>
+                        </m:sub>
+                      </m:sSub>
+                    </m:oMath>
+                  </m:oMathPara>
+                </a14:m>
+                <a:endParaRPr lang="ko-KR" altLang="en-US" sz="1100" dirty="0"/>
+              </a:p>
+            </p:txBody>
+          </p:sp>
+        </mc:Choice>
+        <mc:Fallback>
+          <p:sp>
+            <p:nvSpPr>
+              <p:cNvPr id="49" name="TextBox 48">
+                <a:extLst>
+                  <a:ext uri="{FF2B5EF4-FFF2-40B4-BE49-F238E27FC236}">
+                    <a16:creationId xmlns:a16="http://schemas.microsoft.com/office/drawing/2014/main" id="{B337A720-E440-25A8-D7A1-AEBA6F586A0E}"/>
+                  </a:ext>
+                </a:extLst>
+              </p:cNvPr>
+              <p:cNvSpPr txBox="1">
+                <a:spLocks noRot="1" noChangeAspect="1" noMove="1" noResize="1" noEditPoints="1" noAdjustHandles="1" noChangeArrowheads="1" noChangeShapeType="1" noTextEdit="1"/>
+              </p:cNvSpPr>
+              <p:nvPr/>
+            </p:nvSpPr>
+            <p:spPr>
+              <a:xfrm>
+                <a:off x="4293392" y="2623525"/>
+                <a:ext cx="414336" cy="277255"/>
+              </a:xfrm>
+              <a:prstGeom prst="rect">
+                <a:avLst/>
+              </a:prstGeom>
+              <a:blipFill>
+                <a:blip r:embed="rId11"/>
+                <a:stretch>
+                  <a:fillRect b="-2174"/>
+                </a:stretch>
+              </a:blipFill>
+            </p:spPr>
+            <p:txBody>
+              <a:bodyPr/>
+              <a:lstStyle/>
+              <a:p>
+                <a:r>
+                  <a:rPr lang="ko-KR" altLang="en-US">
+                    <a:noFill/>
+                  </a:rPr>
+                  <a:t> </a:t>
+                </a:r>
+              </a:p>
+            </p:txBody>
+          </p:sp>
+        </mc:Fallback>
+      </mc:AlternateContent>
+      <mc:AlternateContent xmlns:mc="http://schemas.openxmlformats.org/markup-compatibility/2006">
+        <mc:Choice xmlns:a14="http://schemas.microsoft.com/office/drawing/2010/main" Requires="a14">
+          <p:sp>
+            <p:nvSpPr>
+              <p:cNvPr id="50" name="TextBox 49">
+                <a:extLst>
+                  <a:ext uri="{FF2B5EF4-FFF2-40B4-BE49-F238E27FC236}">
+                    <a16:creationId xmlns:a16="http://schemas.microsoft.com/office/drawing/2014/main" id="{92F5FED1-E168-4FFF-39CB-0F40A0313BF0}"/>
+                  </a:ext>
+                </a:extLst>
+              </p:cNvPr>
+              <p:cNvSpPr txBox="1"/>
+              <p:nvPr/>
+            </p:nvSpPr>
+            <p:spPr>
+              <a:xfrm>
+                <a:off x="2305050" y="2129964"/>
+                <a:ext cx="414336" cy="261610"/>
+              </a:xfrm>
+              <a:prstGeom prst="rect">
+                <a:avLst/>
+              </a:prstGeom>
+              <a:noFill/>
+            </p:spPr>
+            <p:txBody>
+              <a:bodyPr wrap="square" rtlCol="0">
+                <a:spAutoFit/>
+              </a:bodyPr>
+              <a:lstStyle/>
+              <a:p>
+                <a:pPr/>
+                <a14:m>
+                  <m:oMathPara xmlns:m="http://schemas.openxmlformats.org/officeDocument/2006/math">
+                    <m:oMathParaPr>
+                      <m:jc m:val="centerGroup"/>
+                    </m:oMathParaPr>
+                    <m:oMath xmlns:m="http://schemas.openxmlformats.org/officeDocument/2006/math">
+                      <m:sSub>
+                        <m:sSubPr>
+                          <m:ctrlPr>
+                            <a:rPr lang="en-US" altLang="ko-KR" sz="1100" b="0" i="1" dirty="0" smtClean="0">
+                              <a:latin typeface="Cambria Math" panose="02040503050406030204" pitchFamily="18" charset="0"/>
+                            </a:rPr>
+                          </m:ctrlPr>
+                        </m:sSubPr>
+                        <m:e>
+                          <m:r>
+                            <a:rPr lang="en-US" altLang="ko-KR" sz="1100" b="0" i="1" dirty="0" smtClean="0">
+                              <a:latin typeface="Cambria Math" panose="02040503050406030204" pitchFamily="18" charset="0"/>
+                            </a:rPr>
+                            <m:t>𝑀</m:t>
+                          </m:r>
+                        </m:e>
+                        <m:sub>
+                          <m:r>
+                            <a:rPr lang="en-US" altLang="ko-KR" sz="1100" b="0" i="0" dirty="0" smtClean="0">
+                              <a:latin typeface="Cambria Math" panose="02040503050406030204" pitchFamily="18" charset="0"/>
+                            </a:rPr>
+                            <m:t>1</m:t>
+                          </m:r>
+                        </m:sub>
+                      </m:sSub>
+                    </m:oMath>
+                  </m:oMathPara>
+                </a14:m>
+                <a:endParaRPr lang="ko-KR" altLang="en-US" sz="1100" dirty="0"/>
+              </a:p>
+            </p:txBody>
+          </p:sp>
+        </mc:Choice>
+        <mc:Fallback>
+          <p:sp>
+            <p:nvSpPr>
+              <p:cNvPr id="50" name="TextBox 49">
+                <a:extLst>
+                  <a:ext uri="{FF2B5EF4-FFF2-40B4-BE49-F238E27FC236}">
+                    <a16:creationId xmlns:a16="http://schemas.microsoft.com/office/drawing/2014/main" id="{92F5FED1-E168-4FFF-39CB-0F40A0313BF0}"/>
+                  </a:ext>
+                </a:extLst>
+              </p:cNvPr>
+              <p:cNvSpPr txBox="1">
+                <a:spLocks noRot="1" noChangeAspect="1" noMove="1" noResize="1" noEditPoints="1" noAdjustHandles="1" noChangeArrowheads="1" noChangeShapeType="1" noTextEdit="1"/>
+              </p:cNvSpPr>
+              <p:nvPr/>
+            </p:nvSpPr>
+            <p:spPr>
+              <a:xfrm>
+                <a:off x="2305050" y="2129964"/>
+                <a:ext cx="414336" cy="261610"/>
+              </a:xfrm>
+              <a:prstGeom prst="rect">
+                <a:avLst/>
+              </a:prstGeom>
+              <a:blipFill>
+                <a:blip r:embed="rId12"/>
+                <a:stretch>
+                  <a:fillRect/>
+                </a:stretch>
+              </a:blipFill>
+            </p:spPr>
+            <p:txBody>
+              <a:bodyPr/>
+              <a:lstStyle/>
+              <a:p>
+                <a:r>
+                  <a:rPr lang="ko-KR" altLang="en-US">
+                    <a:noFill/>
+                  </a:rPr>
+                  <a:t> </a:t>
+                </a:r>
+              </a:p>
+            </p:txBody>
+          </p:sp>
+        </mc:Fallback>
+      </mc:AlternateContent>
+      <mc:AlternateContent xmlns:mc="http://schemas.openxmlformats.org/markup-compatibility/2006">
+        <mc:Choice xmlns:a14="http://schemas.microsoft.com/office/drawing/2010/main" Requires="a14">
+          <p:sp>
+            <p:nvSpPr>
+              <p:cNvPr id="51" name="TextBox 50">
+                <a:extLst>
+                  <a:ext uri="{FF2B5EF4-FFF2-40B4-BE49-F238E27FC236}">
+                    <a16:creationId xmlns:a16="http://schemas.microsoft.com/office/drawing/2014/main" id="{A14A49AB-41CC-609D-132F-809F78BDBA2C}"/>
+                  </a:ext>
+                </a:extLst>
+              </p:cNvPr>
+              <p:cNvSpPr txBox="1"/>
+              <p:nvPr/>
+            </p:nvSpPr>
+            <p:spPr>
+              <a:xfrm>
+                <a:off x="5479276" y="891126"/>
+                <a:ext cx="414336" cy="261610"/>
+              </a:xfrm>
+              <a:prstGeom prst="rect">
+                <a:avLst/>
+              </a:prstGeom>
+              <a:noFill/>
+            </p:spPr>
+            <p:txBody>
+              <a:bodyPr wrap="square" rtlCol="0">
+                <a:spAutoFit/>
+              </a:bodyPr>
+              <a:lstStyle/>
+              <a:p>
+                <a:pPr/>
+                <a14:m>
+                  <m:oMathPara xmlns:m="http://schemas.openxmlformats.org/officeDocument/2006/math">
+                    <m:oMathParaPr>
+                      <m:jc m:val="centerGroup"/>
+                    </m:oMathParaPr>
+                    <m:oMath xmlns:m="http://schemas.openxmlformats.org/officeDocument/2006/math">
+                      <m:sSub>
+                        <m:sSubPr>
+                          <m:ctrlPr>
+                            <a:rPr lang="en-US" altLang="ko-KR" sz="1100" b="0" i="1" dirty="0" smtClean="0">
+                              <a:latin typeface="Cambria Math" panose="02040503050406030204" pitchFamily="18" charset="0"/>
+                            </a:rPr>
+                          </m:ctrlPr>
+                        </m:sSubPr>
+                        <m:e>
+                          <m:r>
+                            <a:rPr lang="en-US" altLang="ko-KR" sz="1100" b="0" i="1" dirty="0" smtClean="0">
+                              <a:latin typeface="Cambria Math" panose="02040503050406030204" pitchFamily="18" charset="0"/>
+                            </a:rPr>
+                            <m:t>𝑀</m:t>
+                          </m:r>
+                        </m:e>
+                        <m:sub>
+                          <m:r>
+                            <m:rPr>
+                              <m:sty m:val="p"/>
+                            </m:rPr>
+                            <a:rPr lang="en-US" altLang="ko-KR" sz="1100" b="0" i="0" dirty="0" smtClean="0">
+                              <a:latin typeface="Cambria Math" panose="02040503050406030204" pitchFamily="18" charset="0"/>
+                            </a:rPr>
+                            <m:t>N</m:t>
+                          </m:r>
+                        </m:sub>
+                      </m:sSub>
+                    </m:oMath>
+                  </m:oMathPara>
+                </a14:m>
+                <a:endParaRPr lang="ko-KR" altLang="en-US" sz="1100" dirty="0"/>
+              </a:p>
+            </p:txBody>
+          </p:sp>
+        </mc:Choice>
+        <mc:Fallback>
+          <p:sp>
+            <p:nvSpPr>
+              <p:cNvPr id="51" name="TextBox 50">
+                <a:extLst>
+                  <a:ext uri="{FF2B5EF4-FFF2-40B4-BE49-F238E27FC236}">
+                    <a16:creationId xmlns:a16="http://schemas.microsoft.com/office/drawing/2014/main" id="{A14A49AB-41CC-609D-132F-809F78BDBA2C}"/>
+                  </a:ext>
+                </a:extLst>
+              </p:cNvPr>
+              <p:cNvSpPr txBox="1">
+                <a:spLocks noRot="1" noChangeAspect="1" noMove="1" noResize="1" noEditPoints="1" noAdjustHandles="1" noChangeArrowheads="1" noChangeShapeType="1" noTextEdit="1"/>
+              </p:cNvSpPr>
+              <p:nvPr/>
+            </p:nvSpPr>
+            <p:spPr>
+              <a:xfrm>
+                <a:off x="5479276" y="891126"/>
+                <a:ext cx="414336" cy="261610"/>
+              </a:xfrm>
+              <a:prstGeom prst="rect">
+                <a:avLst/>
+              </a:prstGeom>
+              <a:blipFill>
+                <a:blip r:embed="rId13"/>
+                <a:stretch>
+                  <a:fillRect/>
+                </a:stretch>
+              </a:blipFill>
+            </p:spPr>
+            <p:txBody>
+              <a:bodyPr/>
+              <a:lstStyle/>
+              <a:p>
+                <a:r>
+                  <a:rPr lang="ko-KR" altLang="en-US">
+                    <a:noFill/>
+                  </a:rPr>
+                  <a:t> </a:t>
+                </a:r>
+              </a:p>
+            </p:txBody>
+          </p:sp>
+        </mc:Fallback>
+      </mc:AlternateContent>
+      <p:cxnSp>
+        <p:nvCxnSpPr>
+          <p:cNvPr id="53" name="직선 연결선 52">
+            <a:extLst>
+              <a:ext uri="{FF2B5EF4-FFF2-40B4-BE49-F238E27FC236}">
+                <a16:creationId xmlns:a16="http://schemas.microsoft.com/office/drawing/2014/main" id="{005EC4A1-CE46-F902-4AF2-826CF56C9BB8}"/>
+              </a:ext>
+            </a:extLst>
+          </p:cNvPr>
+          <p:cNvCxnSpPr>
+            <a:cxnSpLocks/>
+          </p:cNvCxnSpPr>
+          <p:nvPr/>
+        </p:nvCxnSpPr>
+        <p:spPr>
+          <a:xfrm>
+            <a:off x="6162675" y="3924300"/>
+            <a:ext cx="0" cy="125930"/>
+          </a:xfrm>
+          <a:prstGeom prst="line">
+            <a:avLst/>
+          </a:prstGeom>
+          <a:ln w="38100">
+            <a:solidFill>
+              <a:schemeClr val="accent6">
+                <a:lumMod val="60000"/>
+                <a:lumOff val="40000"/>
+              </a:schemeClr>
+            </a:solidFill>
+          </a:ln>
+        </p:spPr>
+        <p:style>
+          <a:lnRef idx="1">
+            <a:schemeClr val="accent1"/>
+          </a:lnRef>
+          <a:fillRef idx="0">
+            <a:schemeClr val="accent1"/>
+          </a:fillRef>
+          <a:effectRef idx="0">
+            <a:schemeClr val="accent1"/>
+          </a:effectRef>
+          <a:fontRef idx="minor">
+            <a:schemeClr val="tx1"/>
+          </a:fontRef>
+        </p:style>
+      </p:cxnSp>
+      <p:cxnSp>
+        <p:nvCxnSpPr>
+          <p:cNvPr id="57" name="직선 연결선 56">
+            <a:extLst>
+              <a:ext uri="{FF2B5EF4-FFF2-40B4-BE49-F238E27FC236}">
+                <a16:creationId xmlns:a16="http://schemas.microsoft.com/office/drawing/2014/main" id="{6DBFA896-A720-EC2E-9BD1-E4FB34183950}"/>
+              </a:ext>
+            </a:extLst>
+          </p:cNvPr>
+          <p:cNvCxnSpPr>
+            <a:cxnSpLocks/>
+          </p:cNvCxnSpPr>
+          <p:nvPr/>
+        </p:nvCxnSpPr>
+        <p:spPr>
+          <a:xfrm>
+            <a:off x="4989195" y="3926104"/>
+            <a:ext cx="0" cy="125930"/>
+          </a:xfrm>
+          <a:prstGeom prst="line">
+            <a:avLst/>
+          </a:prstGeom>
+          <a:ln w="38100">
+            <a:solidFill>
+              <a:schemeClr val="accent6">
+                <a:lumMod val="60000"/>
+                <a:lumOff val="40000"/>
+              </a:schemeClr>
+            </a:solidFill>
+          </a:ln>
+        </p:spPr>
+        <p:style>
+          <a:lnRef idx="1">
+            <a:schemeClr val="accent1"/>
+          </a:lnRef>
+          <a:fillRef idx="0">
+            <a:schemeClr val="accent1"/>
+          </a:fillRef>
+          <a:effectRef idx="0">
+            <a:schemeClr val="accent1"/>
+          </a:effectRef>
+          <a:fontRef idx="minor">
+            <a:schemeClr val="tx1"/>
+          </a:fontRef>
+        </p:style>
+      </p:cxnSp>
+      <p:cxnSp>
+        <p:nvCxnSpPr>
+          <p:cNvPr id="58" name="직선 연결선 57">
+            <a:extLst>
+              <a:ext uri="{FF2B5EF4-FFF2-40B4-BE49-F238E27FC236}">
+                <a16:creationId xmlns:a16="http://schemas.microsoft.com/office/drawing/2014/main" id="{290B351F-373E-A625-6FAB-A78C872DE784}"/>
+              </a:ext>
+            </a:extLst>
+          </p:cNvPr>
+          <p:cNvCxnSpPr>
+            <a:cxnSpLocks/>
+          </p:cNvCxnSpPr>
+          <p:nvPr/>
+        </p:nvCxnSpPr>
+        <p:spPr>
+          <a:xfrm>
+            <a:off x="4794885" y="3926104"/>
+            <a:ext cx="0" cy="125930"/>
+          </a:xfrm>
+          <a:prstGeom prst="line">
+            <a:avLst/>
+          </a:prstGeom>
+          <a:ln w="38100">
+            <a:solidFill>
+              <a:schemeClr val="accent6">
+                <a:lumMod val="60000"/>
+                <a:lumOff val="40000"/>
+              </a:schemeClr>
+            </a:solidFill>
+          </a:ln>
+        </p:spPr>
+        <p:style>
+          <a:lnRef idx="1">
+            <a:schemeClr val="accent1"/>
+          </a:lnRef>
+          <a:fillRef idx="0">
+            <a:schemeClr val="accent1"/>
+          </a:fillRef>
+          <a:effectRef idx="0">
+            <a:schemeClr val="accent1"/>
+          </a:effectRef>
+          <a:fontRef idx="minor">
+            <a:schemeClr val="tx1"/>
+          </a:fontRef>
+        </p:style>
+      </p:cxnSp>
+      <p:cxnSp>
+        <p:nvCxnSpPr>
+          <p:cNvPr id="59" name="직선 연결선 58">
+            <a:extLst>
+              <a:ext uri="{FF2B5EF4-FFF2-40B4-BE49-F238E27FC236}">
+                <a16:creationId xmlns:a16="http://schemas.microsoft.com/office/drawing/2014/main" id="{9734748D-B873-4B4B-A078-5E25649D4761}"/>
+              </a:ext>
+            </a:extLst>
+          </p:cNvPr>
+          <p:cNvCxnSpPr>
+            <a:cxnSpLocks/>
+          </p:cNvCxnSpPr>
+          <p:nvPr/>
+        </p:nvCxnSpPr>
+        <p:spPr>
+          <a:xfrm>
+            <a:off x="4154805" y="3918484"/>
+            <a:ext cx="0" cy="125930"/>
+          </a:xfrm>
+          <a:prstGeom prst="line">
+            <a:avLst/>
+          </a:prstGeom>
+          <a:ln w="38100">
+            <a:solidFill>
+              <a:schemeClr val="accent6">
+                <a:lumMod val="60000"/>
+                <a:lumOff val="40000"/>
+              </a:schemeClr>
+            </a:solidFill>
+          </a:ln>
+        </p:spPr>
+        <p:style>
+          <a:lnRef idx="1">
+            <a:schemeClr val="accent1"/>
+          </a:lnRef>
+          <a:fillRef idx="0">
+            <a:schemeClr val="accent1"/>
+          </a:fillRef>
+          <a:effectRef idx="0">
+            <a:schemeClr val="accent1"/>
+          </a:effectRef>
+          <a:fontRef idx="minor">
+            <a:schemeClr val="tx1"/>
+          </a:fontRef>
+        </p:style>
+      </p:cxnSp>
+      <p:cxnSp>
+        <p:nvCxnSpPr>
+          <p:cNvPr id="60" name="직선 연결선 59">
+            <a:extLst>
+              <a:ext uri="{FF2B5EF4-FFF2-40B4-BE49-F238E27FC236}">
+                <a16:creationId xmlns:a16="http://schemas.microsoft.com/office/drawing/2014/main" id="{C2E5EA67-FEC3-94A0-471F-E33BB1B071B9}"/>
+              </a:ext>
+            </a:extLst>
+          </p:cNvPr>
+          <p:cNvCxnSpPr>
+            <a:cxnSpLocks/>
+          </p:cNvCxnSpPr>
+          <p:nvPr/>
+        </p:nvCxnSpPr>
+        <p:spPr>
+          <a:xfrm>
+            <a:off x="3991927" y="3918484"/>
+            <a:ext cx="0" cy="125930"/>
+          </a:xfrm>
+          <a:prstGeom prst="line">
+            <a:avLst/>
+          </a:prstGeom>
+          <a:ln w="38100">
+            <a:solidFill>
+              <a:schemeClr val="accent6">
+                <a:lumMod val="60000"/>
+                <a:lumOff val="40000"/>
+              </a:schemeClr>
+            </a:solidFill>
+          </a:ln>
+        </p:spPr>
+        <p:style>
+          <a:lnRef idx="1">
+            <a:schemeClr val="accent1"/>
+          </a:lnRef>
+          <a:fillRef idx="0">
+            <a:schemeClr val="accent1"/>
+          </a:fillRef>
+          <a:effectRef idx="0">
+            <a:schemeClr val="accent1"/>
+          </a:effectRef>
+          <a:fontRef idx="minor">
+            <a:schemeClr val="tx1"/>
+          </a:fontRef>
+        </p:style>
+      </p:cxnSp>
+      <p:cxnSp>
+        <p:nvCxnSpPr>
+          <p:cNvPr id="61" name="직선 연결선 60">
+            <a:extLst>
+              <a:ext uri="{FF2B5EF4-FFF2-40B4-BE49-F238E27FC236}">
+                <a16:creationId xmlns:a16="http://schemas.microsoft.com/office/drawing/2014/main" id="{B2B46F96-4720-F4E6-D7A4-1DDFAACBF2F3}"/>
+              </a:ext>
+            </a:extLst>
+          </p:cNvPr>
+          <p:cNvCxnSpPr>
+            <a:cxnSpLocks/>
+          </p:cNvCxnSpPr>
+          <p:nvPr/>
+        </p:nvCxnSpPr>
+        <p:spPr>
+          <a:xfrm>
+            <a:off x="3275647" y="3918483"/>
+            <a:ext cx="0" cy="125930"/>
+          </a:xfrm>
+          <a:prstGeom prst="line">
+            <a:avLst/>
+          </a:prstGeom>
+          <a:ln w="38100">
+            <a:solidFill>
+              <a:schemeClr val="accent6">
+                <a:lumMod val="60000"/>
+                <a:lumOff val="40000"/>
+              </a:schemeClr>
+            </a:solidFill>
+          </a:ln>
+        </p:spPr>
+        <p:style>
+          <a:lnRef idx="1">
+            <a:schemeClr val="accent1"/>
+          </a:lnRef>
+          <a:fillRef idx="0">
+            <a:schemeClr val="accent1"/>
+          </a:fillRef>
+          <a:effectRef idx="0">
+            <a:schemeClr val="accent1"/>
+          </a:effectRef>
+          <a:fontRef idx="minor">
+            <a:schemeClr val="tx1"/>
+          </a:fontRef>
+        </p:style>
+      </p:cxnSp>
+      <p:cxnSp>
+        <p:nvCxnSpPr>
+          <p:cNvPr id="62" name="직선 연결선 61">
+            <a:extLst>
+              <a:ext uri="{FF2B5EF4-FFF2-40B4-BE49-F238E27FC236}">
+                <a16:creationId xmlns:a16="http://schemas.microsoft.com/office/drawing/2014/main" id="{7685DE72-03BB-63E9-BFE1-798D61C7967B}"/>
+              </a:ext>
+            </a:extLst>
+          </p:cNvPr>
+          <p:cNvCxnSpPr>
+            <a:cxnSpLocks/>
+          </p:cNvCxnSpPr>
+          <p:nvPr/>
+        </p:nvCxnSpPr>
+        <p:spPr>
+          <a:xfrm>
+            <a:off x="3092767" y="3918483"/>
+            <a:ext cx="0" cy="125930"/>
+          </a:xfrm>
+          <a:prstGeom prst="line">
+            <a:avLst/>
+          </a:prstGeom>
+          <a:ln w="38100">
+            <a:solidFill>
+              <a:schemeClr val="accent6">
+                <a:lumMod val="60000"/>
+                <a:lumOff val="40000"/>
+              </a:schemeClr>
+            </a:solidFill>
+          </a:ln>
+        </p:spPr>
+        <p:style>
+          <a:lnRef idx="1">
+            <a:schemeClr val="accent1"/>
+          </a:lnRef>
+          <a:fillRef idx="0">
+            <a:schemeClr val="accent1"/>
+          </a:fillRef>
+          <a:effectRef idx="0">
+            <a:schemeClr val="accent1"/>
+          </a:effectRef>
+          <a:fontRef idx="minor">
+            <a:schemeClr val="tx1"/>
+          </a:fontRef>
+        </p:style>
+      </p:cxnSp>
+      <p:cxnSp>
+        <p:nvCxnSpPr>
+          <p:cNvPr id="63" name="직선 연결선 62">
+            <a:extLst>
+              <a:ext uri="{FF2B5EF4-FFF2-40B4-BE49-F238E27FC236}">
+                <a16:creationId xmlns:a16="http://schemas.microsoft.com/office/drawing/2014/main" id="{9790CF79-9C6F-587E-4105-28241C612BCF}"/>
+              </a:ext>
+            </a:extLst>
+          </p:cNvPr>
+          <p:cNvCxnSpPr>
+            <a:cxnSpLocks/>
+          </p:cNvCxnSpPr>
+          <p:nvPr/>
+        </p:nvCxnSpPr>
+        <p:spPr>
+          <a:xfrm>
+            <a:off x="1884997" y="3929912"/>
+            <a:ext cx="0" cy="125930"/>
+          </a:xfrm>
+          <a:prstGeom prst="line">
+            <a:avLst/>
+          </a:prstGeom>
+          <a:ln w="38100">
+            <a:solidFill>
+              <a:schemeClr val="accent6">
+                <a:lumMod val="60000"/>
+                <a:lumOff val="40000"/>
+              </a:schemeClr>
+            </a:solidFill>
+          </a:ln>
+        </p:spPr>
+        <p:style>
+          <a:lnRef idx="1">
+            <a:schemeClr val="accent1"/>
+          </a:lnRef>
+          <a:fillRef idx="0">
+            <a:schemeClr val="accent1"/>
+          </a:fillRef>
+          <a:effectRef idx="0">
+            <a:schemeClr val="accent1"/>
+          </a:effectRef>
+          <a:fontRef idx="minor">
+            <a:schemeClr val="tx1"/>
+          </a:fontRef>
+        </p:style>
+      </p:cxnSp>
+      <p:grpSp>
+        <p:nvGrpSpPr>
+          <p:cNvPr id="67" name="그룹 66">
+            <a:extLst>
+              <a:ext uri="{FF2B5EF4-FFF2-40B4-BE49-F238E27FC236}">
+                <a16:creationId xmlns:a16="http://schemas.microsoft.com/office/drawing/2014/main" id="{61497D36-F51D-B9BF-EC12-D51E18FC881C}"/>
+              </a:ext>
+            </a:extLst>
+          </p:cNvPr>
+          <p:cNvGrpSpPr/>
+          <p:nvPr/>
+        </p:nvGrpSpPr>
+        <p:grpSpPr>
+          <a:xfrm>
+            <a:off x="1771649" y="1148180"/>
+            <a:ext cx="4505326" cy="2852315"/>
+            <a:chOff x="1771649" y="1148180"/>
+            <a:chExt cx="4505326" cy="2852315"/>
+          </a:xfrm>
+        </p:grpSpPr>
+        <p:cxnSp>
+          <p:nvCxnSpPr>
+            <p:cNvPr id="27" name="직선 연결선 26">
+              <a:extLst>
+                <a:ext uri="{FF2B5EF4-FFF2-40B4-BE49-F238E27FC236}">
+                  <a16:creationId xmlns:a16="http://schemas.microsoft.com/office/drawing/2014/main" id="{C5C5CE44-EBE1-ABF7-3AC5-C25D1E659DDD}"/>
+                </a:ext>
+              </a:extLst>
+            </p:cNvPr>
+            <p:cNvCxnSpPr>
+              <a:cxnSpLocks/>
+            </p:cNvCxnSpPr>
+            <p:nvPr/>
+          </p:nvCxnSpPr>
+          <p:spPr>
+            <a:xfrm>
+              <a:off x="3190874" y="2407219"/>
+              <a:ext cx="0" cy="1583754"/>
+            </a:xfrm>
+            <a:prstGeom prst="line">
+              <a:avLst/>
+            </a:prstGeom>
+            <a:ln w="9525">
+              <a:solidFill>
+                <a:schemeClr val="tx1"/>
+              </a:solidFill>
+              <a:prstDash val="dash"/>
+            </a:ln>
+          </p:spPr>
+          <p:style>
+            <a:lnRef idx="1">
+              <a:schemeClr val="dk1"/>
+            </a:lnRef>
+            <a:fillRef idx="0">
+              <a:schemeClr val="dk1"/>
+            </a:fillRef>
+            <a:effectRef idx="0">
+              <a:schemeClr val="dk1"/>
+            </a:effectRef>
+            <a:fontRef idx="minor">
+              <a:schemeClr val="tx1"/>
+            </a:fontRef>
+          </p:style>
+        </p:cxnSp>
+        <p:cxnSp>
+          <p:nvCxnSpPr>
+            <p:cNvPr id="37" name="직선 연결선 36">
+              <a:extLst>
+                <a:ext uri="{FF2B5EF4-FFF2-40B4-BE49-F238E27FC236}">
+                  <a16:creationId xmlns:a16="http://schemas.microsoft.com/office/drawing/2014/main" id="{B076BF8D-F3FC-3AA4-1206-4483D35406C0}"/>
+                </a:ext>
+              </a:extLst>
+            </p:cNvPr>
+            <p:cNvCxnSpPr>
+              <a:cxnSpLocks/>
+            </p:cNvCxnSpPr>
+            <p:nvPr/>
+          </p:nvCxnSpPr>
+          <p:spPr>
+            <a:xfrm flipH="1">
+              <a:off x="1771649" y="2407219"/>
+              <a:ext cx="1419225" cy="0"/>
+            </a:xfrm>
+            <a:prstGeom prst="line">
+              <a:avLst/>
+            </a:prstGeom>
+            <a:ln w="9525">
+              <a:solidFill>
+                <a:schemeClr val="tx1"/>
+              </a:solidFill>
+              <a:prstDash val="dash"/>
+            </a:ln>
+          </p:spPr>
+          <p:style>
+            <a:lnRef idx="1">
+              <a:schemeClr val="dk1"/>
+            </a:lnRef>
+            <a:fillRef idx="0">
+              <a:schemeClr val="dk1"/>
+            </a:fillRef>
+            <a:effectRef idx="0">
+              <a:schemeClr val="dk1"/>
+            </a:effectRef>
+            <a:fontRef idx="minor">
+              <a:schemeClr val="tx1"/>
+            </a:fontRef>
+          </p:style>
+        </p:cxnSp>
+        <p:cxnSp>
+          <p:nvCxnSpPr>
+            <p:cNvPr id="11" name="직선 연결선 10">
+              <a:extLst>
+                <a:ext uri="{FF2B5EF4-FFF2-40B4-BE49-F238E27FC236}">
+                  <a16:creationId xmlns:a16="http://schemas.microsoft.com/office/drawing/2014/main" id="{4436F4CB-806B-EAC3-289F-C5F40412F66B}"/>
+                </a:ext>
+              </a:extLst>
+            </p:cNvPr>
+            <p:cNvCxnSpPr>
+              <a:cxnSpLocks/>
+            </p:cNvCxnSpPr>
+            <p:nvPr/>
+          </p:nvCxnSpPr>
+          <p:spPr>
+            <a:xfrm>
+              <a:off x="4075507" y="2886075"/>
+              <a:ext cx="0" cy="1114420"/>
+            </a:xfrm>
+            <a:prstGeom prst="line">
+              <a:avLst/>
+            </a:prstGeom>
+            <a:ln w="9525">
+              <a:solidFill>
+                <a:schemeClr val="tx1"/>
+              </a:solidFill>
+              <a:prstDash val="dash"/>
+            </a:ln>
+          </p:spPr>
+          <p:style>
+            <a:lnRef idx="1">
+              <a:schemeClr val="dk1"/>
+            </a:lnRef>
+            <a:fillRef idx="0">
+              <a:schemeClr val="dk1"/>
+            </a:fillRef>
+            <a:effectRef idx="0">
+              <a:schemeClr val="dk1"/>
+            </a:effectRef>
+            <a:fontRef idx="minor">
+              <a:schemeClr val="tx1"/>
+            </a:fontRef>
+          </p:style>
+        </p:cxnSp>
+        <p:cxnSp>
+          <p:nvCxnSpPr>
+            <p:cNvPr id="17" name="직선 연결선 16">
+              <a:extLst>
+                <a:ext uri="{FF2B5EF4-FFF2-40B4-BE49-F238E27FC236}">
+                  <a16:creationId xmlns:a16="http://schemas.microsoft.com/office/drawing/2014/main" id="{F9B03C1D-90A0-86FC-4D3D-73E959428DB9}"/>
+                </a:ext>
+              </a:extLst>
+            </p:cNvPr>
+            <p:cNvCxnSpPr>
+              <a:cxnSpLocks/>
+            </p:cNvCxnSpPr>
+            <p:nvPr/>
+          </p:nvCxnSpPr>
+          <p:spPr>
+            <a:xfrm>
+              <a:off x="6257924" y="1162050"/>
+              <a:ext cx="0" cy="2819399"/>
+            </a:xfrm>
+            <a:prstGeom prst="line">
+              <a:avLst/>
+            </a:prstGeom>
+            <a:ln w="9525">
+              <a:solidFill>
+                <a:schemeClr val="tx1"/>
+              </a:solidFill>
+              <a:prstDash val="dash"/>
+            </a:ln>
+          </p:spPr>
+          <p:style>
+            <a:lnRef idx="1">
+              <a:schemeClr val="dk1"/>
+            </a:lnRef>
+            <a:fillRef idx="0">
+              <a:schemeClr val="dk1"/>
+            </a:fillRef>
+            <a:effectRef idx="0">
+              <a:schemeClr val="dk1"/>
+            </a:effectRef>
+            <a:fontRef idx="minor">
+              <a:schemeClr val="tx1"/>
+            </a:fontRef>
+          </p:style>
+        </p:cxnSp>
+        <p:cxnSp>
+          <p:nvCxnSpPr>
+            <p:cNvPr id="21" name="직선 연결선 20">
+              <a:extLst>
+                <a:ext uri="{FF2B5EF4-FFF2-40B4-BE49-F238E27FC236}">
+                  <a16:creationId xmlns:a16="http://schemas.microsoft.com/office/drawing/2014/main" id="{A8928006-6917-DE3F-6F1A-0F274D864306}"/>
+                </a:ext>
+              </a:extLst>
+            </p:cNvPr>
+            <p:cNvCxnSpPr>
+              <a:cxnSpLocks/>
+            </p:cNvCxnSpPr>
+            <p:nvPr/>
+          </p:nvCxnSpPr>
+          <p:spPr>
+            <a:xfrm flipH="1">
+              <a:off x="3198018" y="3243683"/>
+              <a:ext cx="877489" cy="0"/>
+            </a:xfrm>
+            <a:prstGeom prst="line">
+              <a:avLst/>
+            </a:prstGeom>
+            <a:ln w="9525">
+              <a:solidFill>
+                <a:schemeClr val="tx1"/>
+              </a:solidFill>
+              <a:prstDash val="dash"/>
+            </a:ln>
+          </p:spPr>
+          <p:style>
+            <a:lnRef idx="1">
+              <a:schemeClr val="dk1"/>
+            </a:lnRef>
+            <a:fillRef idx="0">
+              <a:schemeClr val="dk1"/>
+            </a:fillRef>
+            <a:effectRef idx="0">
+              <a:schemeClr val="dk1"/>
+            </a:effectRef>
+            <a:fontRef idx="minor">
+              <a:schemeClr val="tx1"/>
+            </a:fontRef>
+          </p:style>
+        </p:cxnSp>
+        <p:cxnSp>
+          <p:nvCxnSpPr>
+            <p:cNvPr id="23" name="직선 연결선 22">
+              <a:extLst>
+                <a:ext uri="{FF2B5EF4-FFF2-40B4-BE49-F238E27FC236}">
+                  <a16:creationId xmlns:a16="http://schemas.microsoft.com/office/drawing/2014/main" id="{0363F412-1BAA-1790-8AE9-AC334CA6AE7A}"/>
+                </a:ext>
+              </a:extLst>
+            </p:cNvPr>
+            <p:cNvCxnSpPr>
+              <a:cxnSpLocks/>
+            </p:cNvCxnSpPr>
+            <p:nvPr/>
+          </p:nvCxnSpPr>
+          <p:spPr>
+            <a:xfrm flipH="1">
+              <a:off x="4075507" y="2891255"/>
+              <a:ext cx="798908" cy="0"/>
+            </a:xfrm>
+            <a:prstGeom prst="line">
+              <a:avLst/>
+            </a:prstGeom>
+            <a:ln w="9525">
+              <a:solidFill>
+                <a:schemeClr val="tx1"/>
+              </a:solidFill>
+              <a:prstDash val="dash"/>
+            </a:ln>
+          </p:spPr>
+          <p:style>
+            <a:lnRef idx="1">
+              <a:schemeClr val="dk1"/>
+            </a:lnRef>
+            <a:fillRef idx="0">
+              <a:schemeClr val="dk1"/>
+            </a:fillRef>
+            <a:effectRef idx="0">
+              <a:schemeClr val="dk1"/>
+            </a:effectRef>
+            <a:fontRef idx="minor">
+              <a:schemeClr val="tx1"/>
+            </a:fontRef>
+          </p:style>
+        </p:cxnSp>
+        <p:cxnSp>
+          <p:nvCxnSpPr>
+            <p:cNvPr id="26" name="직선 연결선 25">
+              <a:extLst>
+                <a:ext uri="{FF2B5EF4-FFF2-40B4-BE49-F238E27FC236}">
+                  <a16:creationId xmlns:a16="http://schemas.microsoft.com/office/drawing/2014/main" id="{CECE54C1-9FBE-3352-2992-A8925D7D5912}"/>
+                </a:ext>
+              </a:extLst>
+            </p:cNvPr>
+            <p:cNvCxnSpPr>
+              <a:cxnSpLocks/>
+            </p:cNvCxnSpPr>
+            <p:nvPr/>
+          </p:nvCxnSpPr>
+          <p:spPr>
+            <a:xfrm flipH="1">
+              <a:off x="4895849" y="1148180"/>
+              <a:ext cx="1381126" cy="0"/>
+            </a:xfrm>
+            <a:prstGeom prst="line">
+              <a:avLst/>
+            </a:prstGeom>
+            <a:ln w="9525">
+              <a:solidFill>
+                <a:schemeClr val="tx1"/>
+              </a:solidFill>
+              <a:prstDash val="dash"/>
+            </a:ln>
+          </p:spPr>
+          <p:style>
+            <a:lnRef idx="1">
+              <a:schemeClr val="dk1"/>
+            </a:lnRef>
+            <a:fillRef idx="0">
+              <a:schemeClr val="dk1"/>
+            </a:fillRef>
+            <a:effectRef idx="0">
+              <a:schemeClr val="dk1"/>
+            </a:effectRef>
+            <a:fontRef idx="minor">
+              <a:schemeClr val="tx1"/>
+            </a:fontRef>
+          </p:style>
+        </p:cxnSp>
+        <p:cxnSp>
+          <p:nvCxnSpPr>
+            <p:cNvPr id="65" name="직선 연결선 64">
+              <a:extLst>
+                <a:ext uri="{FF2B5EF4-FFF2-40B4-BE49-F238E27FC236}">
+                  <a16:creationId xmlns:a16="http://schemas.microsoft.com/office/drawing/2014/main" id="{A56CB206-B779-C3BF-7344-AA73785736D6}"/>
+                </a:ext>
+              </a:extLst>
+            </p:cNvPr>
+            <p:cNvCxnSpPr>
+              <a:cxnSpLocks/>
+            </p:cNvCxnSpPr>
+            <p:nvPr/>
+          </p:nvCxnSpPr>
+          <p:spPr>
+            <a:xfrm>
+              <a:off x="4895849" y="1150821"/>
+              <a:ext cx="0" cy="2819399"/>
+            </a:xfrm>
+            <a:prstGeom prst="line">
+              <a:avLst/>
+            </a:prstGeom>
+            <a:ln w="9525">
+              <a:solidFill>
+                <a:schemeClr val="tx1"/>
+              </a:solidFill>
+              <a:prstDash val="dash"/>
+            </a:ln>
+          </p:spPr>
+          <p:style>
+            <a:lnRef idx="1">
+              <a:schemeClr val="dk1"/>
+            </a:lnRef>
+            <a:fillRef idx="0">
+              <a:schemeClr val="dk1"/>
+            </a:fillRef>
+            <a:effectRef idx="0">
+              <a:schemeClr val="dk1"/>
+            </a:effectRef>
+            <a:fontRef idx="minor">
+              <a:schemeClr val="tx1"/>
+            </a:fontRef>
+          </p:style>
+        </p:cxnSp>
+        <p:cxnSp>
+          <p:nvCxnSpPr>
+            <p:cNvPr id="66" name="직선 연결선 65">
+              <a:extLst>
+                <a:ext uri="{FF2B5EF4-FFF2-40B4-BE49-F238E27FC236}">
+                  <a16:creationId xmlns:a16="http://schemas.microsoft.com/office/drawing/2014/main" id="{157AD3ED-E9A6-9D9C-37CA-D2B35E697F7F}"/>
+                </a:ext>
+              </a:extLst>
+            </p:cNvPr>
+            <p:cNvCxnSpPr>
+              <a:cxnSpLocks/>
+            </p:cNvCxnSpPr>
+            <p:nvPr/>
+          </p:nvCxnSpPr>
+          <p:spPr>
+            <a:xfrm>
+              <a:off x="1784983" y="2416741"/>
+              <a:ext cx="0" cy="1583754"/>
+            </a:xfrm>
+            <a:prstGeom prst="line">
+              <a:avLst/>
+            </a:prstGeom>
+            <a:ln w="9525">
+              <a:solidFill>
+                <a:schemeClr val="tx1"/>
+              </a:solidFill>
+              <a:prstDash val="dash"/>
+            </a:ln>
+          </p:spPr>
+          <p:style>
+            <a:lnRef idx="1">
+              <a:schemeClr val="dk1"/>
+            </a:lnRef>
+            <a:fillRef idx="0">
+              <a:schemeClr val="dk1"/>
+            </a:fillRef>
+            <a:effectRef idx="0">
+              <a:schemeClr val="dk1"/>
+            </a:effectRef>
+            <a:fontRef idx="minor">
+              <a:schemeClr val="tx1"/>
+            </a:fontRef>
+          </p:style>
+        </p:cxnSp>
+      </p:grpSp>
+    </p:spTree>
+    <p:extLst>
+      <p:ext uri="{BB962C8B-B14F-4D97-AF65-F5344CB8AC3E}">
+        <p14:creationId xmlns:p14="http://schemas.microsoft.com/office/powerpoint/2010/main" val="3722632269"/>
+      </p:ext>
+    </p:extLst>
+  </p:cSld>
+  <p:clrMapOvr>
+    <a:masterClrMapping/>
+  </p:clrMapOvr>
+</p:sld>
+</file>
+
+<file path=ppt/slides/slide4.xml><?xml version="1.0" encoding="utf-8"?>
+<p:sld xmlns:a="http://schemas.openxmlformats.org/drawingml/2006/main" xmlns:r="http://schemas.openxmlformats.org/officeDocument/2006/relationships" xmlns:p="http://schemas.openxmlformats.org/presentationml/2006/main">
+  <p:cSld>
+    <p:spTree>
+      <p:nvGrpSpPr>
+        <p:cNvPr id="1" name="">
+          <a:extLst>
+            <a:ext uri="{FF2B5EF4-FFF2-40B4-BE49-F238E27FC236}">
+              <a16:creationId xmlns:a16="http://schemas.microsoft.com/office/drawing/2014/main" id="{2D51B53C-2DD3-542D-6173-451D59D9963B}"/>
+            </a:ext>
+          </a:extLst>
+        </p:cNvPr>
+        <p:cNvGrpSpPr/>
+        <p:nvPr/>
+      </p:nvGrpSpPr>
+      <p:grpSpPr>
+        <a:xfrm>
+          <a:off x="0" y="0"/>
+          <a:ext cx="0" cy="0"/>
+          <a:chOff x="0" y="0"/>
+          <a:chExt cx="0" cy="0"/>
+        </a:xfrm>
+      </p:grpSpPr>
+      <p:cxnSp>
+        <p:nvCxnSpPr>
+          <p:cNvPr id="8" name="직선 화살표 연결선 7">
+            <a:extLst>
+              <a:ext uri="{FF2B5EF4-FFF2-40B4-BE49-F238E27FC236}">
+                <a16:creationId xmlns:a16="http://schemas.microsoft.com/office/drawing/2014/main" id="{AA6869A0-A3DC-A404-B5D1-2E7A2841B1D1}"/>
+              </a:ext>
+            </a:extLst>
+          </p:cNvPr>
+          <p:cNvCxnSpPr>
+            <a:cxnSpLocks/>
+          </p:cNvCxnSpPr>
+          <p:nvPr/>
+        </p:nvCxnSpPr>
+        <p:spPr>
+          <a:xfrm>
+            <a:off x="628650" y="3990973"/>
+            <a:ext cx="6715125" cy="0"/>
+          </a:xfrm>
+          <a:prstGeom prst="straightConnector1">
+            <a:avLst/>
+          </a:prstGeom>
+          <a:ln w="28575">
+            <a:solidFill>
+              <a:schemeClr val="tx1"/>
+            </a:solidFill>
+            <a:tailEnd type="triangle"/>
+          </a:ln>
+        </p:spPr>
+        <p:style>
+          <a:lnRef idx="1">
+            <a:schemeClr val="accent1"/>
+          </a:lnRef>
+          <a:fillRef idx="0">
+            <a:schemeClr val="accent1"/>
+          </a:fillRef>
+          <a:effectRef idx="0">
+            <a:schemeClr val="accent1"/>
+          </a:effectRef>
+          <a:fontRef idx="minor">
+            <a:schemeClr val="tx1"/>
+          </a:fontRef>
+        </p:style>
+      </p:cxnSp>
+      <p:cxnSp>
+        <p:nvCxnSpPr>
+          <p:cNvPr id="3" name="직선 화살표 연결선 2">
+            <a:extLst>
+              <a:ext uri="{FF2B5EF4-FFF2-40B4-BE49-F238E27FC236}">
+                <a16:creationId xmlns:a16="http://schemas.microsoft.com/office/drawing/2014/main" id="{08FE888B-06AB-653D-078E-4CCE476C177A}"/>
+              </a:ext>
+            </a:extLst>
+          </p:cNvPr>
+          <p:cNvCxnSpPr>
+            <a:cxnSpLocks/>
+          </p:cNvCxnSpPr>
+          <p:nvPr/>
+        </p:nvCxnSpPr>
+        <p:spPr>
+          <a:xfrm flipV="1">
+            <a:off x="1285875" y="419100"/>
+            <a:ext cx="0" cy="4171950"/>
+          </a:xfrm>
+          <a:prstGeom prst="straightConnector1">
+            <a:avLst/>
+          </a:prstGeom>
+          <a:ln w="28575">
+            <a:solidFill>
+              <a:schemeClr val="tx1"/>
+            </a:solidFill>
+            <a:tailEnd type="triangle"/>
+          </a:ln>
+        </p:spPr>
+        <p:style>
+          <a:lnRef idx="1">
+            <a:schemeClr val="accent1"/>
+          </a:lnRef>
+          <a:fillRef idx="0">
+            <a:schemeClr val="accent1"/>
+          </a:fillRef>
+          <a:effectRef idx="0">
+            <a:schemeClr val="accent1"/>
+          </a:effectRef>
+          <a:fontRef idx="minor">
+            <a:schemeClr val="tx1"/>
+          </a:fontRef>
+        </p:style>
+      </p:cxnSp>
+      <p:cxnSp>
+        <p:nvCxnSpPr>
+          <p:cNvPr id="27" name="직선 연결선 26">
+            <a:extLst>
+              <a:ext uri="{FF2B5EF4-FFF2-40B4-BE49-F238E27FC236}">
+                <a16:creationId xmlns:a16="http://schemas.microsoft.com/office/drawing/2014/main" id="{1C5220AA-0231-2D9B-99B8-22CD5B69C711}"/>
+              </a:ext>
+            </a:extLst>
+          </p:cNvPr>
+          <p:cNvCxnSpPr>
+            <a:cxnSpLocks/>
+          </p:cNvCxnSpPr>
+          <p:nvPr/>
+        </p:nvCxnSpPr>
+        <p:spPr>
+          <a:xfrm>
+            <a:off x="3190874" y="3243683"/>
+            <a:ext cx="0" cy="747290"/>
+          </a:xfrm>
+          <a:prstGeom prst="line">
+            <a:avLst/>
+          </a:prstGeom>
+          <a:ln>
+            <a:prstDash val="dash"/>
+          </a:ln>
+        </p:spPr>
+        <p:style>
+          <a:lnRef idx="1">
+            <a:schemeClr val="dk1"/>
+          </a:lnRef>
+          <a:fillRef idx="0">
+            <a:schemeClr val="dk1"/>
+          </a:fillRef>
+          <a:effectRef idx="0">
+            <a:schemeClr val="dk1"/>
+          </a:effectRef>
+          <a:fontRef idx="minor">
+            <a:schemeClr val="tx1"/>
+          </a:fontRef>
+        </p:style>
+      </p:cxnSp>
+      <mc:AlternateContent xmlns:mc="http://schemas.openxmlformats.org/markup-compatibility/2006">
+        <mc:Choice xmlns:a14="http://schemas.microsoft.com/office/drawing/2010/main" Requires="a14">
+          <p:sp>
+            <p:nvSpPr>
+              <p:cNvPr id="42" name="TextBox 41">
+                <a:extLst>
+                  <a:ext uri="{FF2B5EF4-FFF2-40B4-BE49-F238E27FC236}">
+                    <a16:creationId xmlns:a16="http://schemas.microsoft.com/office/drawing/2014/main" id="{51678188-34C7-D992-BC89-9F53EFF3C109}"/>
+                  </a:ext>
+                </a:extLst>
+              </p:cNvPr>
+              <p:cNvSpPr txBox="1"/>
+              <p:nvPr/>
+            </p:nvSpPr>
+            <p:spPr>
+              <a:xfrm>
+                <a:off x="3879056" y="3965096"/>
+                <a:ext cx="414336" cy="277255"/>
+              </a:xfrm>
+              <a:prstGeom prst="rect">
+                <a:avLst/>
+              </a:prstGeom>
+              <a:noFill/>
+            </p:spPr>
+            <p:txBody>
+              <a:bodyPr wrap="square" rtlCol="0">
+                <a:spAutoFit/>
+              </a:bodyPr>
+              <a:lstStyle/>
+              <a:p>
+                <a:pPr/>
+                <a14:m>
+                  <m:oMathPara xmlns:m="http://schemas.openxmlformats.org/officeDocument/2006/math">
+                    <m:oMathParaPr>
+                      <m:jc m:val="centerGroup"/>
+                    </m:oMathParaPr>
+                    <m:oMath xmlns:m="http://schemas.openxmlformats.org/officeDocument/2006/math">
+                      <m:sSub>
+                        <m:sSubPr>
+                          <m:ctrlPr>
+                            <a:rPr lang="en-US" altLang="ko-KR" sz="1100" b="0" i="1" dirty="0" smtClean="0">
+                              <a:latin typeface="Cambria Math" panose="02040503050406030204" pitchFamily="18" charset="0"/>
+                            </a:rPr>
+                          </m:ctrlPr>
+                        </m:sSubPr>
+                        <m:e>
+                          <m:r>
+                            <a:rPr lang="en-US" altLang="ko-KR" sz="1100" i="1" dirty="0" smtClean="0">
+                              <a:latin typeface="Cambria Math" panose="02040503050406030204" pitchFamily="18" charset="0"/>
+                            </a:rPr>
+                            <m:t>𝑥</m:t>
+                          </m:r>
+                        </m:e>
+                        <m:sub>
+                          <m:r>
+                            <m:rPr>
+                              <m:sty m:val="p"/>
+                            </m:rPr>
+                            <a:rPr lang="en-US" altLang="ko-KR" sz="1100" b="0" i="0" dirty="0" smtClean="0">
+                              <a:latin typeface="Cambria Math" panose="02040503050406030204" pitchFamily="18" charset="0"/>
+                            </a:rPr>
+                            <m:t>j</m:t>
+                          </m:r>
+                        </m:sub>
+                      </m:sSub>
+                    </m:oMath>
+                  </m:oMathPara>
+                </a14:m>
+                <a:endParaRPr lang="ko-KR" altLang="en-US" sz="1100" dirty="0"/>
+              </a:p>
+            </p:txBody>
+          </p:sp>
+        </mc:Choice>
+        <mc:Fallback>
+          <p:sp>
+            <p:nvSpPr>
+              <p:cNvPr id="42" name="TextBox 41">
+                <a:extLst>
+                  <a:ext uri="{FF2B5EF4-FFF2-40B4-BE49-F238E27FC236}">
+                    <a16:creationId xmlns:a16="http://schemas.microsoft.com/office/drawing/2014/main" id="{51678188-34C7-D992-BC89-9F53EFF3C109}"/>
+                  </a:ext>
+                </a:extLst>
+              </p:cNvPr>
+              <p:cNvSpPr txBox="1">
+                <a:spLocks noRot="1" noChangeAspect="1" noMove="1" noResize="1" noEditPoints="1" noAdjustHandles="1" noChangeArrowheads="1" noChangeShapeType="1" noTextEdit="1"/>
+              </p:cNvSpPr>
+              <p:nvPr/>
+            </p:nvSpPr>
+            <p:spPr>
+              <a:xfrm>
+                <a:off x="3879056" y="3965096"/>
+                <a:ext cx="414336" cy="277255"/>
+              </a:xfrm>
+              <a:prstGeom prst="rect">
+                <a:avLst/>
+              </a:prstGeom>
+              <a:blipFill>
+                <a:blip r:embed="rId2"/>
+                <a:stretch>
+                  <a:fillRect b="-2174"/>
+                </a:stretch>
+              </a:blipFill>
+            </p:spPr>
+            <p:txBody>
+              <a:bodyPr/>
+              <a:lstStyle/>
+              <a:p>
+                <a:r>
+                  <a:rPr lang="ko-KR" altLang="en-US">
+                    <a:noFill/>
+                  </a:rPr>
+                  <a:t> </a:t>
+                </a:r>
+              </a:p>
+            </p:txBody>
+          </p:sp>
+        </mc:Fallback>
+      </mc:AlternateContent>
+      <mc:AlternateContent xmlns:mc="http://schemas.openxmlformats.org/markup-compatibility/2006">
+        <mc:Choice xmlns:a14="http://schemas.microsoft.com/office/drawing/2010/main" Requires="a14">
+          <p:sp>
+            <p:nvSpPr>
+              <p:cNvPr id="45" name="TextBox 44">
+                <a:extLst>
+                  <a:ext uri="{FF2B5EF4-FFF2-40B4-BE49-F238E27FC236}">
+                    <a16:creationId xmlns:a16="http://schemas.microsoft.com/office/drawing/2014/main" id="{E930D874-05AF-DAAD-7C36-A79AFABBCA7D}"/>
+                  </a:ext>
+                </a:extLst>
+              </p:cNvPr>
+              <p:cNvSpPr txBox="1"/>
+              <p:nvPr/>
+            </p:nvSpPr>
+            <p:spPr>
+              <a:xfrm>
+                <a:off x="3405186" y="2995847"/>
+                <a:ext cx="414336" cy="277255"/>
+              </a:xfrm>
+              <a:prstGeom prst="rect">
+                <a:avLst/>
+              </a:prstGeom>
+              <a:noFill/>
+            </p:spPr>
+            <p:txBody>
+              <a:bodyPr wrap="square" rtlCol="0">
+                <a:spAutoFit/>
+              </a:bodyPr>
+              <a:lstStyle/>
+              <a:p>
+                <a:pPr/>
+                <a14:m>
+                  <m:oMathPara xmlns:m="http://schemas.openxmlformats.org/officeDocument/2006/math">
+                    <m:oMathParaPr>
+                      <m:jc m:val="centerGroup"/>
+                    </m:oMathParaPr>
+                    <m:oMath xmlns:m="http://schemas.openxmlformats.org/officeDocument/2006/math">
+                      <m:sSub>
+                        <m:sSubPr>
+                          <m:ctrlPr>
+                            <a:rPr lang="en-US" altLang="ko-KR" sz="1100" b="0" i="1" dirty="0" smtClean="0">
+                              <a:latin typeface="Cambria Math" panose="02040503050406030204" pitchFamily="18" charset="0"/>
+                            </a:rPr>
+                          </m:ctrlPr>
+                        </m:sSubPr>
+                        <m:e>
+                          <m:r>
+                            <a:rPr lang="en-US" altLang="ko-KR" sz="1100" b="0" i="1" dirty="0" smtClean="0">
+                              <a:latin typeface="Cambria Math" panose="02040503050406030204" pitchFamily="18" charset="0"/>
+                            </a:rPr>
+                            <m:t>𝑀</m:t>
+                          </m:r>
+                        </m:e>
+                        <m:sub>
+                          <m:r>
+                            <m:rPr>
+                              <m:sty m:val="p"/>
+                            </m:rPr>
+                            <a:rPr lang="en-US" altLang="ko-KR" sz="1100" b="0" i="0" dirty="0" smtClean="0">
+                              <a:latin typeface="Cambria Math" panose="02040503050406030204" pitchFamily="18" charset="0"/>
+                            </a:rPr>
+                            <m:t>j</m:t>
+                          </m:r>
+                        </m:sub>
+                      </m:sSub>
+                    </m:oMath>
+                  </m:oMathPara>
+                </a14:m>
+                <a:endParaRPr lang="ko-KR" altLang="en-US" sz="1100" dirty="0"/>
+              </a:p>
+            </p:txBody>
+          </p:sp>
+        </mc:Choice>
+        <mc:Fallback>
+          <p:sp>
+            <p:nvSpPr>
+              <p:cNvPr id="45" name="TextBox 44">
+                <a:extLst>
+                  <a:ext uri="{FF2B5EF4-FFF2-40B4-BE49-F238E27FC236}">
+                    <a16:creationId xmlns:a16="http://schemas.microsoft.com/office/drawing/2014/main" id="{E930D874-05AF-DAAD-7C36-A79AFABBCA7D}"/>
+                  </a:ext>
+                </a:extLst>
+              </p:cNvPr>
+              <p:cNvSpPr txBox="1">
+                <a:spLocks noRot="1" noChangeAspect="1" noMove="1" noResize="1" noEditPoints="1" noAdjustHandles="1" noChangeArrowheads="1" noChangeShapeType="1" noTextEdit="1"/>
+              </p:cNvSpPr>
+              <p:nvPr/>
+            </p:nvSpPr>
+            <p:spPr>
+              <a:xfrm>
+                <a:off x="3405186" y="2995847"/>
+                <a:ext cx="414336" cy="277255"/>
+              </a:xfrm>
+              <a:prstGeom prst="rect">
+                <a:avLst/>
+              </a:prstGeom>
+              <a:blipFill>
+                <a:blip r:embed="rId3"/>
+                <a:stretch>
+                  <a:fillRect b="-2174"/>
+                </a:stretch>
+              </a:blipFill>
+            </p:spPr>
+            <p:txBody>
+              <a:bodyPr/>
+              <a:lstStyle/>
+              <a:p>
+                <a:r>
+                  <a:rPr lang="ko-KR" altLang="en-US">
+                    <a:noFill/>
+                  </a:rPr>
+                  <a:t> </a:t>
+                </a:r>
+              </a:p>
+            </p:txBody>
+          </p:sp>
+        </mc:Fallback>
+      </mc:AlternateContent>
+      <mc:AlternateContent xmlns:mc="http://schemas.openxmlformats.org/markup-compatibility/2006">
+        <mc:Choice xmlns:a14="http://schemas.microsoft.com/office/drawing/2010/main" Requires="a14">
+          <p:sp>
+            <p:nvSpPr>
+              <p:cNvPr id="2" name="TextBox 1">
+                <a:extLst>
+                  <a:ext uri="{FF2B5EF4-FFF2-40B4-BE49-F238E27FC236}">
+                    <a16:creationId xmlns:a16="http://schemas.microsoft.com/office/drawing/2014/main" id="{C6CE7EFD-DA5C-1C3F-C22D-349FC47ED48D}"/>
+                  </a:ext>
+                </a:extLst>
+              </p:cNvPr>
+              <p:cNvSpPr txBox="1"/>
+              <p:nvPr/>
+            </p:nvSpPr>
+            <p:spPr>
+              <a:xfrm>
+                <a:off x="7188214" y="3970220"/>
+                <a:ext cx="338138" cy="261610"/>
+              </a:xfrm>
+              <a:prstGeom prst="rect">
+                <a:avLst/>
+              </a:prstGeom>
+              <a:noFill/>
+            </p:spPr>
+            <p:txBody>
+              <a:bodyPr wrap="square" rtlCol="0">
+                <a:spAutoFit/>
+              </a:bodyPr>
+              <a:lstStyle/>
+              <a:p>
+                <a:pPr/>
+                <a14:m>
+                  <m:oMathPara xmlns:m="http://schemas.openxmlformats.org/officeDocument/2006/math">
+                    <m:oMathParaPr>
+                      <m:jc m:val="centerGroup"/>
+                    </m:oMathParaPr>
+                    <m:oMath xmlns:m="http://schemas.openxmlformats.org/officeDocument/2006/math">
+                      <m:r>
+                        <a:rPr lang="en-US" altLang="ko-KR" sz="1100" i="1" dirty="0" smtClean="0">
+                          <a:latin typeface="Cambria Math" panose="02040503050406030204" pitchFamily="18" charset="0"/>
+                        </a:rPr>
+                        <m:t>𝑥</m:t>
+                      </m:r>
+                    </m:oMath>
+                  </m:oMathPara>
+                </a14:m>
+                <a:endParaRPr lang="ko-KR" altLang="en-US" sz="1100" dirty="0"/>
+              </a:p>
+            </p:txBody>
+          </p:sp>
+        </mc:Choice>
+        <mc:Fallback>
+          <p:sp>
+            <p:nvSpPr>
+              <p:cNvPr id="2" name="TextBox 1">
+                <a:extLst>
+                  <a:ext uri="{FF2B5EF4-FFF2-40B4-BE49-F238E27FC236}">
+                    <a16:creationId xmlns:a16="http://schemas.microsoft.com/office/drawing/2014/main" id="{C6CE7EFD-DA5C-1C3F-C22D-349FC47ED48D}"/>
+                  </a:ext>
+                </a:extLst>
+              </p:cNvPr>
+              <p:cNvSpPr txBox="1">
+                <a:spLocks noRot="1" noChangeAspect="1" noMove="1" noResize="1" noEditPoints="1" noAdjustHandles="1" noChangeArrowheads="1" noChangeShapeType="1" noTextEdit="1"/>
+              </p:cNvSpPr>
+              <p:nvPr/>
+            </p:nvSpPr>
+            <p:spPr>
+              <a:xfrm>
+                <a:off x="7188214" y="3970220"/>
+                <a:ext cx="338138" cy="261610"/>
+              </a:xfrm>
+              <a:prstGeom prst="rect">
+                <a:avLst/>
+              </a:prstGeom>
+              <a:blipFill>
+                <a:blip r:embed="rId4"/>
+                <a:stretch>
+                  <a:fillRect/>
+                </a:stretch>
+              </a:blipFill>
+            </p:spPr>
+            <p:txBody>
+              <a:bodyPr/>
+              <a:lstStyle/>
+              <a:p>
+                <a:r>
+                  <a:rPr lang="ko-KR" altLang="en-US">
+                    <a:noFill/>
+                  </a:rPr>
+                  <a:t> </a:t>
+                </a:r>
+              </a:p>
+            </p:txBody>
+          </p:sp>
+        </mc:Fallback>
+      </mc:AlternateContent>
+      <mc:AlternateContent xmlns:mc="http://schemas.openxmlformats.org/markup-compatibility/2006">
+        <mc:Choice xmlns:a14="http://schemas.microsoft.com/office/drawing/2010/main" Requires="a14">
+          <p:sp>
+            <p:nvSpPr>
+              <p:cNvPr id="4" name="TextBox 3">
+                <a:extLst>
+                  <a:ext uri="{FF2B5EF4-FFF2-40B4-BE49-F238E27FC236}">
+                    <a16:creationId xmlns:a16="http://schemas.microsoft.com/office/drawing/2014/main" id="{97755D1A-71B5-2E04-A8AB-13D63ACB806F}"/>
+                  </a:ext>
+                </a:extLst>
+              </p:cNvPr>
+              <p:cNvSpPr txBox="1"/>
+              <p:nvPr/>
+            </p:nvSpPr>
+            <p:spPr>
+              <a:xfrm>
+                <a:off x="988219" y="367040"/>
+                <a:ext cx="338138" cy="261610"/>
+              </a:xfrm>
+              <a:prstGeom prst="rect">
+                <a:avLst/>
+              </a:prstGeom>
+              <a:noFill/>
+            </p:spPr>
+            <p:txBody>
+              <a:bodyPr wrap="square" rtlCol="0">
+                <a:spAutoFit/>
+              </a:bodyPr>
+              <a:lstStyle/>
+              <a:p>
+                <a:pPr/>
+                <a14:m>
+                  <m:oMathPara xmlns:m="http://schemas.openxmlformats.org/officeDocument/2006/math">
+                    <m:oMathParaPr>
+                      <m:jc m:val="centerGroup"/>
+                    </m:oMathParaPr>
+                    <m:oMath xmlns:m="http://schemas.openxmlformats.org/officeDocument/2006/math">
+                      <m:r>
+                        <a:rPr lang="en-US" altLang="ko-KR" sz="1100" b="0" i="1" dirty="0" smtClean="0">
+                          <a:latin typeface="Cambria Math" panose="02040503050406030204" pitchFamily="18" charset="0"/>
+                        </a:rPr>
+                        <m:t>𝑦</m:t>
+                      </m:r>
+                    </m:oMath>
+                  </m:oMathPara>
+                </a14:m>
+                <a:endParaRPr lang="ko-KR" altLang="en-US" sz="1100" dirty="0"/>
+              </a:p>
+            </p:txBody>
+          </p:sp>
+        </mc:Choice>
+        <mc:Fallback>
+          <p:sp>
+            <p:nvSpPr>
+              <p:cNvPr id="4" name="TextBox 3">
+                <a:extLst>
+                  <a:ext uri="{FF2B5EF4-FFF2-40B4-BE49-F238E27FC236}">
+                    <a16:creationId xmlns:a16="http://schemas.microsoft.com/office/drawing/2014/main" id="{97755D1A-71B5-2E04-A8AB-13D63ACB806F}"/>
+                  </a:ext>
+                </a:extLst>
+              </p:cNvPr>
+              <p:cNvSpPr txBox="1">
+                <a:spLocks noRot="1" noChangeAspect="1" noMove="1" noResize="1" noEditPoints="1" noAdjustHandles="1" noChangeArrowheads="1" noChangeShapeType="1" noTextEdit="1"/>
+              </p:cNvSpPr>
+              <p:nvPr/>
+            </p:nvSpPr>
+            <p:spPr>
+              <a:xfrm>
+                <a:off x="988219" y="367040"/>
+                <a:ext cx="338138" cy="261610"/>
+              </a:xfrm>
+              <a:prstGeom prst="rect">
+                <a:avLst/>
+              </a:prstGeom>
+              <a:blipFill>
+                <a:blip r:embed="rId5"/>
+                <a:stretch>
+                  <a:fillRect/>
+                </a:stretch>
+              </a:blipFill>
+            </p:spPr>
+            <p:txBody>
+              <a:bodyPr/>
+              <a:lstStyle/>
+              <a:p>
+                <a:r>
+                  <a:rPr lang="ko-KR" altLang="en-US">
+                    <a:noFill/>
+                  </a:rPr>
+                  <a:t> </a:t>
+                </a:r>
+              </a:p>
+            </p:txBody>
+          </p:sp>
+        </mc:Fallback>
+      </mc:AlternateContent>
+      <mc:AlternateContent xmlns:mc="http://schemas.openxmlformats.org/markup-compatibility/2006">
+        <mc:Choice xmlns:a14="http://schemas.microsoft.com/office/drawing/2010/main" Requires="a14">
+          <p:sp>
+            <p:nvSpPr>
+              <p:cNvPr id="5" name="TextBox 4">
+                <a:extLst>
+                  <a:ext uri="{FF2B5EF4-FFF2-40B4-BE49-F238E27FC236}">
+                    <a16:creationId xmlns:a16="http://schemas.microsoft.com/office/drawing/2014/main" id="{D0AAD6FC-01A6-7420-7107-13C08E7F992A}"/>
+                  </a:ext>
+                </a:extLst>
+              </p:cNvPr>
+              <p:cNvSpPr txBox="1"/>
+              <p:nvPr/>
+            </p:nvSpPr>
+            <p:spPr>
+              <a:xfrm>
+                <a:off x="3487405" y="2536524"/>
+                <a:ext cx="962043" cy="261610"/>
+              </a:xfrm>
+              <a:prstGeom prst="rect">
+                <a:avLst/>
+              </a:prstGeom>
+              <a:noFill/>
+            </p:spPr>
+            <p:txBody>
+              <a:bodyPr wrap="square" rtlCol="0">
+                <a:spAutoFit/>
+              </a:bodyPr>
+              <a:lstStyle/>
+              <a:p>
+                <a:pPr/>
+                <a14:m>
+                  <m:oMathPara xmlns:m="http://schemas.openxmlformats.org/officeDocument/2006/math">
+                    <m:oMathParaPr>
+                      <m:jc m:val="centerGroup"/>
+                    </m:oMathParaPr>
+                    <m:oMath xmlns:m="http://schemas.openxmlformats.org/officeDocument/2006/math">
+                      <m:r>
+                        <a:rPr lang="en-US" altLang="ko-KR" sz="1100" b="0" i="1" dirty="0" smtClean="0">
+                          <a:solidFill>
+                            <a:schemeClr val="accent1">
+                              <a:lumMod val="75000"/>
+                            </a:schemeClr>
+                          </a:solidFill>
+                          <a:latin typeface="Cambria Math" panose="02040503050406030204" pitchFamily="18" charset="0"/>
+                        </a:rPr>
+                        <m:t>𝑦</m:t>
+                      </m:r>
+                      <m:r>
+                        <a:rPr lang="en-US" altLang="ko-KR" sz="1100" b="0" i="1" dirty="0" smtClean="0">
+                          <a:solidFill>
+                            <a:schemeClr val="accent1">
+                              <a:lumMod val="75000"/>
+                            </a:schemeClr>
+                          </a:solidFill>
+                          <a:latin typeface="Cambria Math" panose="02040503050406030204" pitchFamily="18" charset="0"/>
+                        </a:rPr>
+                        <m:t>=</m:t>
+                      </m:r>
+                      <m:sSub>
+                        <m:sSubPr>
+                          <m:ctrlPr>
+                            <a:rPr lang="en-US" altLang="ko-KR" sz="1100" b="0" i="1" dirty="0" smtClean="0">
+                              <a:solidFill>
+                                <a:schemeClr val="accent1">
+                                  <a:lumMod val="75000"/>
+                                </a:schemeClr>
+                              </a:solidFill>
+                              <a:latin typeface="Cambria Math" panose="02040503050406030204" pitchFamily="18" charset="0"/>
+                            </a:rPr>
+                          </m:ctrlPr>
+                        </m:sSubPr>
+                        <m:e>
+                          <m:r>
+                            <a:rPr lang="en-US" altLang="ko-KR" sz="1100" b="0" i="1" dirty="0" smtClean="0">
+                              <a:solidFill>
+                                <a:schemeClr val="accent1">
+                                  <a:lumMod val="75000"/>
+                                </a:schemeClr>
+                              </a:solidFill>
+                              <a:latin typeface="Cambria Math" panose="02040503050406030204" pitchFamily="18" charset="0"/>
+                            </a:rPr>
+                            <m:t>𝑓</m:t>
+                          </m:r>
+                        </m:e>
+                        <m:sub>
+                          <m:r>
+                            <a:rPr lang="en-US" altLang="ko-KR" sz="1100" b="0" i="1" dirty="0" smtClean="0">
+                              <a:solidFill>
+                                <a:schemeClr val="accent1">
+                                  <a:lumMod val="75000"/>
+                                </a:schemeClr>
+                              </a:solidFill>
+                              <a:latin typeface="Cambria Math" panose="02040503050406030204" pitchFamily="18" charset="0"/>
+                            </a:rPr>
+                            <m:t>𝑘</m:t>
+                          </m:r>
+                        </m:sub>
+                      </m:sSub>
+                      <m:r>
+                        <a:rPr lang="en-US" altLang="ko-KR" sz="1100" b="0" i="1" dirty="0" smtClean="0">
+                          <a:solidFill>
+                            <a:schemeClr val="accent1">
+                              <a:lumMod val="75000"/>
+                            </a:schemeClr>
+                          </a:solidFill>
+                          <a:latin typeface="Cambria Math" panose="02040503050406030204" pitchFamily="18" charset="0"/>
+                        </a:rPr>
+                        <m:t>(</m:t>
+                      </m:r>
+                      <m:r>
+                        <a:rPr lang="en-US" altLang="ko-KR" sz="1100" b="0" i="1" dirty="0" smtClean="0">
+                          <a:solidFill>
+                            <a:schemeClr val="accent1">
+                              <a:lumMod val="75000"/>
+                            </a:schemeClr>
+                          </a:solidFill>
+                          <a:latin typeface="Cambria Math" panose="02040503050406030204" pitchFamily="18" charset="0"/>
+                        </a:rPr>
+                        <m:t>𝑥</m:t>
+                      </m:r>
+                      <m:r>
+                        <a:rPr lang="en-US" altLang="ko-KR" sz="1100" b="0" i="1" dirty="0" smtClean="0">
+                          <a:solidFill>
+                            <a:schemeClr val="accent1">
+                              <a:lumMod val="75000"/>
+                            </a:schemeClr>
+                          </a:solidFill>
+                          <a:latin typeface="Cambria Math" panose="02040503050406030204" pitchFamily="18" charset="0"/>
+                        </a:rPr>
+                        <m:t>)</m:t>
+                      </m:r>
+                    </m:oMath>
+                  </m:oMathPara>
+                </a14:m>
+                <a:endParaRPr lang="ko-KR" altLang="en-US" sz="1100" dirty="0">
+                  <a:solidFill>
+                    <a:schemeClr val="accent1">
+                      <a:lumMod val="75000"/>
+                    </a:schemeClr>
+                  </a:solidFill>
+                </a:endParaRPr>
+              </a:p>
+            </p:txBody>
+          </p:sp>
+        </mc:Choice>
+        <mc:Fallback>
+          <p:sp>
+            <p:nvSpPr>
+              <p:cNvPr id="5" name="TextBox 4">
+                <a:extLst>
+                  <a:ext uri="{FF2B5EF4-FFF2-40B4-BE49-F238E27FC236}">
+                    <a16:creationId xmlns:a16="http://schemas.microsoft.com/office/drawing/2014/main" id="{D0AAD6FC-01A6-7420-7107-13C08E7F992A}"/>
+                  </a:ext>
+                </a:extLst>
+              </p:cNvPr>
+              <p:cNvSpPr txBox="1">
+                <a:spLocks noRot="1" noChangeAspect="1" noMove="1" noResize="1" noEditPoints="1" noAdjustHandles="1" noChangeArrowheads="1" noChangeShapeType="1" noTextEdit="1"/>
+              </p:cNvSpPr>
+              <p:nvPr/>
+            </p:nvSpPr>
+            <p:spPr>
+              <a:xfrm>
+                <a:off x="3487405" y="2536524"/>
+                <a:ext cx="962043" cy="261610"/>
+              </a:xfrm>
+              <a:prstGeom prst="rect">
+                <a:avLst/>
+              </a:prstGeom>
+              <a:blipFill>
+                <a:blip r:embed="rId6"/>
+                <a:stretch>
+                  <a:fillRect b="-6977"/>
+                </a:stretch>
+              </a:blipFill>
+            </p:spPr>
+            <p:txBody>
+              <a:bodyPr/>
+              <a:lstStyle/>
+              <a:p>
+                <a:r>
+                  <a:rPr lang="ko-KR" altLang="en-US">
+                    <a:noFill/>
+                  </a:rPr>
+                  <a:t> </a:t>
+                </a:r>
+              </a:p>
+            </p:txBody>
+          </p:sp>
+        </mc:Fallback>
+      </mc:AlternateContent>
+      <p:sp>
+        <p:nvSpPr>
+          <p:cNvPr id="7" name="자유형: 도형 6">
+            <a:extLst>
+              <a:ext uri="{FF2B5EF4-FFF2-40B4-BE49-F238E27FC236}">
+                <a16:creationId xmlns:a16="http://schemas.microsoft.com/office/drawing/2014/main" id="{B1D9B6C3-DA94-180D-8EC4-9151D7E5F11A}"/>
+              </a:ext>
+            </a:extLst>
+          </p:cNvPr>
+          <p:cNvSpPr/>
+          <p:nvPr/>
+        </p:nvSpPr>
+        <p:spPr>
+          <a:xfrm>
+            <a:off x="739746" y="1172413"/>
+            <a:ext cx="5537229" cy="3042487"/>
+          </a:xfrm>
+          <a:custGeom>
+            <a:avLst/>
+            <a:gdLst>
+              <a:gd name="connsiteX0" fmla="*/ 12729 w 5803929"/>
+              <a:gd name="connsiteY0" fmla="*/ 3371850 h 3376699"/>
+              <a:gd name="connsiteX1" fmla="*/ 146079 w 5803929"/>
+              <a:gd name="connsiteY1" fmla="*/ 3171825 h 3376699"/>
+              <a:gd name="connsiteX2" fmla="*/ 1050954 w 5803929"/>
+              <a:gd name="connsiteY2" fmla="*/ 2038350 h 3376699"/>
+              <a:gd name="connsiteX3" fmla="*/ 1736754 w 5803929"/>
+              <a:gd name="connsiteY3" fmla="*/ 1571625 h 3376699"/>
+              <a:gd name="connsiteX4" fmla="*/ 2146329 w 5803929"/>
+              <a:gd name="connsiteY4" fmla="*/ 1876425 h 3376699"/>
+              <a:gd name="connsiteX5" fmla="*/ 2422554 w 5803929"/>
+              <a:gd name="connsiteY5" fmla="*/ 2524125 h 3376699"/>
+              <a:gd name="connsiteX6" fmla="*/ 2594004 w 5803929"/>
+              <a:gd name="connsiteY6" fmla="*/ 2419350 h 3376699"/>
+              <a:gd name="connsiteX7" fmla="*/ 2727354 w 5803929"/>
+              <a:gd name="connsiteY7" fmla="*/ 2428875 h 3376699"/>
+              <a:gd name="connsiteX8" fmla="*/ 2860704 w 5803929"/>
+              <a:gd name="connsiteY8" fmla="*/ 2514600 h 3376699"/>
+              <a:gd name="connsiteX9" fmla="*/ 3013104 w 5803929"/>
+              <a:gd name="connsiteY9" fmla="*/ 2657475 h 3376699"/>
+              <a:gd name="connsiteX10" fmla="*/ 3356004 w 5803929"/>
+              <a:gd name="connsiteY10" fmla="*/ 2571750 h 3376699"/>
+              <a:gd name="connsiteX11" fmla="*/ 3689379 w 5803929"/>
+              <a:gd name="connsiteY11" fmla="*/ 2152650 h 3376699"/>
+              <a:gd name="connsiteX12" fmla="*/ 3975129 w 5803929"/>
+              <a:gd name="connsiteY12" fmla="*/ 2143125 h 3376699"/>
+              <a:gd name="connsiteX13" fmla="*/ 4403754 w 5803929"/>
+              <a:gd name="connsiteY13" fmla="*/ 1924050 h 3376699"/>
+              <a:gd name="connsiteX14" fmla="*/ 4746654 w 5803929"/>
+              <a:gd name="connsiteY14" fmla="*/ 1981200 h 3376699"/>
+              <a:gd name="connsiteX15" fmla="*/ 5270529 w 5803929"/>
+              <a:gd name="connsiteY15" fmla="*/ 657225 h 3376699"/>
+              <a:gd name="connsiteX16" fmla="*/ 5803929 w 5803929"/>
+              <a:gd name="connsiteY16" fmla="*/ 0 h 3376699"/>
+              <a:gd name="connsiteX0" fmla="*/ 12729 w 5899179"/>
+              <a:gd name="connsiteY0" fmla="*/ 2754671 h 2759520"/>
+              <a:gd name="connsiteX1" fmla="*/ 146079 w 5899179"/>
+              <a:gd name="connsiteY1" fmla="*/ 2554646 h 2759520"/>
+              <a:gd name="connsiteX2" fmla="*/ 1050954 w 5899179"/>
+              <a:gd name="connsiteY2" fmla="*/ 1421171 h 2759520"/>
+              <a:gd name="connsiteX3" fmla="*/ 1736754 w 5899179"/>
+              <a:gd name="connsiteY3" fmla="*/ 954446 h 2759520"/>
+              <a:gd name="connsiteX4" fmla="*/ 2146329 w 5899179"/>
+              <a:gd name="connsiteY4" fmla="*/ 1259246 h 2759520"/>
+              <a:gd name="connsiteX5" fmla="*/ 2422554 w 5899179"/>
+              <a:gd name="connsiteY5" fmla="*/ 1906946 h 2759520"/>
+              <a:gd name="connsiteX6" fmla="*/ 2594004 w 5899179"/>
+              <a:gd name="connsiteY6" fmla="*/ 1802171 h 2759520"/>
+              <a:gd name="connsiteX7" fmla="*/ 2727354 w 5899179"/>
+              <a:gd name="connsiteY7" fmla="*/ 1811696 h 2759520"/>
+              <a:gd name="connsiteX8" fmla="*/ 2860704 w 5899179"/>
+              <a:gd name="connsiteY8" fmla="*/ 1897421 h 2759520"/>
+              <a:gd name="connsiteX9" fmla="*/ 3013104 w 5899179"/>
+              <a:gd name="connsiteY9" fmla="*/ 2040296 h 2759520"/>
+              <a:gd name="connsiteX10" fmla="*/ 3356004 w 5899179"/>
+              <a:gd name="connsiteY10" fmla="*/ 1954571 h 2759520"/>
+              <a:gd name="connsiteX11" fmla="*/ 3689379 w 5899179"/>
+              <a:gd name="connsiteY11" fmla="*/ 1535471 h 2759520"/>
+              <a:gd name="connsiteX12" fmla="*/ 3975129 w 5899179"/>
+              <a:gd name="connsiteY12" fmla="*/ 1525946 h 2759520"/>
+              <a:gd name="connsiteX13" fmla="*/ 4403754 w 5899179"/>
+              <a:gd name="connsiteY13" fmla="*/ 1306871 h 2759520"/>
+              <a:gd name="connsiteX14" fmla="*/ 4746654 w 5899179"/>
+              <a:gd name="connsiteY14" fmla="*/ 1364021 h 2759520"/>
+              <a:gd name="connsiteX15" fmla="*/ 5270529 w 5899179"/>
+              <a:gd name="connsiteY15" fmla="*/ 40046 h 2759520"/>
+              <a:gd name="connsiteX16" fmla="*/ 5899179 w 5899179"/>
+              <a:gd name="connsiteY16" fmla="*/ 1459271 h 2759520"/>
+              <a:gd name="connsiteX0" fmla="*/ 12729 w 5899179"/>
+              <a:gd name="connsiteY0" fmla="*/ 3195143 h 3199992"/>
+              <a:gd name="connsiteX1" fmla="*/ 146079 w 5899179"/>
+              <a:gd name="connsiteY1" fmla="*/ 2995118 h 3199992"/>
+              <a:gd name="connsiteX2" fmla="*/ 1050954 w 5899179"/>
+              <a:gd name="connsiteY2" fmla="*/ 1861643 h 3199992"/>
+              <a:gd name="connsiteX3" fmla="*/ 1736754 w 5899179"/>
+              <a:gd name="connsiteY3" fmla="*/ 1394918 h 3199992"/>
+              <a:gd name="connsiteX4" fmla="*/ 2146329 w 5899179"/>
+              <a:gd name="connsiteY4" fmla="*/ 1699718 h 3199992"/>
+              <a:gd name="connsiteX5" fmla="*/ 2422554 w 5899179"/>
+              <a:gd name="connsiteY5" fmla="*/ 2347418 h 3199992"/>
+              <a:gd name="connsiteX6" fmla="*/ 2594004 w 5899179"/>
+              <a:gd name="connsiteY6" fmla="*/ 2242643 h 3199992"/>
+              <a:gd name="connsiteX7" fmla="*/ 2727354 w 5899179"/>
+              <a:gd name="connsiteY7" fmla="*/ 2252168 h 3199992"/>
+              <a:gd name="connsiteX8" fmla="*/ 2860704 w 5899179"/>
+              <a:gd name="connsiteY8" fmla="*/ 2337893 h 3199992"/>
+              <a:gd name="connsiteX9" fmla="*/ 3013104 w 5899179"/>
+              <a:gd name="connsiteY9" fmla="*/ 2480768 h 3199992"/>
+              <a:gd name="connsiteX10" fmla="*/ 3356004 w 5899179"/>
+              <a:gd name="connsiteY10" fmla="*/ 2395043 h 3199992"/>
+              <a:gd name="connsiteX11" fmla="*/ 3689379 w 5899179"/>
+              <a:gd name="connsiteY11" fmla="*/ 1975943 h 3199992"/>
+              <a:gd name="connsiteX12" fmla="*/ 3975129 w 5899179"/>
+              <a:gd name="connsiteY12" fmla="*/ 1966418 h 3199992"/>
+              <a:gd name="connsiteX13" fmla="*/ 4403754 w 5899179"/>
+              <a:gd name="connsiteY13" fmla="*/ 1747343 h 3199992"/>
+              <a:gd name="connsiteX14" fmla="*/ 4746654 w 5899179"/>
+              <a:gd name="connsiteY14" fmla="*/ 1804493 h 3199992"/>
+              <a:gd name="connsiteX15" fmla="*/ 5280054 w 5899179"/>
+              <a:gd name="connsiteY15" fmla="*/ 32843 h 3199992"/>
+              <a:gd name="connsiteX16" fmla="*/ 5899179 w 5899179"/>
+              <a:gd name="connsiteY16" fmla="*/ 1899743 h 3199992"/>
+              <a:gd name="connsiteX0" fmla="*/ 12729 w 5899179"/>
+              <a:gd name="connsiteY0" fmla="*/ 3082425 h 3087274"/>
+              <a:gd name="connsiteX1" fmla="*/ 146079 w 5899179"/>
+              <a:gd name="connsiteY1" fmla="*/ 2882400 h 3087274"/>
+              <a:gd name="connsiteX2" fmla="*/ 1050954 w 5899179"/>
+              <a:gd name="connsiteY2" fmla="*/ 1748925 h 3087274"/>
+              <a:gd name="connsiteX3" fmla="*/ 1736754 w 5899179"/>
+              <a:gd name="connsiteY3" fmla="*/ 1282200 h 3087274"/>
+              <a:gd name="connsiteX4" fmla="*/ 2146329 w 5899179"/>
+              <a:gd name="connsiteY4" fmla="*/ 1587000 h 3087274"/>
+              <a:gd name="connsiteX5" fmla="*/ 2422554 w 5899179"/>
+              <a:gd name="connsiteY5" fmla="*/ 2234700 h 3087274"/>
+              <a:gd name="connsiteX6" fmla="*/ 2594004 w 5899179"/>
+              <a:gd name="connsiteY6" fmla="*/ 2129925 h 3087274"/>
+              <a:gd name="connsiteX7" fmla="*/ 2727354 w 5899179"/>
+              <a:gd name="connsiteY7" fmla="*/ 2139450 h 3087274"/>
+              <a:gd name="connsiteX8" fmla="*/ 2860704 w 5899179"/>
+              <a:gd name="connsiteY8" fmla="*/ 2225175 h 3087274"/>
+              <a:gd name="connsiteX9" fmla="*/ 3013104 w 5899179"/>
+              <a:gd name="connsiteY9" fmla="*/ 2368050 h 3087274"/>
+              <a:gd name="connsiteX10" fmla="*/ 3356004 w 5899179"/>
+              <a:gd name="connsiteY10" fmla="*/ 2282325 h 3087274"/>
+              <a:gd name="connsiteX11" fmla="*/ 3689379 w 5899179"/>
+              <a:gd name="connsiteY11" fmla="*/ 1863225 h 3087274"/>
+              <a:gd name="connsiteX12" fmla="*/ 3975129 w 5899179"/>
+              <a:gd name="connsiteY12" fmla="*/ 1853700 h 3087274"/>
+              <a:gd name="connsiteX13" fmla="*/ 4403754 w 5899179"/>
+              <a:gd name="connsiteY13" fmla="*/ 1634625 h 3087274"/>
+              <a:gd name="connsiteX14" fmla="*/ 4746654 w 5899179"/>
+              <a:gd name="connsiteY14" fmla="*/ 1691775 h 3087274"/>
+              <a:gd name="connsiteX15" fmla="*/ 5184804 w 5899179"/>
+              <a:gd name="connsiteY15" fmla="*/ 34425 h 3087274"/>
+              <a:gd name="connsiteX16" fmla="*/ 5899179 w 5899179"/>
+              <a:gd name="connsiteY16" fmla="*/ 1787025 h 3087274"/>
+              <a:gd name="connsiteX0" fmla="*/ 12729 w 5899179"/>
+              <a:gd name="connsiteY0" fmla="*/ 3035504 h 3040353"/>
+              <a:gd name="connsiteX1" fmla="*/ 146079 w 5899179"/>
+              <a:gd name="connsiteY1" fmla="*/ 2835479 h 3040353"/>
+              <a:gd name="connsiteX2" fmla="*/ 1050954 w 5899179"/>
+              <a:gd name="connsiteY2" fmla="*/ 1702004 h 3040353"/>
+              <a:gd name="connsiteX3" fmla="*/ 1736754 w 5899179"/>
+              <a:gd name="connsiteY3" fmla="*/ 1235279 h 3040353"/>
+              <a:gd name="connsiteX4" fmla="*/ 2146329 w 5899179"/>
+              <a:gd name="connsiteY4" fmla="*/ 1540079 h 3040353"/>
+              <a:gd name="connsiteX5" fmla="*/ 2422554 w 5899179"/>
+              <a:gd name="connsiteY5" fmla="*/ 2187779 h 3040353"/>
+              <a:gd name="connsiteX6" fmla="*/ 2594004 w 5899179"/>
+              <a:gd name="connsiteY6" fmla="*/ 2083004 h 3040353"/>
+              <a:gd name="connsiteX7" fmla="*/ 2727354 w 5899179"/>
+              <a:gd name="connsiteY7" fmla="*/ 2092529 h 3040353"/>
+              <a:gd name="connsiteX8" fmla="*/ 2860704 w 5899179"/>
+              <a:gd name="connsiteY8" fmla="*/ 2178254 h 3040353"/>
+              <a:gd name="connsiteX9" fmla="*/ 3013104 w 5899179"/>
+              <a:gd name="connsiteY9" fmla="*/ 2321129 h 3040353"/>
+              <a:gd name="connsiteX10" fmla="*/ 3356004 w 5899179"/>
+              <a:gd name="connsiteY10" fmla="*/ 2235404 h 3040353"/>
+              <a:gd name="connsiteX11" fmla="*/ 3689379 w 5899179"/>
+              <a:gd name="connsiteY11" fmla="*/ 1816304 h 3040353"/>
+              <a:gd name="connsiteX12" fmla="*/ 3975129 w 5899179"/>
+              <a:gd name="connsiteY12" fmla="*/ 1806779 h 3040353"/>
+              <a:gd name="connsiteX13" fmla="*/ 4403754 w 5899179"/>
+              <a:gd name="connsiteY13" fmla="*/ 1587704 h 3040353"/>
+              <a:gd name="connsiteX14" fmla="*/ 4746654 w 5899179"/>
+              <a:gd name="connsiteY14" fmla="*/ 1644854 h 3040353"/>
+              <a:gd name="connsiteX15" fmla="*/ 5118129 w 5899179"/>
+              <a:gd name="connsiteY15" fmla="*/ 35129 h 3040353"/>
+              <a:gd name="connsiteX16" fmla="*/ 5899179 w 5899179"/>
+              <a:gd name="connsiteY16" fmla="*/ 1740104 h 3040353"/>
+              <a:gd name="connsiteX0" fmla="*/ 12729 w 5537229"/>
+              <a:gd name="connsiteY0" fmla="*/ 3037638 h 3042487"/>
+              <a:gd name="connsiteX1" fmla="*/ 146079 w 5537229"/>
+              <a:gd name="connsiteY1" fmla="*/ 2837613 h 3042487"/>
+              <a:gd name="connsiteX2" fmla="*/ 1050954 w 5537229"/>
+              <a:gd name="connsiteY2" fmla="*/ 1704138 h 3042487"/>
+              <a:gd name="connsiteX3" fmla="*/ 1736754 w 5537229"/>
+              <a:gd name="connsiteY3" fmla="*/ 1237413 h 3042487"/>
+              <a:gd name="connsiteX4" fmla="*/ 2146329 w 5537229"/>
+              <a:gd name="connsiteY4" fmla="*/ 1542213 h 3042487"/>
+              <a:gd name="connsiteX5" fmla="*/ 2422554 w 5537229"/>
+              <a:gd name="connsiteY5" fmla="*/ 2189913 h 3042487"/>
+              <a:gd name="connsiteX6" fmla="*/ 2594004 w 5537229"/>
+              <a:gd name="connsiteY6" fmla="*/ 2085138 h 3042487"/>
+              <a:gd name="connsiteX7" fmla="*/ 2727354 w 5537229"/>
+              <a:gd name="connsiteY7" fmla="*/ 2094663 h 3042487"/>
+              <a:gd name="connsiteX8" fmla="*/ 2860704 w 5537229"/>
+              <a:gd name="connsiteY8" fmla="*/ 2180388 h 3042487"/>
+              <a:gd name="connsiteX9" fmla="*/ 3013104 w 5537229"/>
+              <a:gd name="connsiteY9" fmla="*/ 2323263 h 3042487"/>
+              <a:gd name="connsiteX10" fmla="*/ 3356004 w 5537229"/>
+              <a:gd name="connsiteY10" fmla="*/ 2237538 h 3042487"/>
+              <a:gd name="connsiteX11" fmla="*/ 3689379 w 5537229"/>
+              <a:gd name="connsiteY11" fmla="*/ 1818438 h 3042487"/>
+              <a:gd name="connsiteX12" fmla="*/ 3975129 w 5537229"/>
+              <a:gd name="connsiteY12" fmla="*/ 1808913 h 3042487"/>
+              <a:gd name="connsiteX13" fmla="*/ 4403754 w 5537229"/>
+              <a:gd name="connsiteY13" fmla="*/ 1589838 h 3042487"/>
+              <a:gd name="connsiteX14" fmla="*/ 4746654 w 5537229"/>
+              <a:gd name="connsiteY14" fmla="*/ 1646988 h 3042487"/>
+              <a:gd name="connsiteX15" fmla="*/ 5118129 w 5537229"/>
+              <a:gd name="connsiteY15" fmla="*/ 37263 h 3042487"/>
+              <a:gd name="connsiteX16" fmla="*/ 5537229 w 5537229"/>
+              <a:gd name="connsiteY16" fmla="*/ 1608888 h 3042487"/>
+            </a:gdLst>
+            <a:ahLst/>
+            <a:cxnLst>
+              <a:cxn ang="0">
+                <a:pos x="connsiteX0" y="connsiteY0"/>
+              </a:cxn>
+              <a:cxn ang="0">
+                <a:pos x="connsiteX1" y="connsiteY1"/>
+              </a:cxn>
+              <a:cxn ang="0">
+                <a:pos x="connsiteX2" y="connsiteY2"/>
+              </a:cxn>
+              <a:cxn ang="0">
+                <a:pos x="connsiteX3" y="connsiteY3"/>
+              </a:cxn>
+              <a:cxn ang="0">
+                <a:pos x="connsiteX4" y="connsiteY4"/>
+              </a:cxn>
+              <a:cxn ang="0">
+                <a:pos x="connsiteX5" y="connsiteY5"/>
+              </a:cxn>
+              <a:cxn ang="0">
+                <a:pos x="connsiteX6" y="connsiteY6"/>
+              </a:cxn>
+              <a:cxn ang="0">
+                <a:pos x="connsiteX7" y="connsiteY7"/>
+              </a:cxn>
+              <a:cxn ang="0">
+                <a:pos x="connsiteX8" y="connsiteY8"/>
+              </a:cxn>
+              <a:cxn ang="0">
+                <a:pos x="connsiteX9" y="connsiteY9"/>
+              </a:cxn>
+              <a:cxn ang="0">
+                <a:pos x="connsiteX10" y="connsiteY10"/>
+              </a:cxn>
+              <a:cxn ang="0">
+                <a:pos x="connsiteX11" y="connsiteY11"/>
+              </a:cxn>
+              <a:cxn ang="0">
+                <a:pos x="connsiteX12" y="connsiteY12"/>
+              </a:cxn>
+              <a:cxn ang="0">
+                <a:pos x="connsiteX13" y="connsiteY13"/>
+              </a:cxn>
+              <a:cxn ang="0">
+                <a:pos x="connsiteX14" y="connsiteY14"/>
+              </a:cxn>
+              <a:cxn ang="0">
+                <a:pos x="connsiteX15" y="connsiteY15"/>
+              </a:cxn>
+              <a:cxn ang="0">
+                <a:pos x="connsiteX16" y="connsiteY16"/>
+              </a:cxn>
+            </a:cxnLst>
+            <a:rect l="l" t="t" r="r" b="b"/>
+            <a:pathLst>
+              <a:path w="5537229" h="3042487">
+                <a:moveTo>
+                  <a:pt x="12729" y="3037638"/>
+                </a:moveTo>
+                <a:cubicBezTo>
+                  <a:pt x="-7115" y="3048750"/>
+                  <a:pt x="-26958" y="3059863"/>
+                  <a:pt x="146079" y="2837613"/>
+                </a:cubicBezTo>
+                <a:cubicBezTo>
+                  <a:pt x="319116" y="2615363"/>
+                  <a:pt x="785842" y="1970838"/>
+                  <a:pt x="1050954" y="1704138"/>
+                </a:cubicBezTo>
+                <a:cubicBezTo>
+                  <a:pt x="1316066" y="1437438"/>
+                  <a:pt x="1554192" y="1264400"/>
+                  <a:pt x="1736754" y="1237413"/>
+                </a:cubicBezTo>
+                <a:cubicBezTo>
+                  <a:pt x="1919316" y="1210426"/>
+                  <a:pt x="2032029" y="1383463"/>
+                  <a:pt x="2146329" y="1542213"/>
+                </a:cubicBezTo>
+                <a:cubicBezTo>
+                  <a:pt x="2260629" y="1700963"/>
+                  <a:pt x="2347942" y="2099426"/>
+                  <a:pt x="2422554" y="2189913"/>
+                </a:cubicBezTo>
+                <a:cubicBezTo>
+                  <a:pt x="2497166" y="2280400"/>
+                  <a:pt x="2543204" y="2101013"/>
+                  <a:pt x="2594004" y="2085138"/>
+                </a:cubicBezTo>
+                <a:cubicBezTo>
+                  <a:pt x="2644804" y="2069263"/>
+                  <a:pt x="2682904" y="2078788"/>
+                  <a:pt x="2727354" y="2094663"/>
+                </a:cubicBezTo>
+                <a:cubicBezTo>
+                  <a:pt x="2771804" y="2110538"/>
+                  <a:pt x="2813079" y="2142288"/>
+                  <a:pt x="2860704" y="2180388"/>
+                </a:cubicBezTo>
+                <a:cubicBezTo>
+                  <a:pt x="2908329" y="2218488"/>
+                  <a:pt x="2930554" y="2313738"/>
+                  <a:pt x="3013104" y="2323263"/>
+                </a:cubicBezTo>
+                <a:cubicBezTo>
+                  <a:pt x="3095654" y="2332788"/>
+                  <a:pt x="3243292" y="2321675"/>
+                  <a:pt x="3356004" y="2237538"/>
+                </a:cubicBezTo>
+                <a:cubicBezTo>
+                  <a:pt x="3468716" y="2153401"/>
+                  <a:pt x="3586191" y="1889876"/>
+                  <a:pt x="3689379" y="1818438"/>
+                </a:cubicBezTo>
+                <a:cubicBezTo>
+                  <a:pt x="3792567" y="1747000"/>
+                  <a:pt x="3856067" y="1847013"/>
+                  <a:pt x="3975129" y="1808913"/>
+                </a:cubicBezTo>
+                <a:cubicBezTo>
+                  <a:pt x="4094191" y="1770813"/>
+                  <a:pt x="4275167" y="1616825"/>
+                  <a:pt x="4403754" y="1589838"/>
+                </a:cubicBezTo>
+                <a:cubicBezTo>
+                  <a:pt x="4532342" y="1562850"/>
+                  <a:pt x="4627592" y="1905751"/>
+                  <a:pt x="4746654" y="1646988"/>
+                </a:cubicBezTo>
+                <a:cubicBezTo>
+                  <a:pt x="4865717" y="1388226"/>
+                  <a:pt x="4941917" y="367463"/>
+                  <a:pt x="5118129" y="37263"/>
+                </a:cubicBezTo>
+                <a:cubicBezTo>
+                  <a:pt x="5294341" y="-292937"/>
+                  <a:pt x="5448329" y="1681913"/>
+                  <a:pt x="5537229" y="1608888"/>
+                </a:cubicBezTo>
+              </a:path>
+            </a:pathLst>
+          </a:custGeom>
+          <a:noFill/>
+        </p:spPr>
+        <p:style>
+          <a:lnRef idx="2">
+            <a:schemeClr val="accent1">
+              <a:shade val="15000"/>
+            </a:schemeClr>
+          </a:lnRef>
+          <a:fillRef idx="1">
+            <a:schemeClr val="accent1"/>
+          </a:fillRef>
+          <a:effectRef idx="0">
+            <a:schemeClr val="accent1"/>
+          </a:effectRef>
+          <a:fontRef idx="minor">
+            <a:schemeClr val="lt1"/>
+          </a:fontRef>
+        </p:style>
+        <p:txBody>
+          <a:bodyPr rtlCol="0" anchor="ctr"/>
+          <a:lstStyle/>
+          <a:p>
+            <a:pPr algn="ctr"/>
+            <a:endParaRPr lang="ko-KR" altLang="en-US"/>
+          </a:p>
+        </p:txBody>
+      </p:sp>
+      <p:cxnSp>
+        <p:nvCxnSpPr>
+          <p:cNvPr id="11" name="직선 연결선 10">
+            <a:extLst>
+              <a:ext uri="{FF2B5EF4-FFF2-40B4-BE49-F238E27FC236}">
+                <a16:creationId xmlns:a16="http://schemas.microsoft.com/office/drawing/2014/main" id="{82EED9B7-95EE-C367-FA02-6EF0736F1953}"/>
+              </a:ext>
+            </a:extLst>
+          </p:cNvPr>
+          <p:cNvCxnSpPr>
+            <a:cxnSpLocks/>
+          </p:cNvCxnSpPr>
+          <p:nvPr/>
+        </p:nvCxnSpPr>
+        <p:spPr>
+          <a:xfrm>
+            <a:off x="4075507" y="3063240"/>
+            <a:ext cx="0" cy="937255"/>
+          </a:xfrm>
+          <a:prstGeom prst="line">
+            <a:avLst/>
+          </a:prstGeom>
+          <a:ln>
+            <a:prstDash val="dash"/>
+          </a:ln>
+        </p:spPr>
+        <p:style>
+          <a:lnRef idx="1">
+            <a:schemeClr val="dk1"/>
+          </a:lnRef>
+          <a:fillRef idx="0">
+            <a:schemeClr val="dk1"/>
+          </a:fillRef>
+          <a:effectRef idx="0">
+            <a:schemeClr val="dk1"/>
+          </a:effectRef>
+          <a:fontRef idx="minor">
+            <a:schemeClr val="tx1"/>
+          </a:fontRef>
+        </p:style>
+      </p:cxnSp>
+      <p:cxnSp>
+        <p:nvCxnSpPr>
+          <p:cNvPr id="16" name="직선 연결선 15">
+            <a:extLst>
+              <a:ext uri="{FF2B5EF4-FFF2-40B4-BE49-F238E27FC236}">
+                <a16:creationId xmlns:a16="http://schemas.microsoft.com/office/drawing/2014/main" id="{BF7A917A-C634-2AE0-7D17-5E22ED957B65}"/>
+              </a:ext>
+            </a:extLst>
+          </p:cNvPr>
+          <p:cNvCxnSpPr>
+            <a:cxnSpLocks/>
+          </p:cNvCxnSpPr>
+          <p:nvPr/>
+        </p:nvCxnSpPr>
+        <p:spPr>
+          <a:xfrm>
+            <a:off x="4895849" y="2891255"/>
+            <a:ext cx="0" cy="1118765"/>
+          </a:xfrm>
+          <a:prstGeom prst="line">
+            <a:avLst/>
+          </a:prstGeom>
+          <a:ln>
+            <a:prstDash val="dash"/>
+          </a:ln>
+        </p:spPr>
+        <p:style>
+          <a:lnRef idx="1">
+            <a:schemeClr val="dk1"/>
+          </a:lnRef>
+          <a:fillRef idx="0">
+            <a:schemeClr val="dk1"/>
+          </a:fillRef>
+          <a:effectRef idx="0">
+            <a:schemeClr val="dk1"/>
+          </a:effectRef>
+          <a:fontRef idx="minor">
+            <a:schemeClr val="tx1"/>
+          </a:fontRef>
+        </p:style>
+      </p:cxnSp>
+      <p:cxnSp>
+        <p:nvCxnSpPr>
+          <p:cNvPr id="21" name="직선 연결선 20">
+            <a:extLst>
+              <a:ext uri="{FF2B5EF4-FFF2-40B4-BE49-F238E27FC236}">
+                <a16:creationId xmlns:a16="http://schemas.microsoft.com/office/drawing/2014/main" id="{F1C63B7E-354A-611C-4B17-546060D5054A}"/>
+              </a:ext>
+            </a:extLst>
+          </p:cNvPr>
+          <p:cNvCxnSpPr>
+            <a:cxnSpLocks/>
+          </p:cNvCxnSpPr>
+          <p:nvPr/>
+        </p:nvCxnSpPr>
+        <p:spPr>
+          <a:xfrm flipH="1">
+            <a:off x="3198018" y="3243683"/>
+            <a:ext cx="793909" cy="0"/>
+          </a:xfrm>
+          <a:prstGeom prst="line">
+            <a:avLst/>
+          </a:prstGeom>
+          <a:ln w="28575">
+            <a:solidFill>
+              <a:schemeClr val="accent1"/>
+            </a:solidFill>
+            <a:prstDash val="solid"/>
+          </a:ln>
+        </p:spPr>
+        <p:style>
+          <a:lnRef idx="1">
+            <a:schemeClr val="dk1"/>
+          </a:lnRef>
+          <a:fillRef idx="0">
+            <a:schemeClr val="dk1"/>
+          </a:fillRef>
+          <a:effectRef idx="0">
+            <a:schemeClr val="dk1"/>
+          </a:effectRef>
+          <a:fontRef idx="minor">
+            <a:schemeClr val="tx1"/>
+          </a:fontRef>
+        </p:style>
+      </p:cxnSp>
+      <p:cxnSp>
+        <p:nvCxnSpPr>
+          <p:cNvPr id="23" name="직선 연결선 22">
+            <a:extLst>
+              <a:ext uri="{FF2B5EF4-FFF2-40B4-BE49-F238E27FC236}">
+                <a16:creationId xmlns:a16="http://schemas.microsoft.com/office/drawing/2014/main" id="{CE8BFDA4-8EF3-75E0-52A9-3379914312C6}"/>
+              </a:ext>
+            </a:extLst>
+          </p:cNvPr>
+          <p:cNvCxnSpPr>
+            <a:cxnSpLocks/>
+          </p:cNvCxnSpPr>
+          <p:nvPr/>
+        </p:nvCxnSpPr>
+        <p:spPr>
+          <a:xfrm flipH="1">
+            <a:off x="4154805" y="2891255"/>
+            <a:ext cx="719610" cy="0"/>
+          </a:xfrm>
+          <a:prstGeom prst="line">
+            <a:avLst/>
+          </a:prstGeom>
+          <a:ln w="28575">
+            <a:solidFill>
+              <a:schemeClr val="accent1"/>
+            </a:solidFill>
+            <a:prstDash val="solid"/>
+          </a:ln>
+        </p:spPr>
+        <p:style>
+          <a:lnRef idx="1">
+            <a:schemeClr val="dk1"/>
+          </a:lnRef>
+          <a:fillRef idx="0">
+            <a:schemeClr val="dk1"/>
+          </a:fillRef>
+          <a:effectRef idx="0">
+            <a:schemeClr val="dk1"/>
+          </a:effectRef>
+          <a:fontRef idx="minor">
+            <a:schemeClr val="tx1"/>
+          </a:fontRef>
+        </p:style>
+      </p:cxnSp>
+      <mc:AlternateContent xmlns:mc="http://schemas.openxmlformats.org/markup-compatibility/2006">
+        <mc:Choice xmlns:a14="http://schemas.microsoft.com/office/drawing/2010/main" Requires="a14">
+          <p:sp>
+            <p:nvSpPr>
+              <p:cNvPr id="49" name="TextBox 48">
+                <a:extLst>
+                  <a:ext uri="{FF2B5EF4-FFF2-40B4-BE49-F238E27FC236}">
+                    <a16:creationId xmlns:a16="http://schemas.microsoft.com/office/drawing/2014/main" id="{A7628AD3-EB37-E8ED-A814-6A7024DC3F56}"/>
+                  </a:ext>
+                </a:extLst>
+              </p:cNvPr>
+              <p:cNvSpPr txBox="1"/>
+              <p:nvPr/>
+            </p:nvSpPr>
+            <p:spPr>
+              <a:xfrm>
+                <a:off x="4293392" y="2623525"/>
+                <a:ext cx="414336" cy="277255"/>
+              </a:xfrm>
+              <a:prstGeom prst="rect">
+                <a:avLst/>
+              </a:prstGeom>
+              <a:noFill/>
+            </p:spPr>
+            <p:txBody>
+              <a:bodyPr wrap="square" rtlCol="0">
+                <a:spAutoFit/>
+              </a:bodyPr>
+              <a:lstStyle/>
+              <a:p>
+                <a:pPr/>
+                <a14:m>
+                  <m:oMathPara xmlns:m="http://schemas.openxmlformats.org/officeDocument/2006/math">
+                    <m:oMathParaPr>
+                      <m:jc m:val="centerGroup"/>
+                    </m:oMathParaPr>
+                    <m:oMath xmlns:m="http://schemas.openxmlformats.org/officeDocument/2006/math">
+                      <m:sSub>
+                        <m:sSubPr>
+                          <m:ctrlPr>
+                            <a:rPr lang="en-US" altLang="ko-KR" sz="1100" b="0" i="1" dirty="0" smtClean="0">
+                              <a:latin typeface="Cambria Math" panose="02040503050406030204" pitchFamily="18" charset="0"/>
+                            </a:rPr>
+                          </m:ctrlPr>
+                        </m:sSubPr>
+                        <m:e>
+                          <m:r>
+                            <a:rPr lang="en-US" altLang="ko-KR" sz="1100" b="0" i="1" dirty="0" smtClean="0">
+                              <a:latin typeface="Cambria Math" panose="02040503050406030204" pitchFamily="18" charset="0"/>
+                            </a:rPr>
+                            <m:t>𝑀</m:t>
+                          </m:r>
+                        </m:e>
+                        <m:sub>
+                          <m:r>
+                            <m:rPr>
+                              <m:sty m:val="p"/>
+                            </m:rPr>
+                            <a:rPr lang="en-US" altLang="ko-KR" sz="1100" b="0" i="0" dirty="0" smtClean="0">
+                              <a:latin typeface="Cambria Math" panose="02040503050406030204" pitchFamily="18" charset="0"/>
+                            </a:rPr>
+                            <m:t>j</m:t>
+                          </m:r>
+                          <m:r>
+                            <a:rPr lang="en-US" altLang="ko-KR" sz="1100" b="0" i="0" dirty="0" smtClean="0">
+                              <a:latin typeface="Cambria Math" panose="02040503050406030204" pitchFamily="18" charset="0"/>
+                            </a:rPr>
+                            <m:t>+1</m:t>
+                          </m:r>
+                        </m:sub>
+                      </m:sSub>
+                    </m:oMath>
+                  </m:oMathPara>
+                </a14:m>
+                <a:endParaRPr lang="ko-KR" altLang="en-US" sz="1100" dirty="0"/>
+              </a:p>
+            </p:txBody>
+          </p:sp>
+        </mc:Choice>
+        <mc:Fallback>
+          <p:sp>
+            <p:nvSpPr>
+              <p:cNvPr id="49" name="TextBox 48">
+                <a:extLst>
+                  <a:ext uri="{FF2B5EF4-FFF2-40B4-BE49-F238E27FC236}">
+                    <a16:creationId xmlns:a16="http://schemas.microsoft.com/office/drawing/2014/main" id="{A7628AD3-EB37-E8ED-A814-6A7024DC3F56}"/>
+                  </a:ext>
+                </a:extLst>
+              </p:cNvPr>
+              <p:cNvSpPr txBox="1">
+                <a:spLocks noRot="1" noChangeAspect="1" noMove="1" noResize="1" noEditPoints="1" noAdjustHandles="1" noChangeArrowheads="1" noChangeShapeType="1" noTextEdit="1"/>
+              </p:cNvSpPr>
+              <p:nvPr/>
+            </p:nvSpPr>
+            <p:spPr>
+              <a:xfrm>
+                <a:off x="4293392" y="2623525"/>
+                <a:ext cx="414336" cy="277255"/>
+              </a:xfrm>
+              <a:prstGeom prst="rect">
+                <a:avLst/>
+              </a:prstGeom>
+              <a:blipFill>
+                <a:blip r:embed="rId7"/>
+                <a:stretch>
+                  <a:fillRect b="-2174"/>
+                </a:stretch>
+              </a:blipFill>
+            </p:spPr>
+            <p:txBody>
+              <a:bodyPr/>
+              <a:lstStyle/>
+              <a:p>
+                <a:r>
+                  <a:rPr lang="ko-KR" altLang="en-US">
+                    <a:noFill/>
+                  </a:rPr>
+                  <a:t> </a:t>
+                </a:r>
+              </a:p>
+            </p:txBody>
+          </p:sp>
+        </mc:Fallback>
+      </mc:AlternateContent>
+      <p:cxnSp>
+        <p:nvCxnSpPr>
+          <p:cNvPr id="59" name="직선 연결선 58">
+            <a:extLst>
+              <a:ext uri="{FF2B5EF4-FFF2-40B4-BE49-F238E27FC236}">
+                <a16:creationId xmlns:a16="http://schemas.microsoft.com/office/drawing/2014/main" id="{B6BD6D7F-F288-A933-F775-8576C0A6560D}"/>
+              </a:ext>
+            </a:extLst>
+          </p:cNvPr>
+          <p:cNvCxnSpPr>
+            <a:cxnSpLocks/>
+          </p:cNvCxnSpPr>
+          <p:nvPr/>
+        </p:nvCxnSpPr>
+        <p:spPr>
+          <a:xfrm>
+            <a:off x="4154805" y="2900780"/>
+            <a:ext cx="0" cy="1143634"/>
+          </a:xfrm>
+          <a:prstGeom prst="line">
+            <a:avLst/>
+          </a:prstGeom>
+          <a:ln w="19050">
+            <a:solidFill>
+              <a:schemeClr val="accent6">
+                <a:lumMod val="60000"/>
+                <a:lumOff val="40000"/>
+              </a:schemeClr>
+            </a:solidFill>
+            <a:prstDash val="sysDot"/>
+          </a:ln>
+        </p:spPr>
+        <p:style>
+          <a:lnRef idx="1">
+            <a:schemeClr val="accent1"/>
+          </a:lnRef>
+          <a:fillRef idx="0">
+            <a:schemeClr val="accent1"/>
+          </a:fillRef>
+          <a:effectRef idx="0">
+            <a:schemeClr val="accent1"/>
+          </a:effectRef>
+          <a:fontRef idx="minor">
+            <a:schemeClr val="tx1"/>
+          </a:fontRef>
+        </p:style>
+      </p:cxnSp>
+      <p:cxnSp>
+        <p:nvCxnSpPr>
+          <p:cNvPr id="60" name="직선 연결선 59">
+            <a:extLst>
+              <a:ext uri="{FF2B5EF4-FFF2-40B4-BE49-F238E27FC236}">
+                <a16:creationId xmlns:a16="http://schemas.microsoft.com/office/drawing/2014/main" id="{8BBAD2CA-8C59-7B65-DD75-E7045CE39D1A}"/>
+              </a:ext>
+            </a:extLst>
+          </p:cNvPr>
+          <p:cNvCxnSpPr>
+            <a:cxnSpLocks/>
+          </p:cNvCxnSpPr>
+          <p:nvPr/>
+        </p:nvCxnSpPr>
+        <p:spPr>
+          <a:xfrm>
+            <a:off x="3991927" y="3243683"/>
+            <a:ext cx="0" cy="800731"/>
+          </a:xfrm>
+          <a:prstGeom prst="line">
+            <a:avLst/>
+          </a:prstGeom>
+          <a:ln w="19050">
+            <a:solidFill>
+              <a:schemeClr val="accent6">
+                <a:lumMod val="60000"/>
+                <a:lumOff val="40000"/>
+              </a:schemeClr>
+            </a:solidFill>
+            <a:prstDash val="sysDot"/>
+          </a:ln>
+        </p:spPr>
+        <p:style>
+          <a:lnRef idx="1">
+            <a:schemeClr val="accent1"/>
+          </a:lnRef>
+          <a:fillRef idx="0">
+            <a:schemeClr val="accent1"/>
+          </a:fillRef>
+          <a:effectRef idx="0">
+            <a:schemeClr val="accent1"/>
+          </a:effectRef>
+          <a:fontRef idx="minor">
+            <a:schemeClr val="tx1"/>
+          </a:fontRef>
+        </p:style>
+      </p:cxnSp>
+      <p:cxnSp>
+        <p:nvCxnSpPr>
+          <p:cNvPr id="13" name="직선 연결선 12">
+            <a:extLst>
+              <a:ext uri="{FF2B5EF4-FFF2-40B4-BE49-F238E27FC236}">
+                <a16:creationId xmlns:a16="http://schemas.microsoft.com/office/drawing/2014/main" id="{2BF0F4CC-EC1A-E5C7-54AC-2908B3FEFB59}"/>
+              </a:ext>
+            </a:extLst>
+          </p:cNvPr>
+          <p:cNvCxnSpPr>
+            <a:cxnSpLocks/>
+          </p:cNvCxnSpPr>
+          <p:nvPr/>
+        </p:nvCxnSpPr>
+        <p:spPr>
+          <a:xfrm flipH="1">
+            <a:off x="3991927" y="2900780"/>
+            <a:ext cx="162878" cy="342903"/>
+          </a:xfrm>
+          <a:prstGeom prst="line">
+            <a:avLst/>
+          </a:prstGeom>
+          <a:ln w="28575">
+            <a:solidFill>
+              <a:schemeClr val="accent1"/>
+            </a:solidFill>
+            <a:prstDash val="solid"/>
+          </a:ln>
+        </p:spPr>
+        <p:style>
+          <a:lnRef idx="1">
+            <a:schemeClr val="dk1"/>
+          </a:lnRef>
+          <a:fillRef idx="0">
+            <a:schemeClr val="dk1"/>
+          </a:fillRef>
+          <a:effectRef idx="0">
+            <a:schemeClr val="dk1"/>
+          </a:effectRef>
+          <a:fontRef idx="minor">
+            <a:schemeClr val="tx1"/>
+          </a:fontRef>
+        </p:style>
+      </p:cxnSp>
+      <p:cxnSp>
+        <p:nvCxnSpPr>
+          <p:cNvPr id="18" name="직선 연결선 17">
+            <a:extLst>
+              <a:ext uri="{FF2B5EF4-FFF2-40B4-BE49-F238E27FC236}">
+                <a16:creationId xmlns:a16="http://schemas.microsoft.com/office/drawing/2014/main" id="{0CF69570-C4FE-C87C-9BB8-7BA15517BCD9}"/>
+              </a:ext>
+            </a:extLst>
+          </p:cNvPr>
+          <p:cNvCxnSpPr>
+            <a:cxnSpLocks/>
+          </p:cNvCxnSpPr>
+          <p:nvPr/>
+        </p:nvCxnSpPr>
+        <p:spPr>
+          <a:xfrm>
+            <a:off x="4154805" y="3918484"/>
+            <a:ext cx="0" cy="125930"/>
+          </a:xfrm>
+          <a:prstGeom prst="line">
+            <a:avLst/>
+          </a:prstGeom>
+          <a:ln w="38100">
+            <a:solidFill>
+              <a:schemeClr val="accent6">
+                <a:lumMod val="60000"/>
+                <a:lumOff val="40000"/>
+              </a:schemeClr>
+            </a:solidFill>
+          </a:ln>
+        </p:spPr>
+        <p:style>
+          <a:lnRef idx="1">
+            <a:schemeClr val="accent1"/>
+          </a:lnRef>
+          <a:fillRef idx="0">
+            <a:schemeClr val="accent1"/>
+          </a:fillRef>
+          <a:effectRef idx="0">
+            <a:schemeClr val="accent1"/>
+          </a:effectRef>
+          <a:fontRef idx="minor">
+            <a:schemeClr val="tx1"/>
+          </a:fontRef>
+        </p:style>
+      </p:cxnSp>
+      <p:cxnSp>
+        <p:nvCxnSpPr>
+          <p:cNvPr id="19" name="직선 연결선 18">
+            <a:extLst>
+              <a:ext uri="{FF2B5EF4-FFF2-40B4-BE49-F238E27FC236}">
+                <a16:creationId xmlns:a16="http://schemas.microsoft.com/office/drawing/2014/main" id="{4DAB759C-0413-55CB-662C-9FBE5F6721A9}"/>
+              </a:ext>
+            </a:extLst>
+          </p:cNvPr>
+          <p:cNvCxnSpPr>
+            <a:cxnSpLocks/>
+          </p:cNvCxnSpPr>
+          <p:nvPr/>
+        </p:nvCxnSpPr>
+        <p:spPr>
+          <a:xfrm>
+            <a:off x="3991927" y="3918484"/>
+            <a:ext cx="0" cy="125930"/>
+          </a:xfrm>
+          <a:prstGeom prst="line">
+            <a:avLst/>
+          </a:prstGeom>
+          <a:ln w="38100">
+            <a:solidFill>
+              <a:schemeClr val="accent6">
+                <a:lumMod val="60000"/>
+                <a:lumOff val="40000"/>
+              </a:schemeClr>
+            </a:solidFill>
+          </a:ln>
+        </p:spPr>
+        <p:style>
+          <a:lnRef idx="1">
+            <a:schemeClr val="accent1"/>
+          </a:lnRef>
+          <a:fillRef idx="0">
+            <a:schemeClr val="accent1"/>
+          </a:fillRef>
+          <a:effectRef idx="0">
+            <a:schemeClr val="accent1"/>
+          </a:effectRef>
+          <a:fontRef idx="minor">
+            <a:schemeClr val="tx1"/>
+          </a:fontRef>
+        </p:style>
+      </p:cxnSp>
+      <mc:AlternateContent xmlns:mc="http://schemas.openxmlformats.org/markup-compatibility/2006">
+        <mc:Choice xmlns:a14="http://schemas.microsoft.com/office/drawing/2010/main" Requires="a14">
+          <p:sp>
+            <p:nvSpPr>
+              <p:cNvPr id="29" name="TextBox 28">
+                <a:extLst>
+                  <a:ext uri="{FF2B5EF4-FFF2-40B4-BE49-F238E27FC236}">
+                    <a16:creationId xmlns:a16="http://schemas.microsoft.com/office/drawing/2014/main" id="{87E5FDA0-2522-49F8-A398-A9EC1DF10C4A}"/>
+                  </a:ext>
+                </a:extLst>
+              </p:cNvPr>
+              <p:cNvSpPr txBox="1"/>
+              <p:nvPr/>
+            </p:nvSpPr>
+            <p:spPr>
+              <a:xfrm>
+                <a:off x="6185517" y="782962"/>
+                <a:ext cx="759617" cy="261610"/>
+              </a:xfrm>
+              <a:prstGeom prst="rect">
+                <a:avLst/>
+              </a:prstGeom>
+              <a:noFill/>
+            </p:spPr>
+            <p:txBody>
+              <a:bodyPr wrap="square" rtlCol="0">
+                <a:spAutoFit/>
+              </a:bodyPr>
+              <a:lstStyle/>
+              <a:p>
+                <a:pPr/>
+                <a14:m>
+                  <m:oMathPara xmlns:m="http://schemas.openxmlformats.org/officeDocument/2006/math">
+                    <m:oMathParaPr>
+                      <m:jc m:val="centerGroup"/>
+                    </m:oMathParaPr>
+                    <m:oMath xmlns:m="http://schemas.openxmlformats.org/officeDocument/2006/math">
+                      <m:r>
+                        <a:rPr lang="en-US" altLang="ko-KR" sz="1100" b="0" i="1" dirty="0" smtClean="0">
+                          <a:latin typeface="Cambria Math" panose="02040503050406030204" pitchFamily="18" charset="0"/>
+                        </a:rPr>
+                        <m:t>𝑦</m:t>
+                      </m:r>
+                      <m:r>
+                        <a:rPr lang="en-US" altLang="ko-KR" sz="1100" b="0" i="1" dirty="0" smtClean="0">
+                          <a:latin typeface="Cambria Math" panose="02040503050406030204" pitchFamily="18" charset="0"/>
+                        </a:rPr>
+                        <m:t>=</m:t>
+                      </m:r>
+                      <m:r>
+                        <a:rPr lang="en-US" altLang="ko-KR" sz="1100" b="0" i="1" dirty="0" smtClean="0">
+                          <a:latin typeface="Cambria Math" panose="02040503050406030204" pitchFamily="18" charset="0"/>
+                        </a:rPr>
+                        <m:t>𝑓</m:t>
+                      </m:r>
+                      <m:r>
+                        <a:rPr lang="en-US" altLang="ko-KR" sz="1100" b="0" i="1" dirty="0" smtClean="0">
+                          <a:latin typeface="Cambria Math" panose="02040503050406030204" pitchFamily="18" charset="0"/>
+                        </a:rPr>
+                        <m:t>(</m:t>
+                      </m:r>
+                      <m:r>
+                        <a:rPr lang="en-US" altLang="ko-KR" sz="1100" b="0" i="1" dirty="0" smtClean="0">
+                          <a:latin typeface="Cambria Math" panose="02040503050406030204" pitchFamily="18" charset="0"/>
+                        </a:rPr>
+                        <m:t>𝑥</m:t>
+                      </m:r>
+                      <m:r>
+                        <a:rPr lang="en-US" altLang="ko-KR" sz="1100" b="0" i="1" dirty="0" smtClean="0">
+                          <a:latin typeface="Cambria Math" panose="02040503050406030204" pitchFamily="18" charset="0"/>
+                        </a:rPr>
+                        <m:t>)</m:t>
+                      </m:r>
+                    </m:oMath>
+                  </m:oMathPara>
+                </a14:m>
+                <a:endParaRPr lang="ko-KR" altLang="en-US" sz="1100" dirty="0"/>
+              </a:p>
+            </p:txBody>
+          </p:sp>
+        </mc:Choice>
+        <mc:Fallback>
+          <p:sp>
+            <p:nvSpPr>
+              <p:cNvPr id="29" name="TextBox 28">
+                <a:extLst>
+                  <a:ext uri="{FF2B5EF4-FFF2-40B4-BE49-F238E27FC236}">
+                    <a16:creationId xmlns:a16="http://schemas.microsoft.com/office/drawing/2014/main" id="{87E5FDA0-2522-49F8-A398-A9EC1DF10C4A}"/>
+                  </a:ext>
+                </a:extLst>
+              </p:cNvPr>
+              <p:cNvSpPr txBox="1">
+                <a:spLocks noRot="1" noChangeAspect="1" noMove="1" noResize="1" noEditPoints="1" noAdjustHandles="1" noChangeArrowheads="1" noChangeShapeType="1" noTextEdit="1"/>
+              </p:cNvSpPr>
+              <p:nvPr/>
+            </p:nvSpPr>
+            <p:spPr>
+              <a:xfrm>
+                <a:off x="6185517" y="782962"/>
+                <a:ext cx="759617" cy="261610"/>
+              </a:xfrm>
+              <a:prstGeom prst="rect">
+                <a:avLst/>
+              </a:prstGeom>
+              <a:blipFill>
+                <a:blip r:embed="rId8"/>
+                <a:stretch>
+                  <a:fillRect b="-6977"/>
+                </a:stretch>
+              </a:blipFill>
+            </p:spPr>
+            <p:txBody>
+              <a:bodyPr/>
+              <a:lstStyle/>
+              <a:p>
+                <a:r>
+                  <a:rPr lang="ko-KR" altLang="en-US">
+                    <a:noFill/>
+                  </a:rPr>
+                  <a:t> </a:t>
+                </a:r>
+              </a:p>
+            </p:txBody>
+          </p:sp>
+        </mc:Fallback>
+      </mc:AlternateContent>
+    </p:spTree>
+    <p:extLst>
+      <p:ext uri="{BB962C8B-B14F-4D97-AF65-F5344CB8AC3E}">
+        <p14:creationId xmlns:p14="http://schemas.microsoft.com/office/powerpoint/2010/main" val="2429052128"/>
       </p:ext>
     </p:extLst>
   </p:cSld>

</xml_diff>